<commit_message>
Fikset jonas sitt fuckup
Han burde takke meg
</commit_message>
<xml_diff>
--- a/Presentasjon.pptx
+++ b/Presentasjon.pptx
@@ -207,7 +207,7 @@
           <a:p>
             <a:fld id="{2327A38E-9F09-445C-BA1E-5368DD676257}" type="datetimeFigureOut">
               <a:rPr lang="nb-NO" smtClean="0"/>
-              <a:t>02.04.2024</a:t>
+              <a:t>04.04.2024</a:t>
             </a:fld>
             <a:endParaRPr lang="nb-NO"/>
           </a:p>
@@ -906,7 +906,7 @@
           <a:p>
             <a:fld id="{3CADBD16-5BFB-4D9F-9646-C75D1B53BBB6}" type="datetimeFigureOut">
               <a:rPr lang="en-US" smtClean="0"/>
-              <a:t>4/2/2024</a:t>
+              <a:t>4/4/2024</a:t>
             </a:fld>
             <a:endParaRPr lang="en-US"/>
           </a:p>
@@ -1147,7 +1147,7 @@
           <a:p>
             <a:fld id="{3CADBD16-5BFB-4D9F-9646-C75D1B53BBB6}" type="datetimeFigureOut">
               <a:rPr lang="en-US" smtClean="0"/>
-              <a:t>4/2/2024</a:t>
+              <a:t>4/4/2024</a:t>
             </a:fld>
             <a:endParaRPr lang="en-US"/>
           </a:p>
@@ -1355,7 +1355,7 @@
           <a:p>
             <a:fld id="{3CADBD16-5BFB-4D9F-9646-C75D1B53BBB6}" type="datetimeFigureOut">
               <a:rPr lang="en-US" smtClean="0"/>
-              <a:t>4/2/2024</a:t>
+              <a:t>4/4/2024</a:t>
             </a:fld>
             <a:endParaRPr lang="en-US"/>
           </a:p>
@@ -1553,7 +1553,7 @@
           <a:p>
             <a:fld id="{3CADBD16-5BFB-4D9F-9646-C75D1B53BBB6}" type="datetimeFigureOut">
               <a:rPr lang="en-US" smtClean="0"/>
-              <a:t>4/2/2024</a:t>
+              <a:t>4/4/2024</a:t>
             </a:fld>
             <a:endParaRPr lang="en-US"/>
           </a:p>
@@ -1830,7 +1830,7 @@
           <a:p>
             <a:fld id="{3CADBD16-5BFB-4D9F-9646-C75D1B53BBB6}" type="datetimeFigureOut">
               <a:rPr lang="en-US" smtClean="0"/>
-              <a:t>4/2/2024</a:t>
+              <a:t>4/4/2024</a:t>
             </a:fld>
             <a:endParaRPr lang="en-US"/>
           </a:p>
@@ -2095,7 +2095,7 @@
           <a:p>
             <a:fld id="{3CADBD16-5BFB-4D9F-9646-C75D1B53BBB6}" type="datetimeFigureOut">
               <a:rPr lang="en-US" smtClean="0"/>
-              <a:t>4/2/2024</a:t>
+              <a:t>4/4/2024</a:t>
             </a:fld>
             <a:endParaRPr lang="en-US"/>
           </a:p>
@@ -2511,7 +2511,7 @@
           <a:p>
             <a:fld id="{3CADBD16-5BFB-4D9F-9646-C75D1B53BBB6}" type="datetimeFigureOut">
               <a:rPr lang="en-US" smtClean="0"/>
-              <a:t>4/2/2024</a:t>
+              <a:t>4/4/2024</a:t>
             </a:fld>
             <a:endParaRPr lang="en-US"/>
           </a:p>
@@ -2661,7 +2661,7 @@
           <a:p>
             <a:fld id="{3CADBD16-5BFB-4D9F-9646-C75D1B53BBB6}" type="datetimeFigureOut">
               <a:rPr lang="en-US" smtClean="0"/>
-              <a:t>4/2/2024</a:t>
+              <a:t>4/4/2024</a:t>
             </a:fld>
             <a:endParaRPr lang="en-US"/>
           </a:p>
@@ -2774,7 +2774,7 @@
           <a:p>
             <a:fld id="{3CADBD16-5BFB-4D9F-9646-C75D1B53BBB6}" type="datetimeFigureOut">
               <a:rPr lang="en-US" smtClean="0"/>
-              <a:t>4/2/2024</a:t>
+              <a:t>4/4/2024</a:t>
             </a:fld>
             <a:endParaRPr lang="en-US"/>
           </a:p>
@@ -3090,7 +3090,7 @@
           <a:p>
             <a:fld id="{3CADBD16-5BFB-4D9F-9646-C75D1B53BBB6}" type="datetimeFigureOut">
               <a:rPr lang="en-US" smtClean="0"/>
-              <a:t>4/2/2024</a:t>
+              <a:t>4/4/2024</a:t>
             </a:fld>
             <a:endParaRPr lang="en-US"/>
           </a:p>
@@ -3341,7 +3341,7 @@
           <a:p>
             <a:fld id="{3CADBD16-5BFB-4D9F-9646-C75D1B53BBB6}" type="datetimeFigureOut">
               <a:rPr lang="en-US" smtClean="0"/>
-              <a:t>4/2/2024</a:t>
+              <a:t>4/4/2024</a:t>
             </a:fld>
             <a:endParaRPr lang="en-US"/>
           </a:p>
@@ -3850,7 +3850,7 @@
             <a:fld id="{3CADBD16-5BFB-4D9F-9646-C75D1B53BBB6}" type="datetimeFigureOut">
               <a:rPr lang="en-US" smtClean="0"/>
               <a:pPr/>
-              <a:t>4/2/2024</a:t>
+              <a:t>4/4/2024</a:t>
             </a:fld>
             <a:endParaRPr lang="en-US" dirty="0"/>
           </a:p>
@@ -4459,42 +4459,6 @@
           </a:p>
         </p:txBody>
       </p:sp>
-      <p:pic>
-        <p:nvPicPr>
-          <p:cNvPr id="12" name="Bilde 11" descr="Et bilde som inneholder Font, skjermbilde, Grafikk, logo&#10;&#10;Automatisk generert beskrivelse">
-            <a:extLst>
-              <a:ext uri="{FF2B5EF4-FFF2-40B4-BE49-F238E27FC236}">
-                <a16:creationId xmlns:a16="http://schemas.microsoft.com/office/drawing/2014/main" id="{E26039A8-4518-2CE0-552B-5C46B9CCC68D}"/>
-              </a:ext>
-            </a:extLst>
-          </p:cNvPr>
-          <p:cNvPicPr>
-            <a:picLocks noChangeAspect="1"/>
-          </p:cNvPicPr>
-          <p:nvPr/>
-        </p:nvPicPr>
-        <p:blipFill>
-          <a:blip r:embed="rId2">
-            <a:extLst>
-              <a:ext uri="{28A0092B-C50C-407E-A947-70E740481C1C}">
-                <a14:useLocalDpi xmlns:a14="http://schemas.microsoft.com/office/drawing/2010/main" val="0"/>
-              </a:ext>
-            </a:extLst>
-          </a:blip>
-          <a:stretch>
-            <a:fillRect/>
-          </a:stretch>
-        </p:blipFill>
-        <p:spPr>
-          <a:xfrm>
-            <a:off x="3826414" y="741054"/>
-            <a:ext cx="4539172" cy="3621593"/>
-          </a:xfrm>
-          <a:prstGeom prst="rect">
-            <a:avLst/>
-          </a:prstGeom>
-        </p:spPr>
-      </p:pic>
       <p:cxnSp>
         <p:nvCxnSpPr>
           <p:cNvPr id="14" name="Rett linje 13">
@@ -4577,6 +4541,42 @@
           </a:p>
         </p:txBody>
       </p:sp>
+      <p:pic>
+        <p:nvPicPr>
+          <p:cNvPr id="3" name="Bilde 2" descr="Et bilde som inneholder Font, Grafikk, skjermbilde, tekst&#10;&#10;Automatisk generert beskrivelse">
+            <a:extLst>
+              <a:ext uri="{FF2B5EF4-FFF2-40B4-BE49-F238E27FC236}">
+                <a16:creationId xmlns:a16="http://schemas.microsoft.com/office/drawing/2014/main" id="{1E9FC2C0-F9FF-C19C-CDFB-297368576CEB}"/>
+              </a:ext>
+            </a:extLst>
+          </p:cNvPr>
+          <p:cNvPicPr>
+            <a:picLocks noChangeAspect="1"/>
+          </p:cNvPicPr>
+          <p:nvPr/>
+        </p:nvPicPr>
+        <p:blipFill>
+          <a:blip r:embed="rId2">
+            <a:extLst>
+              <a:ext uri="{28A0092B-C50C-407E-A947-70E740481C1C}">
+                <a14:useLocalDpi xmlns:a14="http://schemas.microsoft.com/office/drawing/2010/main" val="0"/>
+              </a:ext>
+            </a:extLst>
+          </a:blip>
+          <a:stretch>
+            <a:fillRect/>
+          </a:stretch>
+        </p:blipFill>
+        <p:spPr>
+          <a:xfrm>
+            <a:off x="3300412" y="426678"/>
+            <a:ext cx="5591175" cy="4048125"/>
+          </a:xfrm>
+          <a:prstGeom prst="rect">
+            <a:avLst/>
+          </a:prstGeom>
+        </p:spPr>
+      </p:pic>
     </p:spTree>
     <p:extLst>
       <p:ext uri="{BB962C8B-B14F-4D97-AF65-F5344CB8AC3E}">
@@ -4609,10 +4609,10 @@
       </p:grpSpPr>
       <p:pic>
         <p:nvPicPr>
-          <p:cNvPr id="4" name="Bilde 3" descr="Et bilde som inneholder Font, skjermbilde, Grafikk, logo&#10;&#10;Automatisk generert beskrivelse">
-            <a:extLst>
-              <a:ext uri="{FF2B5EF4-FFF2-40B4-BE49-F238E27FC236}">
-                <a16:creationId xmlns:a16="http://schemas.microsoft.com/office/drawing/2014/main" id="{708FCC79-D822-14E4-4633-1A03C5636EBE}"/>
+          <p:cNvPr id="5" name="Bilde 4">
+            <a:extLst>
+              <a:ext uri="{FF2B5EF4-FFF2-40B4-BE49-F238E27FC236}">
+                <a16:creationId xmlns:a16="http://schemas.microsoft.com/office/drawing/2014/main" id="{E1742CDB-AC92-E6F7-9FA8-BB1B8EC98ECC}"/>
               </a:ext>
             </a:extLst>
           </p:cNvPr>
@@ -4622,43 +4622,7 @@
           <p:nvPr/>
         </p:nvPicPr>
         <p:blipFill>
-          <a:blip r:embed="rId2">
-            <a:extLst>
-              <a:ext uri="{28A0092B-C50C-407E-A947-70E740481C1C}">
-                <a14:useLocalDpi xmlns:a14="http://schemas.microsoft.com/office/drawing/2010/main" val="0"/>
-              </a:ext>
-            </a:extLst>
-          </a:blip>
-          <a:stretch>
-            <a:fillRect/>
-          </a:stretch>
-        </p:blipFill>
-        <p:spPr>
-          <a:xfrm>
-            <a:off x="9696450" y="5233285"/>
-            <a:ext cx="2495550" cy="1991083"/>
-          </a:xfrm>
-          <a:prstGeom prst="rect">
-            <a:avLst/>
-          </a:prstGeom>
-        </p:spPr>
-      </p:pic>
-      <p:pic>
-        <p:nvPicPr>
-          <p:cNvPr id="5" name="Bilde 4">
-            <a:extLst>
-              <a:ext uri="{FF2B5EF4-FFF2-40B4-BE49-F238E27FC236}">
-                <a16:creationId xmlns:a16="http://schemas.microsoft.com/office/drawing/2014/main" id="{E1742CDB-AC92-E6F7-9FA8-BB1B8EC98ECC}"/>
-              </a:ext>
-            </a:extLst>
-          </p:cNvPr>
-          <p:cNvPicPr>
-            <a:picLocks noChangeAspect="1"/>
-          </p:cNvPicPr>
-          <p:nvPr/>
-        </p:nvPicPr>
-        <p:blipFill>
-          <a:blip r:embed="rId3"/>
+          <a:blip r:embed="rId2"/>
           <a:stretch>
             <a:fillRect/>
           </a:stretch>
@@ -4851,7 +4815,7 @@
         </p:nvSpPr>
         <p:spPr>
           <a:xfrm>
-            <a:off x="2125201" y="7111349"/>
+            <a:off x="2125201" y="-1598335"/>
             <a:ext cx="7941598" cy="1446550"/>
           </a:xfrm>
           <a:prstGeom prst="rect">
@@ -4875,6 +4839,42 @@
           </a:p>
         </p:txBody>
       </p:sp>
+      <p:pic>
+        <p:nvPicPr>
+          <p:cNvPr id="3" name="Bilde 2" descr="Et bilde som inneholder Font, Grafikk, skjermbilde, tekst&#10;&#10;Automatisk generert beskrivelse">
+            <a:extLst>
+              <a:ext uri="{FF2B5EF4-FFF2-40B4-BE49-F238E27FC236}">
+                <a16:creationId xmlns:a16="http://schemas.microsoft.com/office/drawing/2014/main" id="{68BFA0C6-7773-2DCC-BFD7-0693CBC56FE5}"/>
+              </a:ext>
+            </a:extLst>
+          </p:cNvPr>
+          <p:cNvPicPr>
+            <a:picLocks noChangeAspect="1"/>
+          </p:cNvPicPr>
+          <p:nvPr/>
+        </p:nvPicPr>
+        <p:blipFill>
+          <a:blip r:embed="rId3">
+            <a:extLst>
+              <a:ext uri="{28A0092B-C50C-407E-A947-70E740481C1C}">
+                <a14:useLocalDpi xmlns:a14="http://schemas.microsoft.com/office/drawing/2010/main" val="0"/>
+              </a:ext>
+            </a:extLst>
+          </a:blip>
+          <a:stretch>
+            <a:fillRect/>
+          </a:stretch>
+        </p:blipFill>
+        <p:spPr>
+          <a:xfrm>
+            <a:off x="9618917" y="5095462"/>
+            <a:ext cx="2487740" cy="1801175"/>
+          </a:xfrm>
+          <a:prstGeom prst="rect">
+            <a:avLst/>
+          </a:prstGeom>
+        </p:spPr>
+      </p:pic>
     </p:spTree>
     <p:extLst>
       <p:ext uri="{BB962C8B-B14F-4D97-AF65-F5344CB8AC3E}">
@@ -5130,42 +5130,6 @@
           <a:chExt cx="0" cy="0"/>
         </a:xfrm>
       </p:grpSpPr>
-      <p:pic>
-        <p:nvPicPr>
-          <p:cNvPr id="4" name="Bilde 3" descr="Et bilde som inneholder Font, skjermbilde, Grafikk, logo&#10;&#10;Automatisk generert beskrivelse">
-            <a:extLst>
-              <a:ext uri="{FF2B5EF4-FFF2-40B4-BE49-F238E27FC236}">
-                <a16:creationId xmlns:a16="http://schemas.microsoft.com/office/drawing/2014/main" id="{708FCC79-D822-14E4-4633-1A03C5636EBE}"/>
-              </a:ext>
-            </a:extLst>
-          </p:cNvPr>
-          <p:cNvPicPr>
-            <a:picLocks noChangeAspect="1"/>
-          </p:cNvPicPr>
-          <p:nvPr/>
-        </p:nvPicPr>
-        <p:blipFill>
-          <a:blip r:embed="rId2">
-            <a:extLst>
-              <a:ext uri="{28A0092B-C50C-407E-A947-70E740481C1C}">
-                <a14:useLocalDpi xmlns:a14="http://schemas.microsoft.com/office/drawing/2010/main" val="0"/>
-              </a:ext>
-            </a:extLst>
-          </a:blip>
-          <a:stretch>
-            <a:fillRect/>
-          </a:stretch>
-        </p:blipFill>
-        <p:spPr>
-          <a:xfrm>
-            <a:off x="9696450" y="5233285"/>
-            <a:ext cx="2495550" cy="1991083"/>
-          </a:xfrm>
-          <a:prstGeom prst="rect">
-            <a:avLst/>
-          </a:prstGeom>
-        </p:spPr>
-      </p:pic>
       <p:sp>
         <p:nvSpPr>
           <p:cNvPr id="2" name="TekstSylinder 1">
@@ -5330,6 +5294,42 @@
           </a:p>
         </p:txBody>
       </p:sp>
+      <p:pic>
+        <p:nvPicPr>
+          <p:cNvPr id="5" name="Bilde 4" descr="Et bilde som inneholder Font, Grafikk, skjermbilde, tekst&#10;&#10;Automatisk generert beskrivelse">
+            <a:extLst>
+              <a:ext uri="{FF2B5EF4-FFF2-40B4-BE49-F238E27FC236}">
+                <a16:creationId xmlns:a16="http://schemas.microsoft.com/office/drawing/2014/main" id="{40DAC41D-6B1B-4258-6CC6-C556F18975C2}"/>
+              </a:ext>
+            </a:extLst>
+          </p:cNvPr>
+          <p:cNvPicPr>
+            <a:picLocks noChangeAspect="1"/>
+          </p:cNvPicPr>
+          <p:nvPr/>
+        </p:nvPicPr>
+        <p:blipFill>
+          <a:blip r:embed="rId2">
+            <a:extLst>
+              <a:ext uri="{28A0092B-C50C-407E-A947-70E740481C1C}">
+                <a14:useLocalDpi xmlns:a14="http://schemas.microsoft.com/office/drawing/2010/main" val="0"/>
+              </a:ext>
+            </a:extLst>
+          </a:blip>
+          <a:stretch>
+            <a:fillRect/>
+          </a:stretch>
+        </p:blipFill>
+        <p:spPr>
+          <a:xfrm>
+            <a:off x="4033551" y="2330207"/>
+            <a:ext cx="4124898" cy="2986511"/>
+          </a:xfrm>
+          <a:prstGeom prst="rect">
+            <a:avLst/>
+          </a:prstGeom>
+        </p:spPr>
+      </p:pic>
     </p:spTree>
     <p:extLst>
       <p:ext uri="{BB962C8B-B14F-4D97-AF65-F5344CB8AC3E}">
@@ -5408,42 +5408,6 @@
           </a:prstGeom>
         </p:spPr>
       </p:pic>
-      <p:pic>
-        <p:nvPicPr>
-          <p:cNvPr id="5" name="Bilde 4" descr="Et bilde som inneholder Font, skjermbilde, Grafikk, logo&#10;&#10;Automatisk generert beskrivelse">
-            <a:extLst>
-              <a:ext uri="{FF2B5EF4-FFF2-40B4-BE49-F238E27FC236}">
-                <a16:creationId xmlns:a16="http://schemas.microsoft.com/office/drawing/2014/main" id="{5624167A-E9C9-A264-C40A-132FB6DB9252}"/>
-              </a:ext>
-            </a:extLst>
-          </p:cNvPr>
-          <p:cNvPicPr>
-            <a:picLocks noChangeAspect="1"/>
-          </p:cNvPicPr>
-          <p:nvPr/>
-        </p:nvPicPr>
-        <p:blipFill>
-          <a:blip r:embed="rId2">
-            <a:extLst>
-              <a:ext uri="{28A0092B-C50C-407E-A947-70E740481C1C}">
-                <a14:useLocalDpi xmlns:a14="http://schemas.microsoft.com/office/drawing/2010/main" val="0"/>
-              </a:ext>
-            </a:extLst>
-          </a:blip>
-          <a:stretch>
-            <a:fillRect/>
-          </a:stretch>
-        </p:blipFill>
-        <p:spPr>
-          <a:xfrm>
-            <a:off x="9696450" y="5233285"/>
-            <a:ext cx="2495550" cy="1991083"/>
-          </a:xfrm>
-          <a:prstGeom prst="rect">
-            <a:avLst/>
-          </a:prstGeom>
-        </p:spPr>
-      </p:pic>
       <p:sp>
         <p:nvSpPr>
           <p:cNvPr id="6" name="TekstSylinder 5">
@@ -5848,6 +5812,42 @@
           </a:p>
         </p:txBody>
       </p:sp>
+      <p:pic>
+        <p:nvPicPr>
+          <p:cNvPr id="3" name="Bilde 2" descr="Et bilde som inneholder Font, Grafikk, skjermbilde, tekst&#10;&#10;Automatisk generert beskrivelse">
+            <a:extLst>
+              <a:ext uri="{FF2B5EF4-FFF2-40B4-BE49-F238E27FC236}">
+                <a16:creationId xmlns:a16="http://schemas.microsoft.com/office/drawing/2014/main" id="{F651C939-8525-4050-D9A8-88748D064326}"/>
+              </a:ext>
+            </a:extLst>
+          </p:cNvPr>
+          <p:cNvPicPr>
+            <a:picLocks noChangeAspect="1"/>
+          </p:cNvPicPr>
+          <p:nvPr/>
+        </p:nvPicPr>
+        <p:blipFill>
+          <a:blip r:embed="rId3">
+            <a:extLst>
+              <a:ext uri="{28A0092B-C50C-407E-A947-70E740481C1C}">
+                <a14:useLocalDpi xmlns:a14="http://schemas.microsoft.com/office/drawing/2010/main" val="0"/>
+              </a:ext>
+            </a:extLst>
+          </a:blip>
+          <a:stretch>
+            <a:fillRect/>
+          </a:stretch>
+        </p:blipFill>
+        <p:spPr>
+          <a:xfrm>
+            <a:off x="9618917" y="5095462"/>
+            <a:ext cx="2487740" cy="1801175"/>
+          </a:xfrm>
+          <a:prstGeom prst="rect">
+            <a:avLst/>
+          </a:prstGeom>
+        </p:spPr>
+      </p:pic>
     </p:spTree>
     <p:extLst>
       <p:ext uri="{BB962C8B-B14F-4D97-AF65-F5344CB8AC3E}">
@@ -6433,12 +6433,206 @@
           </a:p>
         </p:txBody>
       </p:sp>
+      <p:sp>
+        <p:nvSpPr>
+          <p:cNvPr id="6" name="TekstSylinder 5">
+            <a:extLst>
+              <a:ext uri="{FF2B5EF4-FFF2-40B4-BE49-F238E27FC236}">
+                <a16:creationId xmlns:a16="http://schemas.microsoft.com/office/drawing/2014/main" id="{C74986E6-DACF-7035-0972-85836707950B}"/>
+              </a:ext>
+            </a:extLst>
+          </p:cNvPr>
+          <p:cNvSpPr txBox="1"/>
+          <p:nvPr/>
+        </p:nvSpPr>
+        <p:spPr>
+          <a:xfrm>
+            <a:off x="1171577" y="-3113485"/>
+            <a:ext cx="2311851" cy="1477328"/>
+          </a:xfrm>
+          <a:prstGeom prst="rect">
+            <a:avLst/>
+          </a:prstGeom>
+          <a:noFill/>
+        </p:spPr>
+        <p:txBody>
+          <a:bodyPr wrap="square" rtlCol="0">
+            <a:spAutoFit/>
+          </a:bodyPr>
+          <a:lstStyle/>
+          <a:p>
+            <a:r>
+              <a:rPr lang="nb-NO" sz="7200" dirty="0">
+                <a:latin typeface="Yu Gothic UI Semibold" panose="020B0700000000000000" pitchFamily="34" charset="-128"/>
+                <a:ea typeface="Yu Gothic UI Semibold" panose="020B0700000000000000" pitchFamily="34" charset="-128"/>
+              </a:rPr>
+              <a:t>R</a:t>
+            </a:r>
+            <a:r>
+              <a:rPr lang="nb-NO" sz="4400" dirty="0">
+                <a:latin typeface="Yu Gothic UI Semibold" panose="020B0700000000000000" pitchFamily="34" charset="-128"/>
+                <a:ea typeface="Yu Gothic UI Semibold" panose="020B0700000000000000" pitchFamily="34" charset="-128"/>
+              </a:rPr>
+              <a:t>ead</a:t>
+            </a:r>
+          </a:p>
+          <a:p>
+            <a:endParaRPr lang="nb-NO" dirty="0"/>
+          </a:p>
+        </p:txBody>
+      </p:sp>
+      <p:sp>
+        <p:nvSpPr>
+          <p:cNvPr id="8" name="TekstSylinder 7">
+            <a:extLst>
+              <a:ext uri="{FF2B5EF4-FFF2-40B4-BE49-F238E27FC236}">
+                <a16:creationId xmlns:a16="http://schemas.microsoft.com/office/drawing/2014/main" id="{B58A59A3-D594-5AE3-344B-C457E86A4758}"/>
+              </a:ext>
+            </a:extLst>
+          </p:cNvPr>
+          <p:cNvSpPr txBox="1"/>
+          <p:nvPr/>
+        </p:nvSpPr>
+        <p:spPr>
+          <a:xfrm>
+            <a:off x="1171576" y="-2254956"/>
+            <a:ext cx="2311851" cy="1477328"/>
+          </a:xfrm>
+          <a:prstGeom prst="rect">
+            <a:avLst/>
+          </a:prstGeom>
+          <a:noFill/>
+        </p:spPr>
+        <p:txBody>
+          <a:bodyPr wrap="none" rtlCol="0">
+            <a:spAutoFit/>
+          </a:bodyPr>
+          <a:lstStyle/>
+          <a:p>
+            <a:r>
+              <a:rPr lang="nb-NO" sz="7200" dirty="0">
+                <a:latin typeface="Yu Gothic UI Semibold" panose="020B0700000000000000" pitchFamily="34" charset="-128"/>
+                <a:ea typeface="Yu Gothic UI Semibold" panose="020B0700000000000000" pitchFamily="34" charset="-128"/>
+              </a:rPr>
+              <a:t>U</a:t>
+            </a:r>
+            <a:r>
+              <a:rPr lang="nb-NO" sz="4400" dirty="0">
+                <a:latin typeface="Yu Gothic UI Semibold" panose="020B0700000000000000" pitchFamily="34" charset="-128"/>
+                <a:ea typeface="Yu Gothic UI Semibold" panose="020B0700000000000000" pitchFamily="34" charset="-128"/>
+              </a:rPr>
+              <a:t>pdate</a:t>
+            </a:r>
+          </a:p>
+          <a:p>
+            <a:endParaRPr lang="nb-NO" dirty="0"/>
+          </a:p>
+        </p:txBody>
+      </p:sp>
+      <p:sp>
+        <p:nvSpPr>
+          <p:cNvPr id="10" name="TekstSylinder 9">
+            <a:extLst>
+              <a:ext uri="{FF2B5EF4-FFF2-40B4-BE49-F238E27FC236}">
+                <a16:creationId xmlns:a16="http://schemas.microsoft.com/office/drawing/2014/main" id="{D811A3EB-FFD9-0B28-7CF3-07BC036C67E1}"/>
+              </a:ext>
+            </a:extLst>
+          </p:cNvPr>
+          <p:cNvSpPr txBox="1"/>
+          <p:nvPr/>
+        </p:nvSpPr>
+        <p:spPr>
+          <a:xfrm>
+            <a:off x="1171575" y="-1367314"/>
+            <a:ext cx="2097049" cy="1477328"/>
+          </a:xfrm>
+          <a:prstGeom prst="rect">
+            <a:avLst/>
+          </a:prstGeom>
+          <a:noFill/>
+        </p:spPr>
+        <p:txBody>
+          <a:bodyPr wrap="none" rtlCol="0">
+            <a:spAutoFit/>
+          </a:bodyPr>
+          <a:lstStyle/>
+          <a:p>
+            <a:r>
+              <a:rPr lang="nb-NO" sz="7200" dirty="0" err="1">
+                <a:latin typeface="Yu Gothic UI Semibold" panose="020B0700000000000000" pitchFamily="34" charset="-128"/>
+                <a:ea typeface="Yu Gothic UI Semibold" panose="020B0700000000000000" pitchFamily="34" charset="-128"/>
+              </a:rPr>
+              <a:t>D</a:t>
+            </a:r>
+            <a:r>
+              <a:rPr lang="nb-NO" sz="4400" dirty="0" err="1">
+                <a:latin typeface="Yu Gothic UI Semibold" panose="020B0700000000000000" pitchFamily="34" charset="-128"/>
+                <a:ea typeface="Yu Gothic UI Semibold" panose="020B0700000000000000" pitchFamily="34" charset="-128"/>
+              </a:rPr>
+              <a:t>elete</a:t>
+            </a:r>
+            <a:endParaRPr lang="nb-NO" sz="4400" dirty="0">
+              <a:latin typeface="Yu Gothic UI Semibold" panose="020B0700000000000000" pitchFamily="34" charset="-128"/>
+              <a:ea typeface="Yu Gothic UI Semibold" panose="020B0700000000000000" pitchFamily="34" charset="-128"/>
+            </a:endParaRPr>
+          </a:p>
+          <a:p>
+            <a:endParaRPr lang="nb-NO" dirty="0"/>
+          </a:p>
+        </p:txBody>
+      </p:sp>
+      <p:sp>
+        <p:nvSpPr>
+          <p:cNvPr id="11" name="TekstSylinder 10">
+            <a:extLst>
+              <a:ext uri="{FF2B5EF4-FFF2-40B4-BE49-F238E27FC236}">
+                <a16:creationId xmlns:a16="http://schemas.microsoft.com/office/drawing/2014/main" id="{DAC12EB1-9282-0B3B-97DD-EB87DE75F7A8}"/>
+              </a:ext>
+            </a:extLst>
+          </p:cNvPr>
+          <p:cNvSpPr txBox="1"/>
+          <p:nvPr/>
+        </p:nvSpPr>
+        <p:spPr>
+          <a:xfrm>
+            <a:off x="1171576" y="-3972014"/>
+            <a:ext cx="2661483" cy="1200329"/>
+          </a:xfrm>
+          <a:prstGeom prst="rect">
+            <a:avLst/>
+          </a:prstGeom>
+          <a:noFill/>
+        </p:spPr>
+        <p:txBody>
+          <a:bodyPr wrap="square" rtlCol="0">
+            <a:spAutoFit/>
+          </a:bodyPr>
+          <a:lstStyle/>
+          <a:p>
+            <a:r>
+              <a:rPr lang="nb-NO" sz="7200" dirty="0" err="1">
+                <a:latin typeface="Yu Gothic UI Semibold" panose="020B0700000000000000" pitchFamily="34" charset="-128"/>
+                <a:ea typeface="Yu Gothic UI Semibold" panose="020B0700000000000000" pitchFamily="34" charset="-128"/>
+              </a:rPr>
+              <a:t>C</a:t>
+            </a:r>
+            <a:r>
+              <a:rPr lang="nb-NO" sz="4000" dirty="0" err="1">
+                <a:latin typeface="Yu Gothic UI Semibold" panose="020B0700000000000000" pitchFamily="34" charset="-128"/>
+                <a:ea typeface="Yu Gothic UI Semibold" panose="020B0700000000000000" pitchFamily="34" charset="-128"/>
+              </a:rPr>
+              <a:t>reate</a:t>
+            </a:r>
+            <a:endParaRPr lang="nb-NO" sz="4000" dirty="0"/>
+          </a:p>
+        </p:txBody>
+      </p:sp>
       <p:pic>
         <p:nvPicPr>
-          <p:cNvPr id="5" name="Bilde 4" descr="Et bilde som inneholder Font, skjermbilde, Grafikk, logo&#10;&#10;Automatisk generert beskrivelse">
-            <a:extLst>
-              <a:ext uri="{FF2B5EF4-FFF2-40B4-BE49-F238E27FC236}">
-                <a16:creationId xmlns:a16="http://schemas.microsoft.com/office/drawing/2014/main" id="{5624167A-E9C9-A264-C40A-132FB6DB9252}"/>
+          <p:cNvPr id="4" name="Bilde 3" descr="Et bilde som inneholder Font, Grafikk, skjermbilde, tekst&#10;&#10;Automatisk generert beskrivelse">
+            <a:extLst>
+              <a:ext uri="{FF2B5EF4-FFF2-40B4-BE49-F238E27FC236}">
+                <a16:creationId xmlns:a16="http://schemas.microsoft.com/office/drawing/2014/main" id="{77FCBECF-48C3-1180-FE89-947359824830}"/>
               </a:ext>
             </a:extLst>
           </p:cNvPr>
@@ -6448,7 +6642,7 @@
           <p:nvPr/>
         </p:nvPicPr>
         <p:blipFill>
-          <a:blip r:embed="rId2">
+          <a:blip r:embed="rId3">
             <a:extLst>
               <a:ext uri="{28A0092B-C50C-407E-A947-70E740481C1C}">
                 <a14:useLocalDpi xmlns:a14="http://schemas.microsoft.com/office/drawing/2010/main" val="0"/>
@@ -6461,208 +6655,14 @@
         </p:blipFill>
         <p:spPr>
           <a:xfrm>
-            <a:off x="9696450" y="5233285"/>
-            <a:ext cx="2495550" cy="1991083"/>
+            <a:off x="9618917" y="5095462"/>
+            <a:ext cx="2487740" cy="1801175"/>
           </a:xfrm>
           <a:prstGeom prst="rect">
             <a:avLst/>
           </a:prstGeom>
         </p:spPr>
       </p:pic>
-      <p:sp>
-        <p:nvSpPr>
-          <p:cNvPr id="6" name="TekstSylinder 5">
-            <a:extLst>
-              <a:ext uri="{FF2B5EF4-FFF2-40B4-BE49-F238E27FC236}">
-                <a16:creationId xmlns:a16="http://schemas.microsoft.com/office/drawing/2014/main" id="{C74986E6-DACF-7035-0972-85836707950B}"/>
-              </a:ext>
-            </a:extLst>
-          </p:cNvPr>
-          <p:cNvSpPr txBox="1"/>
-          <p:nvPr/>
-        </p:nvSpPr>
-        <p:spPr>
-          <a:xfrm>
-            <a:off x="1171577" y="-3113485"/>
-            <a:ext cx="2311851" cy="1477328"/>
-          </a:xfrm>
-          <a:prstGeom prst="rect">
-            <a:avLst/>
-          </a:prstGeom>
-          <a:noFill/>
-        </p:spPr>
-        <p:txBody>
-          <a:bodyPr wrap="square" rtlCol="0">
-            <a:spAutoFit/>
-          </a:bodyPr>
-          <a:lstStyle/>
-          <a:p>
-            <a:r>
-              <a:rPr lang="nb-NO" sz="7200" dirty="0">
-                <a:latin typeface="Yu Gothic UI Semibold" panose="020B0700000000000000" pitchFamily="34" charset="-128"/>
-                <a:ea typeface="Yu Gothic UI Semibold" panose="020B0700000000000000" pitchFamily="34" charset="-128"/>
-              </a:rPr>
-              <a:t>R</a:t>
-            </a:r>
-            <a:r>
-              <a:rPr lang="nb-NO" sz="4400" dirty="0">
-                <a:latin typeface="Yu Gothic UI Semibold" panose="020B0700000000000000" pitchFamily="34" charset="-128"/>
-                <a:ea typeface="Yu Gothic UI Semibold" panose="020B0700000000000000" pitchFamily="34" charset="-128"/>
-              </a:rPr>
-              <a:t>ead</a:t>
-            </a:r>
-          </a:p>
-          <a:p>
-            <a:endParaRPr lang="nb-NO" dirty="0"/>
-          </a:p>
-        </p:txBody>
-      </p:sp>
-      <p:sp>
-        <p:nvSpPr>
-          <p:cNvPr id="8" name="TekstSylinder 7">
-            <a:extLst>
-              <a:ext uri="{FF2B5EF4-FFF2-40B4-BE49-F238E27FC236}">
-                <a16:creationId xmlns:a16="http://schemas.microsoft.com/office/drawing/2014/main" id="{B58A59A3-D594-5AE3-344B-C457E86A4758}"/>
-              </a:ext>
-            </a:extLst>
-          </p:cNvPr>
-          <p:cNvSpPr txBox="1"/>
-          <p:nvPr/>
-        </p:nvSpPr>
-        <p:spPr>
-          <a:xfrm>
-            <a:off x="1171576" y="-2254956"/>
-            <a:ext cx="2311851" cy="1477328"/>
-          </a:xfrm>
-          <a:prstGeom prst="rect">
-            <a:avLst/>
-          </a:prstGeom>
-          <a:noFill/>
-        </p:spPr>
-        <p:txBody>
-          <a:bodyPr wrap="none" rtlCol="0">
-            <a:spAutoFit/>
-          </a:bodyPr>
-          <a:lstStyle/>
-          <a:p>
-            <a:r>
-              <a:rPr lang="nb-NO" sz="7200" dirty="0">
-                <a:latin typeface="Yu Gothic UI Semibold" panose="020B0700000000000000" pitchFamily="34" charset="-128"/>
-                <a:ea typeface="Yu Gothic UI Semibold" panose="020B0700000000000000" pitchFamily="34" charset="-128"/>
-              </a:rPr>
-              <a:t>U</a:t>
-            </a:r>
-            <a:r>
-              <a:rPr lang="nb-NO" sz="4400" dirty="0">
-                <a:latin typeface="Yu Gothic UI Semibold" panose="020B0700000000000000" pitchFamily="34" charset="-128"/>
-                <a:ea typeface="Yu Gothic UI Semibold" panose="020B0700000000000000" pitchFamily="34" charset="-128"/>
-              </a:rPr>
-              <a:t>pdate</a:t>
-            </a:r>
-          </a:p>
-          <a:p>
-            <a:endParaRPr lang="nb-NO" dirty="0"/>
-          </a:p>
-        </p:txBody>
-      </p:sp>
-      <p:sp>
-        <p:nvSpPr>
-          <p:cNvPr id="10" name="TekstSylinder 9">
-            <a:extLst>
-              <a:ext uri="{FF2B5EF4-FFF2-40B4-BE49-F238E27FC236}">
-                <a16:creationId xmlns:a16="http://schemas.microsoft.com/office/drawing/2014/main" id="{D811A3EB-FFD9-0B28-7CF3-07BC036C67E1}"/>
-              </a:ext>
-            </a:extLst>
-          </p:cNvPr>
-          <p:cNvSpPr txBox="1"/>
-          <p:nvPr/>
-        </p:nvSpPr>
-        <p:spPr>
-          <a:xfrm>
-            <a:off x="1171575" y="-1367314"/>
-            <a:ext cx="2097049" cy="1477328"/>
-          </a:xfrm>
-          <a:prstGeom prst="rect">
-            <a:avLst/>
-          </a:prstGeom>
-          <a:noFill/>
-        </p:spPr>
-        <p:txBody>
-          <a:bodyPr wrap="none" rtlCol="0">
-            <a:spAutoFit/>
-          </a:bodyPr>
-          <a:lstStyle/>
-          <a:p>
-            <a:r>
-              <a:rPr lang="nb-NO" sz="7200" dirty="0" err="1">
-                <a:latin typeface="Yu Gothic UI Semibold" panose="020B0700000000000000" pitchFamily="34" charset="-128"/>
-                <a:ea typeface="Yu Gothic UI Semibold" panose="020B0700000000000000" pitchFamily="34" charset="-128"/>
-              </a:rPr>
-              <a:t>D</a:t>
-            </a:r>
-            <a:r>
-              <a:rPr lang="nb-NO" sz="4400" dirty="0" err="1">
-                <a:latin typeface="Yu Gothic UI Semibold" panose="020B0700000000000000" pitchFamily="34" charset="-128"/>
-                <a:ea typeface="Yu Gothic UI Semibold" panose="020B0700000000000000" pitchFamily="34" charset="-128"/>
-              </a:rPr>
-              <a:t>elete</a:t>
-            </a:r>
-            <a:endParaRPr lang="nb-NO" sz="4400" dirty="0">
-              <a:latin typeface="Yu Gothic UI Semibold" panose="020B0700000000000000" pitchFamily="34" charset="-128"/>
-              <a:ea typeface="Yu Gothic UI Semibold" panose="020B0700000000000000" pitchFamily="34" charset="-128"/>
-            </a:endParaRPr>
-          </a:p>
-          <a:p>
-            <a:endParaRPr lang="nb-NO" dirty="0"/>
-          </a:p>
-        </p:txBody>
-      </p:sp>
-      <p:sp>
-        <p:nvSpPr>
-          <p:cNvPr id="11" name="TekstSylinder 10">
-            <a:extLst>
-              <a:ext uri="{FF2B5EF4-FFF2-40B4-BE49-F238E27FC236}">
-                <a16:creationId xmlns:a16="http://schemas.microsoft.com/office/drawing/2014/main" id="{DAC12EB1-9282-0B3B-97DD-EB87DE75F7A8}"/>
-              </a:ext>
-            </a:extLst>
-          </p:cNvPr>
-          <p:cNvSpPr txBox="1"/>
-          <p:nvPr/>
-        </p:nvSpPr>
-        <p:spPr>
-          <a:xfrm>
-            <a:off x="1171576" y="-3972014"/>
-            <a:ext cx="2661483" cy="1200329"/>
-          </a:xfrm>
-          <a:prstGeom prst="rect">
-            <a:avLst/>
-          </a:prstGeom>
-          <a:noFill/>
-        </p:spPr>
-        <p:txBody>
-          <a:bodyPr wrap="square" rtlCol="0">
-            <a:spAutoFit/>
-          </a:bodyPr>
-          <a:lstStyle/>
-          <a:p>
-            <a:r>
-              <a:rPr lang="nb-NO" sz="7200" dirty="0" err="1">
-                <a:latin typeface="Yu Gothic UI Semibold" panose="020B0700000000000000" pitchFamily="34" charset="-128"/>
-                <a:ea typeface="Yu Gothic UI Semibold" panose="020B0700000000000000" pitchFamily="34" charset="-128"/>
-              </a:rPr>
-              <a:t>C</a:t>
-            </a:r>
-            <a:r>
-              <a:rPr lang="nb-NO" sz="4000" dirty="0" err="1">
-                <a:latin typeface="Yu Gothic UI Semibold" panose="020B0700000000000000" pitchFamily="34" charset="-128"/>
-                <a:ea typeface="Yu Gothic UI Semibold" panose="020B0700000000000000" pitchFamily="34" charset="-128"/>
-              </a:rPr>
-              <a:t>reate</a:t>
-            </a:r>
-            <a:endParaRPr lang="nb-NO" sz="4000" dirty="0"/>
-          </a:p>
-        </p:txBody>
-      </p:sp>
     </p:spTree>
     <p:extLst>
       <p:ext uri="{BB962C8B-B14F-4D97-AF65-F5344CB8AC3E}">
@@ -7065,42 +7065,6 @@
           </a:p>
         </p:txBody>
       </p:sp>
-      <p:pic>
-        <p:nvPicPr>
-          <p:cNvPr id="4" name="Bilde 3" descr="Et bilde som inneholder Font, skjermbilde, Grafikk, logo&#10;&#10;Automatisk generert beskrivelse">
-            <a:extLst>
-              <a:ext uri="{FF2B5EF4-FFF2-40B4-BE49-F238E27FC236}">
-                <a16:creationId xmlns:a16="http://schemas.microsoft.com/office/drawing/2014/main" id="{708FCC79-D822-14E4-4633-1A03C5636EBE}"/>
-              </a:ext>
-            </a:extLst>
-          </p:cNvPr>
-          <p:cNvPicPr>
-            <a:picLocks noChangeAspect="1"/>
-          </p:cNvPicPr>
-          <p:nvPr/>
-        </p:nvPicPr>
-        <p:blipFill>
-          <a:blip r:embed="rId3">
-            <a:extLst>
-              <a:ext uri="{28A0092B-C50C-407E-A947-70E740481C1C}">
-                <a14:useLocalDpi xmlns:a14="http://schemas.microsoft.com/office/drawing/2010/main" val="0"/>
-              </a:ext>
-            </a:extLst>
-          </a:blip>
-          <a:stretch>
-            <a:fillRect/>
-          </a:stretch>
-        </p:blipFill>
-        <p:spPr>
-          <a:xfrm>
-            <a:off x="9696450" y="5233285"/>
-            <a:ext cx="2495550" cy="1991083"/>
-          </a:xfrm>
-          <a:prstGeom prst="rect">
-            <a:avLst/>
-          </a:prstGeom>
-        </p:spPr>
-      </p:pic>
       <p:sp>
         <p:nvSpPr>
           <p:cNvPr id="8" name="TekstSylinder 7">
@@ -7349,6 +7313,42 @@
           <a:xfrm>
             <a:off x="18367599" y="1966816"/>
             <a:ext cx="5076192" cy="2497009"/>
+          </a:xfrm>
+          <a:prstGeom prst="rect">
+            <a:avLst/>
+          </a:prstGeom>
+        </p:spPr>
+      </p:pic>
+      <p:pic>
+        <p:nvPicPr>
+          <p:cNvPr id="5" name="Bilde 4" descr="Et bilde som inneholder Font, Grafikk, skjermbilde, tekst&#10;&#10;Automatisk generert beskrivelse">
+            <a:extLst>
+              <a:ext uri="{FF2B5EF4-FFF2-40B4-BE49-F238E27FC236}">
+                <a16:creationId xmlns:a16="http://schemas.microsoft.com/office/drawing/2014/main" id="{8395E943-0326-4464-101A-93E26F924356}"/>
+              </a:ext>
+            </a:extLst>
+          </p:cNvPr>
+          <p:cNvPicPr>
+            <a:picLocks noChangeAspect="1"/>
+          </p:cNvPicPr>
+          <p:nvPr/>
+        </p:nvPicPr>
+        <p:blipFill>
+          <a:blip r:embed="rId6">
+            <a:extLst>
+              <a:ext uri="{28A0092B-C50C-407E-A947-70E740481C1C}">
+                <a14:useLocalDpi xmlns:a14="http://schemas.microsoft.com/office/drawing/2010/main" val="0"/>
+              </a:ext>
+            </a:extLst>
+          </a:blip>
+          <a:stretch>
+            <a:fillRect/>
+          </a:stretch>
+        </p:blipFill>
+        <p:spPr>
+          <a:xfrm>
+            <a:off x="9618917" y="5095462"/>
+            <a:ext cx="2487740" cy="1801175"/>
           </a:xfrm>
           <a:prstGeom prst="rect">
             <a:avLst/>
@@ -7610,12 +7610,206 @@
           <a:chExt cx="0" cy="0"/>
         </a:xfrm>
       </p:grpSpPr>
+      <p:sp>
+        <p:nvSpPr>
+          <p:cNvPr id="8" name="TekstSylinder 7">
+            <a:extLst>
+              <a:ext uri="{FF2B5EF4-FFF2-40B4-BE49-F238E27FC236}">
+                <a16:creationId xmlns:a16="http://schemas.microsoft.com/office/drawing/2014/main" id="{CE314272-5618-A5AE-3EF3-DE2433140CE2}"/>
+              </a:ext>
+            </a:extLst>
+          </p:cNvPr>
+          <p:cNvSpPr txBox="1"/>
+          <p:nvPr/>
+        </p:nvSpPr>
+        <p:spPr>
+          <a:xfrm>
+            <a:off x="-2579692" y="1838415"/>
+            <a:ext cx="2311851" cy="1477328"/>
+          </a:xfrm>
+          <a:prstGeom prst="rect">
+            <a:avLst/>
+          </a:prstGeom>
+          <a:noFill/>
+        </p:spPr>
+        <p:txBody>
+          <a:bodyPr wrap="square" rtlCol="0">
+            <a:spAutoFit/>
+          </a:bodyPr>
+          <a:lstStyle/>
+          <a:p>
+            <a:r>
+              <a:rPr lang="nb-NO" sz="7200" dirty="0">
+                <a:latin typeface="Yu Gothic UI Semibold" panose="020B0700000000000000" pitchFamily="34" charset="-128"/>
+                <a:ea typeface="Yu Gothic UI Semibold" panose="020B0700000000000000" pitchFamily="34" charset="-128"/>
+              </a:rPr>
+              <a:t>R</a:t>
+            </a:r>
+            <a:r>
+              <a:rPr lang="nb-NO" sz="4400" dirty="0">
+                <a:latin typeface="Yu Gothic UI Semibold" panose="020B0700000000000000" pitchFamily="34" charset="-128"/>
+                <a:ea typeface="Yu Gothic UI Semibold" panose="020B0700000000000000" pitchFamily="34" charset="-128"/>
+              </a:rPr>
+              <a:t>ead</a:t>
+            </a:r>
+          </a:p>
+          <a:p>
+            <a:endParaRPr lang="nb-NO" dirty="0"/>
+          </a:p>
+        </p:txBody>
+      </p:sp>
+      <p:sp>
+        <p:nvSpPr>
+          <p:cNvPr id="9" name="TekstSylinder 8">
+            <a:extLst>
+              <a:ext uri="{FF2B5EF4-FFF2-40B4-BE49-F238E27FC236}">
+                <a16:creationId xmlns:a16="http://schemas.microsoft.com/office/drawing/2014/main" id="{BEDC57DB-2F8F-47E2-3742-6CCCD51D93B3}"/>
+              </a:ext>
+            </a:extLst>
+          </p:cNvPr>
+          <p:cNvSpPr txBox="1"/>
+          <p:nvPr/>
+        </p:nvSpPr>
+        <p:spPr>
+          <a:xfrm>
+            <a:off x="-2579693" y="2696944"/>
+            <a:ext cx="2311851" cy="1477328"/>
+          </a:xfrm>
+          <a:prstGeom prst="rect">
+            <a:avLst/>
+          </a:prstGeom>
+          <a:noFill/>
+        </p:spPr>
+        <p:txBody>
+          <a:bodyPr wrap="none" rtlCol="0">
+            <a:spAutoFit/>
+          </a:bodyPr>
+          <a:lstStyle/>
+          <a:p>
+            <a:r>
+              <a:rPr lang="nb-NO" sz="7200" dirty="0">
+                <a:latin typeface="Yu Gothic UI Semibold" panose="020B0700000000000000" pitchFamily="34" charset="-128"/>
+                <a:ea typeface="Yu Gothic UI Semibold" panose="020B0700000000000000" pitchFamily="34" charset="-128"/>
+              </a:rPr>
+              <a:t>U</a:t>
+            </a:r>
+            <a:r>
+              <a:rPr lang="nb-NO" sz="4400" dirty="0">
+                <a:latin typeface="Yu Gothic UI Semibold" panose="020B0700000000000000" pitchFamily="34" charset="-128"/>
+                <a:ea typeface="Yu Gothic UI Semibold" panose="020B0700000000000000" pitchFamily="34" charset="-128"/>
+              </a:rPr>
+              <a:t>pdate</a:t>
+            </a:r>
+          </a:p>
+          <a:p>
+            <a:endParaRPr lang="nb-NO" dirty="0"/>
+          </a:p>
+        </p:txBody>
+      </p:sp>
+      <p:sp>
+        <p:nvSpPr>
+          <p:cNvPr id="10" name="TekstSylinder 9">
+            <a:extLst>
+              <a:ext uri="{FF2B5EF4-FFF2-40B4-BE49-F238E27FC236}">
+                <a16:creationId xmlns:a16="http://schemas.microsoft.com/office/drawing/2014/main" id="{1A7DAA38-29E5-ADA5-05BD-B759A504B5C0}"/>
+              </a:ext>
+            </a:extLst>
+          </p:cNvPr>
+          <p:cNvSpPr txBox="1"/>
+          <p:nvPr/>
+        </p:nvSpPr>
+        <p:spPr>
+          <a:xfrm>
+            <a:off x="-2579694" y="3584586"/>
+            <a:ext cx="2097049" cy="1477328"/>
+          </a:xfrm>
+          <a:prstGeom prst="rect">
+            <a:avLst/>
+          </a:prstGeom>
+          <a:noFill/>
+        </p:spPr>
+        <p:txBody>
+          <a:bodyPr wrap="none" rtlCol="0">
+            <a:spAutoFit/>
+          </a:bodyPr>
+          <a:lstStyle/>
+          <a:p>
+            <a:r>
+              <a:rPr lang="nb-NO" sz="7200" dirty="0" err="1">
+                <a:latin typeface="Yu Gothic UI Semibold" panose="020B0700000000000000" pitchFamily="34" charset="-128"/>
+                <a:ea typeface="Yu Gothic UI Semibold" panose="020B0700000000000000" pitchFamily="34" charset="-128"/>
+              </a:rPr>
+              <a:t>D</a:t>
+            </a:r>
+            <a:r>
+              <a:rPr lang="nb-NO" sz="4400" dirty="0" err="1">
+                <a:latin typeface="Yu Gothic UI Semibold" panose="020B0700000000000000" pitchFamily="34" charset="-128"/>
+                <a:ea typeface="Yu Gothic UI Semibold" panose="020B0700000000000000" pitchFamily="34" charset="-128"/>
+              </a:rPr>
+              <a:t>elete</a:t>
+            </a:r>
+            <a:endParaRPr lang="nb-NO" sz="4400" dirty="0">
+              <a:latin typeface="Yu Gothic UI Semibold" panose="020B0700000000000000" pitchFamily="34" charset="-128"/>
+              <a:ea typeface="Yu Gothic UI Semibold" panose="020B0700000000000000" pitchFamily="34" charset="-128"/>
+            </a:endParaRPr>
+          </a:p>
+          <a:p>
+            <a:endParaRPr lang="nb-NO" dirty="0"/>
+          </a:p>
+        </p:txBody>
+      </p:sp>
+      <p:sp>
+        <p:nvSpPr>
+          <p:cNvPr id="13" name="TekstSylinder 12">
+            <a:extLst>
+              <a:ext uri="{FF2B5EF4-FFF2-40B4-BE49-F238E27FC236}">
+                <a16:creationId xmlns:a16="http://schemas.microsoft.com/office/drawing/2014/main" id="{4B1932FB-6C9A-6B70-A523-0092AD951AF9}"/>
+              </a:ext>
+            </a:extLst>
+          </p:cNvPr>
+          <p:cNvSpPr txBox="1"/>
+          <p:nvPr/>
+        </p:nvSpPr>
+        <p:spPr>
+          <a:xfrm>
+            <a:off x="1116007" y="208361"/>
+            <a:ext cx="2661483" cy="1200329"/>
+          </a:xfrm>
+          <a:prstGeom prst="rect">
+            <a:avLst/>
+          </a:prstGeom>
+          <a:noFill/>
+        </p:spPr>
+        <p:txBody>
+          <a:bodyPr wrap="square" rtlCol="0">
+            <a:spAutoFit/>
+          </a:bodyPr>
+          <a:lstStyle/>
+          <a:p>
+            <a:r>
+              <a:rPr lang="nb-NO" sz="7200" dirty="0" err="1">
+                <a:latin typeface="Yu Gothic UI Semibold" panose="020B0700000000000000" pitchFamily="34" charset="-128"/>
+                <a:ea typeface="Yu Gothic UI Semibold" panose="020B0700000000000000" pitchFamily="34" charset="-128"/>
+              </a:rPr>
+              <a:t>C</a:t>
+            </a:r>
+            <a:r>
+              <a:rPr lang="nb-NO" sz="4000" dirty="0" err="1">
+                <a:latin typeface="Yu Gothic UI Semibold" panose="020B0700000000000000" pitchFamily="34" charset="-128"/>
+                <a:ea typeface="Yu Gothic UI Semibold" panose="020B0700000000000000" pitchFamily="34" charset="-128"/>
+              </a:rPr>
+              <a:t>reate</a:t>
+            </a:r>
+            <a:endParaRPr lang="nb-NO" sz="4000" dirty="0"/>
+          </a:p>
+        </p:txBody>
+      </p:sp>
       <p:pic>
         <p:nvPicPr>
-          <p:cNvPr id="4" name="Bilde 3" descr="Et bilde som inneholder Font, skjermbilde, Grafikk, logo&#10;&#10;Automatisk generert beskrivelse">
-            <a:extLst>
-              <a:ext uri="{FF2B5EF4-FFF2-40B4-BE49-F238E27FC236}">
-                <a16:creationId xmlns:a16="http://schemas.microsoft.com/office/drawing/2014/main" id="{708FCC79-D822-14E4-4633-1A03C5636EBE}"/>
+          <p:cNvPr id="6" name="Bilde 5">
+            <a:extLst>
+              <a:ext uri="{FF2B5EF4-FFF2-40B4-BE49-F238E27FC236}">
+                <a16:creationId xmlns:a16="http://schemas.microsoft.com/office/drawing/2014/main" id="{51E3D04B-B234-D1B1-0703-EAFFE34A7AAF}"/>
               </a:ext>
             </a:extLst>
           </p:cNvPr>
@@ -7625,21 +7819,15 @@
           <p:nvPr/>
         </p:nvPicPr>
         <p:blipFill>
-          <a:blip r:embed="rId2">
-            <a:extLst>
-              <a:ext uri="{28A0092B-C50C-407E-A947-70E740481C1C}">
-                <a14:useLocalDpi xmlns:a14="http://schemas.microsoft.com/office/drawing/2010/main" val="0"/>
-              </a:ext>
-            </a:extLst>
-          </a:blip>
+          <a:blip r:embed="rId2"/>
           <a:stretch>
             <a:fillRect/>
           </a:stretch>
         </p:blipFill>
         <p:spPr>
           <a:xfrm>
-            <a:off x="9696450" y="5233285"/>
-            <a:ext cx="2495550" cy="1991083"/>
+            <a:off x="1014411" y="1938749"/>
+            <a:ext cx="5081588" cy="2497010"/>
           </a:xfrm>
           <a:prstGeom prst="rect">
             <a:avLst/>
@@ -7648,10 +7836,10 @@
       </p:pic>
       <p:sp>
         <p:nvSpPr>
-          <p:cNvPr id="8" name="TekstSylinder 7">
-            <a:extLst>
-              <a:ext uri="{FF2B5EF4-FFF2-40B4-BE49-F238E27FC236}">
-                <a16:creationId xmlns:a16="http://schemas.microsoft.com/office/drawing/2014/main" id="{CE314272-5618-A5AE-3EF3-DE2433140CE2}"/>
+          <p:cNvPr id="11" name="TekstSylinder 10">
+            <a:extLst>
+              <a:ext uri="{FF2B5EF4-FFF2-40B4-BE49-F238E27FC236}">
+                <a16:creationId xmlns:a16="http://schemas.microsoft.com/office/drawing/2014/main" id="{5703BF19-3BEA-B550-54B7-DF066A7238F8}"/>
               </a:ext>
             </a:extLst>
           </p:cNvPr>
@@ -7660,7 +7848,7 @@
         </p:nvSpPr>
         <p:spPr>
           <a:xfrm>
-            <a:off x="-2579692" y="1838415"/>
+            <a:off x="-1638571" y="208361"/>
             <a:ext cx="2311851" cy="1477328"/>
           </a:xfrm>
           <a:prstGeom prst="rect">
@@ -7694,158 +7882,12 @@
           </a:p>
         </p:txBody>
       </p:sp>
-      <p:sp>
-        <p:nvSpPr>
-          <p:cNvPr id="9" name="TekstSylinder 8">
-            <a:extLst>
-              <a:ext uri="{FF2B5EF4-FFF2-40B4-BE49-F238E27FC236}">
-                <a16:creationId xmlns:a16="http://schemas.microsoft.com/office/drawing/2014/main" id="{BEDC57DB-2F8F-47E2-3742-6CCCD51D93B3}"/>
-              </a:ext>
-            </a:extLst>
-          </p:cNvPr>
-          <p:cNvSpPr txBox="1"/>
-          <p:nvPr/>
-        </p:nvSpPr>
-        <p:spPr>
-          <a:xfrm>
-            <a:off x="-2579693" y="2696944"/>
-            <a:ext cx="2311851" cy="1477328"/>
-          </a:xfrm>
-          <a:prstGeom prst="rect">
-            <a:avLst/>
-          </a:prstGeom>
-          <a:noFill/>
-        </p:spPr>
-        <p:txBody>
-          <a:bodyPr wrap="none" rtlCol="0">
-            <a:spAutoFit/>
-          </a:bodyPr>
-          <a:lstStyle/>
-          <a:p>
-            <a:r>
-              <a:rPr lang="nb-NO" sz="7200" dirty="0">
-                <a:latin typeface="Yu Gothic UI Semibold" panose="020B0700000000000000" pitchFamily="34" charset="-128"/>
-                <a:ea typeface="Yu Gothic UI Semibold" panose="020B0700000000000000" pitchFamily="34" charset="-128"/>
-              </a:rPr>
-              <a:t>U</a:t>
-            </a:r>
-            <a:r>
-              <a:rPr lang="nb-NO" sz="4400" dirty="0">
-                <a:latin typeface="Yu Gothic UI Semibold" panose="020B0700000000000000" pitchFamily="34" charset="-128"/>
-                <a:ea typeface="Yu Gothic UI Semibold" panose="020B0700000000000000" pitchFamily="34" charset="-128"/>
-              </a:rPr>
-              <a:t>pdate</a:t>
-            </a:r>
-          </a:p>
-          <a:p>
-            <a:endParaRPr lang="nb-NO" dirty="0"/>
-          </a:p>
-        </p:txBody>
-      </p:sp>
-      <p:sp>
-        <p:nvSpPr>
-          <p:cNvPr id="10" name="TekstSylinder 9">
-            <a:extLst>
-              <a:ext uri="{FF2B5EF4-FFF2-40B4-BE49-F238E27FC236}">
-                <a16:creationId xmlns:a16="http://schemas.microsoft.com/office/drawing/2014/main" id="{1A7DAA38-29E5-ADA5-05BD-B759A504B5C0}"/>
-              </a:ext>
-            </a:extLst>
-          </p:cNvPr>
-          <p:cNvSpPr txBox="1"/>
-          <p:nvPr/>
-        </p:nvSpPr>
-        <p:spPr>
-          <a:xfrm>
-            <a:off x="-2579694" y="3584586"/>
-            <a:ext cx="2097049" cy="1477328"/>
-          </a:xfrm>
-          <a:prstGeom prst="rect">
-            <a:avLst/>
-          </a:prstGeom>
-          <a:noFill/>
-        </p:spPr>
-        <p:txBody>
-          <a:bodyPr wrap="none" rtlCol="0">
-            <a:spAutoFit/>
-          </a:bodyPr>
-          <a:lstStyle/>
-          <a:p>
-            <a:r>
-              <a:rPr lang="nb-NO" sz="7200" dirty="0" err="1">
-                <a:latin typeface="Yu Gothic UI Semibold" panose="020B0700000000000000" pitchFamily="34" charset="-128"/>
-                <a:ea typeface="Yu Gothic UI Semibold" panose="020B0700000000000000" pitchFamily="34" charset="-128"/>
-              </a:rPr>
-              <a:t>D</a:t>
-            </a:r>
-            <a:r>
-              <a:rPr lang="nb-NO" sz="4400" dirty="0" err="1">
-                <a:latin typeface="Yu Gothic UI Semibold" panose="020B0700000000000000" pitchFamily="34" charset="-128"/>
-                <a:ea typeface="Yu Gothic UI Semibold" panose="020B0700000000000000" pitchFamily="34" charset="-128"/>
-              </a:rPr>
-              <a:t>elete</a:t>
-            </a:r>
-            <a:endParaRPr lang="nb-NO" sz="4400" dirty="0">
-              <a:latin typeface="Yu Gothic UI Semibold" panose="020B0700000000000000" pitchFamily="34" charset="-128"/>
-              <a:ea typeface="Yu Gothic UI Semibold" panose="020B0700000000000000" pitchFamily="34" charset="-128"/>
-            </a:endParaRPr>
-          </a:p>
-          <a:p>
-            <a:endParaRPr lang="nb-NO" dirty="0"/>
-          </a:p>
-        </p:txBody>
-      </p:sp>
-      <p:sp>
-        <p:nvSpPr>
-          <p:cNvPr id="13" name="TekstSylinder 12">
-            <a:extLst>
-              <a:ext uri="{FF2B5EF4-FFF2-40B4-BE49-F238E27FC236}">
-                <a16:creationId xmlns:a16="http://schemas.microsoft.com/office/drawing/2014/main" id="{4B1932FB-6C9A-6B70-A523-0092AD951AF9}"/>
-              </a:ext>
-            </a:extLst>
-          </p:cNvPr>
-          <p:cNvSpPr txBox="1"/>
-          <p:nvPr/>
-        </p:nvSpPr>
-        <p:spPr>
-          <a:xfrm>
-            <a:off x="1116007" y="208361"/>
-            <a:ext cx="2661483" cy="1200329"/>
-          </a:xfrm>
-          <a:prstGeom prst="rect">
-            <a:avLst/>
-          </a:prstGeom>
-          <a:noFill/>
-        </p:spPr>
-        <p:txBody>
-          <a:bodyPr wrap="square" rtlCol="0">
-            <a:spAutoFit/>
-          </a:bodyPr>
-          <a:lstStyle/>
-          <a:p>
-            <a:r>
-              <a:rPr lang="nb-NO" sz="7200" dirty="0" err="1">
-                <a:latin typeface="Yu Gothic UI Semibold" panose="020B0700000000000000" pitchFamily="34" charset="-128"/>
-                <a:ea typeface="Yu Gothic UI Semibold" panose="020B0700000000000000" pitchFamily="34" charset="-128"/>
-              </a:rPr>
-              <a:t>C</a:t>
-            </a:r>
-            <a:r>
-              <a:rPr lang="nb-NO" sz="4000" dirty="0" err="1">
-                <a:latin typeface="Yu Gothic UI Semibold" panose="020B0700000000000000" pitchFamily="34" charset="-128"/>
-                <a:ea typeface="Yu Gothic UI Semibold" panose="020B0700000000000000" pitchFamily="34" charset="-128"/>
-              </a:rPr>
-              <a:t>reate</a:t>
-            </a:r>
-            <a:endParaRPr lang="nb-NO" sz="4000" dirty="0"/>
-          </a:p>
-        </p:txBody>
-      </p:sp>
       <p:pic>
         <p:nvPicPr>
-          <p:cNvPr id="6" name="Bilde 5">
-            <a:extLst>
-              <a:ext uri="{FF2B5EF4-FFF2-40B4-BE49-F238E27FC236}">
-                <a16:creationId xmlns:a16="http://schemas.microsoft.com/office/drawing/2014/main" id="{51E3D04B-B234-D1B1-0703-EAFFE34A7AAF}"/>
+          <p:cNvPr id="15" name="Bilde 14">
+            <a:extLst>
+              <a:ext uri="{FF2B5EF4-FFF2-40B4-BE49-F238E27FC236}">
+                <a16:creationId xmlns:a16="http://schemas.microsoft.com/office/drawing/2014/main" id="{FA9F4F1E-B0D5-2C15-8D0E-5BBF39DC4E44}"/>
               </a:ext>
             </a:extLst>
           </p:cNvPr>
@@ -7862,68 +7904,20 @@
         </p:blipFill>
         <p:spPr>
           <a:xfrm>
-            <a:off x="1014411" y="1938749"/>
-            <a:ext cx="5081588" cy="2497010"/>
+            <a:off x="12579350" y="1685689"/>
+            <a:ext cx="5353033" cy="3254581"/>
           </a:xfrm>
           <a:prstGeom prst="rect">
             <a:avLst/>
           </a:prstGeom>
         </p:spPr>
       </p:pic>
-      <p:sp>
-        <p:nvSpPr>
-          <p:cNvPr id="11" name="TekstSylinder 10">
-            <a:extLst>
-              <a:ext uri="{FF2B5EF4-FFF2-40B4-BE49-F238E27FC236}">
-                <a16:creationId xmlns:a16="http://schemas.microsoft.com/office/drawing/2014/main" id="{5703BF19-3BEA-B550-54B7-DF066A7238F8}"/>
-              </a:ext>
-            </a:extLst>
-          </p:cNvPr>
-          <p:cNvSpPr txBox="1"/>
-          <p:nvPr/>
-        </p:nvSpPr>
-        <p:spPr>
-          <a:xfrm>
-            <a:off x="-1638571" y="208361"/>
-            <a:ext cx="2311851" cy="1477328"/>
-          </a:xfrm>
-          <a:prstGeom prst="rect">
-            <a:avLst/>
-          </a:prstGeom>
-          <a:noFill/>
-        </p:spPr>
-        <p:txBody>
-          <a:bodyPr wrap="square" rtlCol="0">
-            <a:spAutoFit/>
-          </a:bodyPr>
-          <a:lstStyle/>
-          <a:p>
-            <a:r>
-              <a:rPr lang="nb-NO" sz="7200" dirty="0">
-                <a:latin typeface="Yu Gothic UI Semibold" panose="020B0700000000000000" pitchFamily="34" charset="-128"/>
-                <a:ea typeface="Yu Gothic UI Semibold" panose="020B0700000000000000" pitchFamily="34" charset="-128"/>
-              </a:rPr>
-              <a:t>R</a:t>
-            </a:r>
-            <a:r>
-              <a:rPr lang="nb-NO" sz="4400" dirty="0">
-                <a:latin typeface="Yu Gothic UI Semibold" panose="020B0700000000000000" pitchFamily="34" charset="-128"/>
-                <a:ea typeface="Yu Gothic UI Semibold" panose="020B0700000000000000" pitchFamily="34" charset="-128"/>
-              </a:rPr>
-              <a:t>ead</a:t>
-            </a:r>
-          </a:p>
-          <a:p>
-            <a:endParaRPr lang="nb-NO" dirty="0"/>
-          </a:p>
-        </p:txBody>
-      </p:sp>
       <p:pic>
         <p:nvPicPr>
-          <p:cNvPr id="15" name="Bilde 14">
-            <a:extLst>
-              <a:ext uri="{FF2B5EF4-FFF2-40B4-BE49-F238E27FC236}">
-                <a16:creationId xmlns:a16="http://schemas.microsoft.com/office/drawing/2014/main" id="{FA9F4F1E-B0D5-2C15-8D0E-5BBF39DC4E44}"/>
+          <p:cNvPr id="17" name="Bilde 16">
+            <a:extLst>
+              <a:ext uri="{FF2B5EF4-FFF2-40B4-BE49-F238E27FC236}">
+                <a16:creationId xmlns:a16="http://schemas.microsoft.com/office/drawing/2014/main" id="{F3760F6D-56DF-14C8-6C2C-97063851B205}"/>
               </a:ext>
             </a:extLst>
           </p:cNvPr>
@@ -7940,8 +7934,8 @@
         </p:blipFill>
         <p:spPr>
           <a:xfrm>
-            <a:off x="12579350" y="1685689"/>
-            <a:ext cx="5353033" cy="3254581"/>
+            <a:off x="6487050" y="1938750"/>
+            <a:ext cx="5076192" cy="2497009"/>
           </a:xfrm>
           <a:prstGeom prst="rect">
             <a:avLst/>
@@ -7950,10 +7944,10 @@
       </p:pic>
       <p:pic>
         <p:nvPicPr>
-          <p:cNvPr id="17" name="Bilde 16">
-            <a:extLst>
-              <a:ext uri="{FF2B5EF4-FFF2-40B4-BE49-F238E27FC236}">
-                <a16:creationId xmlns:a16="http://schemas.microsoft.com/office/drawing/2014/main" id="{F3760F6D-56DF-14C8-6C2C-97063851B205}"/>
+          <p:cNvPr id="19" name="Bilde 18">
+            <a:extLst>
+              <a:ext uri="{FF2B5EF4-FFF2-40B4-BE49-F238E27FC236}">
+                <a16:creationId xmlns:a16="http://schemas.microsoft.com/office/drawing/2014/main" id="{52FEF64A-6A90-D84B-CE2D-6A9372E63640}"/>
               </a:ext>
             </a:extLst>
           </p:cNvPr>
@@ -7970,8 +7964,8 @@
         </p:blipFill>
         <p:spPr>
           <a:xfrm>
-            <a:off x="6487050" y="1938750"/>
-            <a:ext cx="5076192" cy="2497009"/>
+            <a:off x="17932383" y="1591154"/>
+            <a:ext cx="6415315" cy="3349116"/>
           </a:xfrm>
           <a:prstGeom prst="rect">
             <a:avLst/>
@@ -7980,10 +7974,10 @@
       </p:pic>
       <p:pic>
         <p:nvPicPr>
-          <p:cNvPr id="19" name="Bilde 18">
-            <a:extLst>
-              <a:ext uri="{FF2B5EF4-FFF2-40B4-BE49-F238E27FC236}">
-                <a16:creationId xmlns:a16="http://schemas.microsoft.com/office/drawing/2014/main" id="{52FEF64A-6A90-D84B-CE2D-6A9372E63640}"/>
+          <p:cNvPr id="2" name="Bilde 1" descr="Et bilde som inneholder Font, Grafikk, skjermbilde, tekst&#10;&#10;Automatisk generert beskrivelse">
+            <a:extLst>
+              <a:ext uri="{FF2B5EF4-FFF2-40B4-BE49-F238E27FC236}">
+                <a16:creationId xmlns:a16="http://schemas.microsoft.com/office/drawing/2014/main" id="{AEFF8EB2-DD1C-0BF6-FDFA-877A07A8D586}"/>
               </a:ext>
             </a:extLst>
           </p:cNvPr>
@@ -7993,15 +7987,21 @@
           <p:nvPr/>
         </p:nvPicPr>
         <p:blipFill>
-          <a:blip r:embed="rId6"/>
+          <a:blip r:embed="rId6">
+            <a:extLst>
+              <a:ext uri="{28A0092B-C50C-407E-A947-70E740481C1C}">
+                <a14:useLocalDpi xmlns:a14="http://schemas.microsoft.com/office/drawing/2010/main" val="0"/>
+              </a:ext>
+            </a:extLst>
+          </a:blip>
           <a:stretch>
             <a:fillRect/>
           </a:stretch>
         </p:blipFill>
         <p:spPr>
           <a:xfrm>
-            <a:off x="17932383" y="1591154"/>
-            <a:ext cx="6415315" cy="3349116"/>
+            <a:off x="9618917" y="5095462"/>
+            <a:ext cx="2487740" cy="1801175"/>
           </a:xfrm>
           <a:prstGeom prst="rect">
             <a:avLst/>
@@ -8086,42 +8086,6 @@
           </a:prstGeom>
         </p:spPr>
       </p:pic>
-      <p:pic>
-        <p:nvPicPr>
-          <p:cNvPr id="4" name="Bilde 3" descr="Et bilde som inneholder Font, skjermbilde, Grafikk, logo&#10;&#10;Automatisk generert beskrivelse">
-            <a:extLst>
-              <a:ext uri="{FF2B5EF4-FFF2-40B4-BE49-F238E27FC236}">
-                <a16:creationId xmlns:a16="http://schemas.microsoft.com/office/drawing/2014/main" id="{708FCC79-D822-14E4-4633-1A03C5636EBE}"/>
-              </a:ext>
-            </a:extLst>
-          </p:cNvPr>
-          <p:cNvPicPr>
-            <a:picLocks noChangeAspect="1"/>
-          </p:cNvPicPr>
-          <p:nvPr/>
-        </p:nvPicPr>
-        <p:blipFill>
-          <a:blip r:embed="rId2">
-            <a:extLst>
-              <a:ext uri="{28A0092B-C50C-407E-A947-70E740481C1C}">
-                <a14:useLocalDpi xmlns:a14="http://schemas.microsoft.com/office/drawing/2010/main" val="0"/>
-              </a:ext>
-            </a:extLst>
-          </a:blip>
-          <a:stretch>
-            <a:fillRect/>
-          </a:stretch>
-        </p:blipFill>
-        <p:spPr>
-          <a:xfrm>
-            <a:off x="9696450" y="5233285"/>
-            <a:ext cx="2495550" cy="1991083"/>
-          </a:xfrm>
-          <a:prstGeom prst="rect">
-            <a:avLst/>
-          </a:prstGeom>
-        </p:spPr>
-      </p:pic>
       <p:sp>
         <p:nvSpPr>
           <p:cNvPr id="9" name="TekstSylinder 8">
@@ -8740,6 +8704,42 @@
           </a:fontRef>
         </p:style>
       </p:cxnSp>
+      <p:pic>
+        <p:nvPicPr>
+          <p:cNvPr id="19" name="Bilde 18" descr="Et bilde som inneholder Font, Grafikk, skjermbilde, tekst&#10;&#10;Automatisk generert beskrivelse">
+            <a:extLst>
+              <a:ext uri="{FF2B5EF4-FFF2-40B4-BE49-F238E27FC236}">
+                <a16:creationId xmlns:a16="http://schemas.microsoft.com/office/drawing/2014/main" id="{9CD27C0E-B3F6-DBBD-CC27-BEA4ADD57BC3}"/>
+              </a:ext>
+            </a:extLst>
+          </p:cNvPr>
+          <p:cNvPicPr>
+            <a:picLocks noChangeAspect="1"/>
+          </p:cNvPicPr>
+          <p:nvPr/>
+        </p:nvPicPr>
+        <p:blipFill>
+          <a:blip r:embed="rId9">
+            <a:extLst>
+              <a:ext uri="{28A0092B-C50C-407E-A947-70E740481C1C}">
+                <a14:useLocalDpi xmlns:a14="http://schemas.microsoft.com/office/drawing/2010/main" val="0"/>
+              </a:ext>
+            </a:extLst>
+          </a:blip>
+          <a:stretch>
+            <a:fillRect/>
+          </a:stretch>
+        </p:blipFill>
+        <p:spPr>
+          <a:xfrm>
+            <a:off x="9618917" y="5095462"/>
+            <a:ext cx="2487740" cy="1801175"/>
+          </a:xfrm>
+          <a:prstGeom prst="rect">
+            <a:avLst/>
+          </a:prstGeom>
+        </p:spPr>
+      </p:pic>
     </p:spTree>
     <p:extLst>
       <p:ext uri="{BB962C8B-B14F-4D97-AF65-F5344CB8AC3E}">
@@ -8782,12 +8782,260 @@
           <a:chExt cx="0" cy="0"/>
         </a:xfrm>
       </p:grpSpPr>
+      <p:sp>
+        <p:nvSpPr>
+          <p:cNvPr id="9" name="TekstSylinder 8">
+            <a:extLst>
+              <a:ext uri="{FF2B5EF4-FFF2-40B4-BE49-F238E27FC236}">
+                <a16:creationId xmlns:a16="http://schemas.microsoft.com/office/drawing/2014/main" id="{BEDC57DB-2F8F-47E2-3742-6CCCD51D93B3}"/>
+              </a:ext>
+            </a:extLst>
+          </p:cNvPr>
+          <p:cNvSpPr txBox="1"/>
+          <p:nvPr/>
+        </p:nvSpPr>
+        <p:spPr>
+          <a:xfrm>
+            <a:off x="-2579693" y="2696944"/>
+            <a:ext cx="2311851" cy="1477328"/>
+          </a:xfrm>
+          <a:prstGeom prst="rect">
+            <a:avLst/>
+          </a:prstGeom>
+          <a:noFill/>
+        </p:spPr>
+        <p:txBody>
+          <a:bodyPr wrap="none" rtlCol="0">
+            <a:spAutoFit/>
+          </a:bodyPr>
+          <a:lstStyle/>
+          <a:p>
+            <a:r>
+              <a:rPr lang="nb-NO" sz="7200" dirty="0">
+                <a:latin typeface="Yu Gothic UI Semibold" panose="020B0700000000000000" pitchFamily="34" charset="-128"/>
+                <a:ea typeface="Yu Gothic UI Semibold" panose="020B0700000000000000" pitchFamily="34" charset="-128"/>
+              </a:rPr>
+              <a:t>U</a:t>
+            </a:r>
+            <a:r>
+              <a:rPr lang="nb-NO" sz="4400" dirty="0">
+                <a:latin typeface="Yu Gothic UI Semibold" panose="020B0700000000000000" pitchFamily="34" charset="-128"/>
+                <a:ea typeface="Yu Gothic UI Semibold" panose="020B0700000000000000" pitchFamily="34" charset="-128"/>
+              </a:rPr>
+              <a:t>pdate</a:t>
+            </a:r>
+          </a:p>
+          <a:p>
+            <a:endParaRPr lang="nb-NO" dirty="0"/>
+          </a:p>
+        </p:txBody>
+      </p:sp>
+      <p:sp>
+        <p:nvSpPr>
+          <p:cNvPr id="10" name="TekstSylinder 9">
+            <a:extLst>
+              <a:ext uri="{FF2B5EF4-FFF2-40B4-BE49-F238E27FC236}">
+                <a16:creationId xmlns:a16="http://schemas.microsoft.com/office/drawing/2014/main" id="{1A7DAA38-29E5-ADA5-05BD-B759A504B5C0}"/>
+              </a:ext>
+            </a:extLst>
+          </p:cNvPr>
+          <p:cNvSpPr txBox="1"/>
+          <p:nvPr/>
+        </p:nvSpPr>
+        <p:spPr>
+          <a:xfrm>
+            <a:off x="-2579694" y="3584586"/>
+            <a:ext cx="2097049" cy="1477328"/>
+          </a:xfrm>
+          <a:prstGeom prst="rect">
+            <a:avLst/>
+          </a:prstGeom>
+          <a:noFill/>
+        </p:spPr>
+        <p:txBody>
+          <a:bodyPr wrap="none" rtlCol="0">
+            <a:spAutoFit/>
+          </a:bodyPr>
+          <a:lstStyle/>
+          <a:p>
+            <a:r>
+              <a:rPr lang="nb-NO" sz="7200" dirty="0" err="1">
+                <a:latin typeface="Yu Gothic UI Semibold" panose="020B0700000000000000" pitchFamily="34" charset="-128"/>
+                <a:ea typeface="Yu Gothic UI Semibold" panose="020B0700000000000000" pitchFamily="34" charset="-128"/>
+              </a:rPr>
+              <a:t>D</a:t>
+            </a:r>
+            <a:r>
+              <a:rPr lang="nb-NO" sz="4400" dirty="0" err="1">
+                <a:latin typeface="Yu Gothic UI Semibold" panose="020B0700000000000000" pitchFamily="34" charset="-128"/>
+                <a:ea typeface="Yu Gothic UI Semibold" panose="020B0700000000000000" pitchFamily="34" charset="-128"/>
+              </a:rPr>
+              <a:t>elete</a:t>
+            </a:r>
+            <a:endParaRPr lang="nb-NO" sz="4400" dirty="0">
+              <a:latin typeface="Yu Gothic UI Semibold" panose="020B0700000000000000" pitchFamily="34" charset="-128"/>
+              <a:ea typeface="Yu Gothic UI Semibold" panose="020B0700000000000000" pitchFamily="34" charset="-128"/>
+            </a:endParaRPr>
+          </a:p>
+          <a:p>
+            <a:endParaRPr lang="nb-NO" dirty="0"/>
+          </a:p>
+        </p:txBody>
+      </p:sp>
+      <p:sp>
+        <p:nvSpPr>
+          <p:cNvPr id="2" name="TekstSylinder 1">
+            <a:extLst>
+              <a:ext uri="{FF2B5EF4-FFF2-40B4-BE49-F238E27FC236}">
+                <a16:creationId xmlns:a16="http://schemas.microsoft.com/office/drawing/2014/main" id="{4C90F41D-9157-4146-B4E3-746C0CF71E2F}"/>
+              </a:ext>
+            </a:extLst>
+          </p:cNvPr>
+          <p:cNvSpPr txBox="1"/>
+          <p:nvPr/>
+        </p:nvSpPr>
+        <p:spPr>
+          <a:xfrm>
+            <a:off x="1135057" y="-1445949"/>
+            <a:ext cx="2311851" cy="1477328"/>
+          </a:xfrm>
+          <a:prstGeom prst="rect">
+            <a:avLst/>
+          </a:prstGeom>
+          <a:noFill/>
+        </p:spPr>
+        <p:txBody>
+          <a:bodyPr wrap="square" rtlCol="0">
+            <a:spAutoFit/>
+          </a:bodyPr>
+          <a:lstStyle/>
+          <a:p>
+            <a:r>
+              <a:rPr lang="nb-NO" sz="7200" dirty="0">
+                <a:latin typeface="Yu Gothic UI Semibold" panose="020B0700000000000000" pitchFamily="34" charset="-128"/>
+                <a:ea typeface="Yu Gothic UI Semibold" panose="020B0700000000000000" pitchFamily="34" charset="-128"/>
+              </a:rPr>
+              <a:t>R</a:t>
+            </a:r>
+            <a:r>
+              <a:rPr lang="nb-NO" sz="4400" dirty="0">
+                <a:latin typeface="Yu Gothic UI Semibold" panose="020B0700000000000000" pitchFamily="34" charset="-128"/>
+                <a:ea typeface="Yu Gothic UI Semibold" panose="020B0700000000000000" pitchFamily="34" charset="-128"/>
+              </a:rPr>
+              <a:t>ead</a:t>
+            </a:r>
+          </a:p>
+          <a:p>
+            <a:endParaRPr lang="nb-NO" dirty="0"/>
+          </a:p>
+        </p:txBody>
+      </p:sp>
+      <p:sp>
+        <p:nvSpPr>
+          <p:cNvPr id="3" name="TekstSylinder 2">
+            <a:extLst>
+              <a:ext uri="{FF2B5EF4-FFF2-40B4-BE49-F238E27FC236}">
+                <a16:creationId xmlns:a16="http://schemas.microsoft.com/office/drawing/2014/main" id="{0045C8E8-D241-015D-9A17-0D3D4CAC9BD2}"/>
+              </a:ext>
+            </a:extLst>
+          </p:cNvPr>
+          <p:cNvSpPr txBox="1"/>
+          <p:nvPr/>
+        </p:nvSpPr>
+        <p:spPr>
+          <a:xfrm>
+            <a:off x="1135056" y="31379"/>
+            <a:ext cx="2311851" cy="1477328"/>
+          </a:xfrm>
+          <a:prstGeom prst="rect">
+            <a:avLst/>
+          </a:prstGeom>
+          <a:noFill/>
+        </p:spPr>
+        <p:txBody>
+          <a:bodyPr wrap="none" rtlCol="0">
+            <a:spAutoFit/>
+          </a:bodyPr>
+          <a:lstStyle/>
+          <a:p>
+            <a:r>
+              <a:rPr lang="nb-NO" sz="7200" dirty="0">
+                <a:latin typeface="Yu Gothic UI Semibold" panose="020B0700000000000000" pitchFamily="34" charset="-128"/>
+                <a:ea typeface="Yu Gothic UI Semibold" panose="020B0700000000000000" pitchFamily="34" charset="-128"/>
+              </a:rPr>
+              <a:t>U</a:t>
+            </a:r>
+            <a:r>
+              <a:rPr lang="nb-NO" sz="4400" dirty="0">
+                <a:latin typeface="Yu Gothic UI Semibold" panose="020B0700000000000000" pitchFamily="34" charset="-128"/>
+                <a:ea typeface="Yu Gothic UI Semibold" panose="020B0700000000000000" pitchFamily="34" charset="-128"/>
+              </a:rPr>
+              <a:t>pdate</a:t>
+            </a:r>
+          </a:p>
+          <a:p>
+            <a:endParaRPr lang="nb-NO" dirty="0"/>
+          </a:p>
+        </p:txBody>
+      </p:sp>
+      <p:sp>
+        <p:nvSpPr>
+          <p:cNvPr id="7" name="TekstSylinder 6">
+            <a:extLst>
+              <a:ext uri="{FF2B5EF4-FFF2-40B4-BE49-F238E27FC236}">
+                <a16:creationId xmlns:a16="http://schemas.microsoft.com/office/drawing/2014/main" id="{ED124C08-56CC-3C1D-8BDC-89A30098F006}"/>
+              </a:ext>
+            </a:extLst>
+          </p:cNvPr>
+          <p:cNvSpPr txBox="1"/>
+          <p:nvPr/>
+        </p:nvSpPr>
+        <p:spPr>
+          <a:xfrm>
+            <a:off x="-2364891" y="201810"/>
+            <a:ext cx="2097049" cy="1477328"/>
+          </a:xfrm>
+          <a:prstGeom prst="rect">
+            <a:avLst/>
+          </a:prstGeom>
+          <a:noFill/>
+        </p:spPr>
+        <p:txBody>
+          <a:bodyPr wrap="none" rtlCol="0">
+            <a:spAutoFit/>
+          </a:bodyPr>
+          <a:lstStyle/>
+          <a:p>
+            <a:r>
+              <a:rPr lang="nb-NO" sz="7200" dirty="0" err="1">
+                <a:latin typeface="Yu Gothic UI Semibold" panose="020B0700000000000000" pitchFamily="34" charset="-128"/>
+                <a:ea typeface="Yu Gothic UI Semibold" panose="020B0700000000000000" pitchFamily="34" charset="-128"/>
+              </a:rPr>
+              <a:t>D</a:t>
+            </a:r>
+            <a:r>
+              <a:rPr lang="nb-NO" sz="4400" dirty="0" err="1">
+                <a:latin typeface="Yu Gothic UI Semibold" panose="020B0700000000000000" pitchFamily="34" charset="-128"/>
+                <a:ea typeface="Yu Gothic UI Semibold" panose="020B0700000000000000" pitchFamily="34" charset="-128"/>
+              </a:rPr>
+              <a:t>elete</a:t>
+            </a:r>
+            <a:endParaRPr lang="nb-NO" sz="4400" dirty="0">
+              <a:latin typeface="Yu Gothic UI Semibold" panose="020B0700000000000000" pitchFamily="34" charset="-128"/>
+              <a:ea typeface="Yu Gothic UI Semibold" panose="020B0700000000000000" pitchFamily="34" charset="-128"/>
+            </a:endParaRPr>
+          </a:p>
+          <a:p>
+            <a:endParaRPr lang="nb-NO" dirty="0"/>
+          </a:p>
+        </p:txBody>
+      </p:sp>
       <p:pic>
         <p:nvPicPr>
-          <p:cNvPr id="4" name="Bilde 3" descr="Et bilde som inneholder Font, skjermbilde, Grafikk, logo&#10;&#10;Automatisk generert beskrivelse">
-            <a:extLst>
-              <a:ext uri="{FF2B5EF4-FFF2-40B4-BE49-F238E27FC236}">
-                <a16:creationId xmlns:a16="http://schemas.microsoft.com/office/drawing/2014/main" id="{708FCC79-D822-14E4-4633-1A03C5636EBE}"/>
+          <p:cNvPr id="8" name="Bilde 7">
+            <a:extLst>
+              <a:ext uri="{FF2B5EF4-FFF2-40B4-BE49-F238E27FC236}">
+                <a16:creationId xmlns:a16="http://schemas.microsoft.com/office/drawing/2014/main" id="{2F0CD0CF-7BE9-0392-B5BD-DF4D6D025088}"/>
               </a:ext>
             </a:extLst>
           </p:cNvPr>
@@ -8797,281 +9045,27 @@
           <p:nvPr/>
         </p:nvPicPr>
         <p:blipFill>
-          <a:blip r:embed="rId2">
-            <a:extLst>
-              <a:ext uri="{28A0092B-C50C-407E-A947-70E740481C1C}">
-                <a14:useLocalDpi xmlns:a14="http://schemas.microsoft.com/office/drawing/2010/main" val="0"/>
-              </a:ext>
-            </a:extLst>
-          </a:blip>
+          <a:blip r:embed="rId2"/>
           <a:stretch>
             <a:fillRect/>
           </a:stretch>
         </p:blipFill>
         <p:spPr>
           <a:xfrm>
-            <a:off x="9696450" y="5233285"/>
-            <a:ext cx="2495550" cy="1991083"/>
+            <a:off x="930439" y="7224368"/>
+            <a:ext cx="4548537" cy="2765457"/>
           </a:xfrm>
           <a:prstGeom prst="rect">
             <a:avLst/>
           </a:prstGeom>
         </p:spPr>
       </p:pic>
-      <p:sp>
-        <p:nvSpPr>
-          <p:cNvPr id="9" name="TekstSylinder 8">
-            <a:extLst>
-              <a:ext uri="{FF2B5EF4-FFF2-40B4-BE49-F238E27FC236}">
-                <a16:creationId xmlns:a16="http://schemas.microsoft.com/office/drawing/2014/main" id="{BEDC57DB-2F8F-47E2-3742-6CCCD51D93B3}"/>
-              </a:ext>
-            </a:extLst>
-          </p:cNvPr>
-          <p:cNvSpPr txBox="1"/>
-          <p:nvPr/>
-        </p:nvSpPr>
-        <p:spPr>
-          <a:xfrm>
-            <a:off x="-2579693" y="2696944"/>
-            <a:ext cx="2311851" cy="1477328"/>
-          </a:xfrm>
-          <a:prstGeom prst="rect">
-            <a:avLst/>
-          </a:prstGeom>
-          <a:noFill/>
-        </p:spPr>
-        <p:txBody>
-          <a:bodyPr wrap="none" rtlCol="0">
-            <a:spAutoFit/>
-          </a:bodyPr>
-          <a:lstStyle/>
-          <a:p>
-            <a:r>
-              <a:rPr lang="nb-NO" sz="7200" dirty="0">
-                <a:latin typeface="Yu Gothic UI Semibold" panose="020B0700000000000000" pitchFamily="34" charset="-128"/>
-                <a:ea typeface="Yu Gothic UI Semibold" panose="020B0700000000000000" pitchFamily="34" charset="-128"/>
-              </a:rPr>
-              <a:t>U</a:t>
-            </a:r>
-            <a:r>
-              <a:rPr lang="nb-NO" sz="4400" dirty="0">
-                <a:latin typeface="Yu Gothic UI Semibold" panose="020B0700000000000000" pitchFamily="34" charset="-128"/>
-                <a:ea typeface="Yu Gothic UI Semibold" panose="020B0700000000000000" pitchFamily="34" charset="-128"/>
-              </a:rPr>
-              <a:t>pdate</a:t>
-            </a:r>
-          </a:p>
-          <a:p>
-            <a:endParaRPr lang="nb-NO" dirty="0"/>
-          </a:p>
-        </p:txBody>
-      </p:sp>
-      <p:sp>
-        <p:nvSpPr>
-          <p:cNvPr id="10" name="TekstSylinder 9">
-            <a:extLst>
-              <a:ext uri="{FF2B5EF4-FFF2-40B4-BE49-F238E27FC236}">
-                <a16:creationId xmlns:a16="http://schemas.microsoft.com/office/drawing/2014/main" id="{1A7DAA38-29E5-ADA5-05BD-B759A504B5C0}"/>
-              </a:ext>
-            </a:extLst>
-          </p:cNvPr>
-          <p:cNvSpPr txBox="1"/>
-          <p:nvPr/>
-        </p:nvSpPr>
-        <p:spPr>
-          <a:xfrm>
-            <a:off x="-2579694" y="3584586"/>
-            <a:ext cx="2097049" cy="1477328"/>
-          </a:xfrm>
-          <a:prstGeom prst="rect">
-            <a:avLst/>
-          </a:prstGeom>
-          <a:noFill/>
-        </p:spPr>
-        <p:txBody>
-          <a:bodyPr wrap="none" rtlCol="0">
-            <a:spAutoFit/>
-          </a:bodyPr>
-          <a:lstStyle/>
-          <a:p>
-            <a:r>
-              <a:rPr lang="nb-NO" sz="7200" dirty="0" err="1">
-                <a:latin typeface="Yu Gothic UI Semibold" panose="020B0700000000000000" pitchFamily="34" charset="-128"/>
-                <a:ea typeface="Yu Gothic UI Semibold" panose="020B0700000000000000" pitchFamily="34" charset="-128"/>
-              </a:rPr>
-              <a:t>D</a:t>
-            </a:r>
-            <a:r>
-              <a:rPr lang="nb-NO" sz="4400" dirty="0" err="1">
-                <a:latin typeface="Yu Gothic UI Semibold" panose="020B0700000000000000" pitchFamily="34" charset="-128"/>
-                <a:ea typeface="Yu Gothic UI Semibold" panose="020B0700000000000000" pitchFamily="34" charset="-128"/>
-              </a:rPr>
-              <a:t>elete</a:t>
-            </a:r>
-            <a:endParaRPr lang="nb-NO" sz="4400" dirty="0">
-              <a:latin typeface="Yu Gothic UI Semibold" panose="020B0700000000000000" pitchFamily="34" charset="-128"/>
-              <a:ea typeface="Yu Gothic UI Semibold" panose="020B0700000000000000" pitchFamily="34" charset="-128"/>
-            </a:endParaRPr>
-          </a:p>
-          <a:p>
-            <a:endParaRPr lang="nb-NO" dirty="0"/>
-          </a:p>
-        </p:txBody>
-      </p:sp>
-      <p:sp>
-        <p:nvSpPr>
-          <p:cNvPr id="2" name="TekstSylinder 1">
-            <a:extLst>
-              <a:ext uri="{FF2B5EF4-FFF2-40B4-BE49-F238E27FC236}">
-                <a16:creationId xmlns:a16="http://schemas.microsoft.com/office/drawing/2014/main" id="{4C90F41D-9157-4146-B4E3-746C0CF71E2F}"/>
-              </a:ext>
-            </a:extLst>
-          </p:cNvPr>
-          <p:cNvSpPr txBox="1"/>
-          <p:nvPr/>
-        </p:nvSpPr>
-        <p:spPr>
-          <a:xfrm>
-            <a:off x="1135057" y="-1445949"/>
-            <a:ext cx="2311851" cy="1477328"/>
-          </a:xfrm>
-          <a:prstGeom prst="rect">
-            <a:avLst/>
-          </a:prstGeom>
-          <a:noFill/>
-        </p:spPr>
-        <p:txBody>
-          <a:bodyPr wrap="square" rtlCol="0">
-            <a:spAutoFit/>
-          </a:bodyPr>
-          <a:lstStyle/>
-          <a:p>
-            <a:r>
-              <a:rPr lang="nb-NO" sz="7200" dirty="0">
-                <a:latin typeface="Yu Gothic UI Semibold" panose="020B0700000000000000" pitchFamily="34" charset="-128"/>
-                <a:ea typeface="Yu Gothic UI Semibold" panose="020B0700000000000000" pitchFamily="34" charset="-128"/>
-              </a:rPr>
-              <a:t>R</a:t>
-            </a:r>
-            <a:r>
-              <a:rPr lang="nb-NO" sz="4400" dirty="0">
-                <a:latin typeface="Yu Gothic UI Semibold" panose="020B0700000000000000" pitchFamily="34" charset="-128"/>
-                <a:ea typeface="Yu Gothic UI Semibold" panose="020B0700000000000000" pitchFamily="34" charset="-128"/>
-              </a:rPr>
-              <a:t>ead</a:t>
-            </a:r>
-          </a:p>
-          <a:p>
-            <a:endParaRPr lang="nb-NO" dirty="0"/>
-          </a:p>
-        </p:txBody>
-      </p:sp>
-      <p:sp>
-        <p:nvSpPr>
-          <p:cNvPr id="3" name="TekstSylinder 2">
-            <a:extLst>
-              <a:ext uri="{FF2B5EF4-FFF2-40B4-BE49-F238E27FC236}">
-                <a16:creationId xmlns:a16="http://schemas.microsoft.com/office/drawing/2014/main" id="{0045C8E8-D241-015D-9A17-0D3D4CAC9BD2}"/>
-              </a:ext>
-            </a:extLst>
-          </p:cNvPr>
-          <p:cNvSpPr txBox="1"/>
-          <p:nvPr/>
-        </p:nvSpPr>
-        <p:spPr>
-          <a:xfrm>
-            <a:off x="1135056" y="31379"/>
-            <a:ext cx="2311851" cy="1477328"/>
-          </a:xfrm>
-          <a:prstGeom prst="rect">
-            <a:avLst/>
-          </a:prstGeom>
-          <a:noFill/>
-        </p:spPr>
-        <p:txBody>
-          <a:bodyPr wrap="none" rtlCol="0">
-            <a:spAutoFit/>
-          </a:bodyPr>
-          <a:lstStyle/>
-          <a:p>
-            <a:r>
-              <a:rPr lang="nb-NO" sz="7200" dirty="0">
-                <a:latin typeface="Yu Gothic UI Semibold" panose="020B0700000000000000" pitchFamily="34" charset="-128"/>
-                <a:ea typeface="Yu Gothic UI Semibold" panose="020B0700000000000000" pitchFamily="34" charset="-128"/>
-              </a:rPr>
-              <a:t>U</a:t>
-            </a:r>
-            <a:r>
-              <a:rPr lang="nb-NO" sz="4400" dirty="0">
-                <a:latin typeface="Yu Gothic UI Semibold" panose="020B0700000000000000" pitchFamily="34" charset="-128"/>
-                <a:ea typeface="Yu Gothic UI Semibold" panose="020B0700000000000000" pitchFamily="34" charset="-128"/>
-              </a:rPr>
-              <a:t>pdate</a:t>
-            </a:r>
-          </a:p>
-          <a:p>
-            <a:endParaRPr lang="nb-NO" dirty="0"/>
-          </a:p>
-        </p:txBody>
-      </p:sp>
-      <p:sp>
-        <p:nvSpPr>
-          <p:cNvPr id="7" name="TekstSylinder 6">
-            <a:extLst>
-              <a:ext uri="{FF2B5EF4-FFF2-40B4-BE49-F238E27FC236}">
-                <a16:creationId xmlns:a16="http://schemas.microsoft.com/office/drawing/2014/main" id="{ED124C08-56CC-3C1D-8BDC-89A30098F006}"/>
-              </a:ext>
-            </a:extLst>
-          </p:cNvPr>
-          <p:cNvSpPr txBox="1"/>
-          <p:nvPr/>
-        </p:nvSpPr>
-        <p:spPr>
-          <a:xfrm>
-            <a:off x="-2364891" y="201810"/>
-            <a:ext cx="2097049" cy="1477328"/>
-          </a:xfrm>
-          <a:prstGeom prst="rect">
-            <a:avLst/>
-          </a:prstGeom>
-          <a:noFill/>
-        </p:spPr>
-        <p:txBody>
-          <a:bodyPr wrap="none" rtlCol="0">
-            <a:spAutoFit/>
-          </a:bodyPr>
-          <a:lstStyle/>
-          <a:p>
-            <a:r>
-              <a:rPr lang="nb-NO" sz="7200" dirty="0" err="1">
-                <a:latin typeface="Yu Gothic UI Semibold" panose="020B0700000000000000" pitchFamily="34" charset="-128"/>
-                <a:ea typeface="Yu Gothic UI Semibold" panose="020B0700000000000000" pitchFamily="34" charset="-128"/>
-              </a:rPr>
-              <a:t>D</a:t>
-            </a:r>
-            <a:r>
-              <a:rPr lang="nb-NO" sz="4400" dirty="0" err="1">
-                <a:latin typeface="Yu Gothic UI Semibold" panose="020B0700000000000000" pitchFamily="34" charset="-128"/>
-                <a:ea typeface="Yu Gothic UI Semibold" panose="020B0700000000000000" pitchFamily="34" charset="-128"/>
-              </a:rPr>
-              <a:t>elete</a:t>
-            </a:r>
-            <a:endParaRPr lang="nb-NO" sz="4400" dirty="0">
-              <a:latin typeface="Yu Gothic UI Semibold" panose="020B0700000000000000" pitchFamily="34" charset="-128"/>
-              <a:ea typeface="Yu Gothic UI Semibold" panose="020B0700000000000000" pitchFamily="34" charset="-128"/>
-            </a:endParaRPr>
-          </a:p>
-          <a:p>
-            <a:endParaRPr lang="nb-NO" dirty="0"/>
-          </a:p>
-        </p:txBody>
-      </p:sp>
       <p:pic>
         <p:nvPicPr>
-          <p:cNvPr id="8" name="Bilde 7">
-            <a:extLst>
-              <a:ext uri="{FF2B5EF4-FFF2-40B4-BE49-F238E27FC236}">
-                <a16:creationId xmlns:a16="http://schemas.microsoft.com/office/drawing/2014/main" id="{2F0CD0CF-7BE9-0392-B5BD-DF4D6D025088}"/>
+          <p:cNvPr id="11" name="Bilde 10">
+            <a:extLst>
+              <a:ext uri="{FF2B5EF4-FFF2-40B4-BE49-F238E27FC236}">
+                <a16:creationId xmlns:a16="http://schemas.microsoft.com/office/drawing/2014/main" id="{C84205C0-3F42-5192-0B9E-C58FACC544F5}"/>
               </a:ext>
             </a:extLst>
           </p:cNvPr>
@@ -9088,8 +9082,8 @@
         </p:blipFill>
         <p:spPr>
           <a:xfrm>
-            <a:off x="930439" y="7224368"/>
-            <a:ext cx="4548537" cy="2765457"/>
+            <a:off x="6128826" y="7224367"/>
+            <a:ext cx="4737621" cy="2765457"/>
           </a:xfrm>
           <a:prstGeom prst="rect">
             <a:avLst/>
@@ -9098,10 +9092,10 @@
       </p:pic>
       <p:pic>
         <p:nvPicPr>
-          <p:cNvPr id="11" name="Bilde 10">
-            <a:extLst>
-              <a:ext uri="{FF2B5EF4-FFF2-40B4-BE49-F238E27FC236}">
-                <a16:creationId xmlns:a16="http://schemas.microsoft.com/office/drawing/2014/main" id="{C84205C0-3F42-5192-0B9E-C58FACC544F5}"/>
+          <p:cNvPr id="6" name="Bilde 5">
+            <a:extLst>
+              <a:ext uri="{FF2B5EF4-FFF2-40B4-BE49-F238E27FC236}">
+                <a16:creationId xmlns:a16="http://schemas.microsoft.com/office/drawing/2014/main" id="{E2F647AF-ABF1-C632-BEBA-E43D700425DC}"/>
               </a:ext>
             </a:extLst>
           </p:cNvPr>
@@ -9118,8 +9112,8 @@
         </p:blipFill>
         <p:spPr>
           <a:xfrm>
-            <a:off x="6128826" y="7224367"/>
-            <a:ext cx="4737621" cy="2765457"/>
+            <a:off x="735668" y="2403744"/>
+            <a:ext cx="5338611" cy="2050511"/>
           </a:xfrm>
           <a:prstGeom prst="rect">
             <a:avLst/>
@@ -9128,10 +9122,10 @@
       </p:pic>
       <p:pic>
         <p:nvPicPr>
-          <p:cNvPr id="6" name="Bilde 5">
-            <a:extLst>
-              <a:ext uri="{FF2B5EF4-FFF2-40B4-BE49-F238E27FC236}">
-                <a16:creationId xmlns:a16="http://schemas.microsoft.com/office/drawing/2014/main" id="{E2F647AF-ABF1-C632-BEBA-E43D700425DC}"/>
+          <p:cNvPr id="13" name="Bilde 12">
+            <a:extLst>
+              <a:ext uri="{FF2B5EF4-FFF2-40B4-BE49-F238E27FC236}">
+                <a16:creationId xmlns:a16="http://schemas.microsoft.com/office/drawing/2014/main" id="{4782BE43-BBC5-AC48-9213-3504203ECD41}"/>
               </a:ext>
             </a:extLst>
           </p:cNvPr>
@@ -9142,36 +9136,6 @@
         </p:nvPicPr>
         <p:blipFill>
           <a:blip r:embed="rId5"/>
-          <a:stretch>
-            <a:fillRect/>
-          </a:stretch>
-        </p:blipFill>
-        <p:spPr>
-          <a:xfrm>
-            <a:off x="735668" y="2403744"/>
-            <a:ext cx="5338611" cy="2050511"/>
-          </a:xfrm>
-          <a:prstGeom prst="rect">
-            <a:avLst/>
-          </a:prstGeom>
-        </p:spPr>
-      </p:pic>
-      <p:pic>
-        <p:nvPicPr>
-          <p:cNvPr id="13" name="Bilde 12">
-            <a:extLst>
-              <a:ext uri="{FF2B5EF4-FFF2-40B4-BE49-F238E27FC236}">
-                <a16:creationId xmlns:a16="http://schemas.microsoft.com/office/drawing/2014/main" id="{4782BE43-BBC5-AC48-9213-3504203ECD41}"/>
-              </a:ext>
-            </a:extLst>
-          </p:cNvPr>
-          <p:cNvPicPr>
-            <a:picLocks noChangeAspect="1"/>
-          </p:cNvPicPr>
-          <p:nvPr/>
-        </p:nvPicPr>
-        <p:blipFill>
-          <a:blip r:embed="rId6"/>
           <a:stretch>
             <a:fillRect/>
           </a:stretch>
@@ -9382,6 +9346,42 @@
           </a:fontRef>
         </p:style>
       </p:cxnSp>
+      <p:pic>
+        <p:nvPicPr>
+          <p:cNvPr id="5" name="Bilde 4" descr="Et bilde som inneholder Font, Grafikk, skjermbilde, tekst&#10;&#10;Automatisk generert beskrivelse">
+            <a:extLst>
+              <a:ext uri="{FF2B5EF4-FFF2-40B4-BE49-F238E27FC236}">
+                <a16:creationId xmlns:a16="http://schemas.microsoft.com/office/drawing/2014/main" id="{58DCB5B3-B3BC-30DE-A383-3DF5DBA04530}"/>
+              </a:ext>
+            </a:extLst>
+          </p:cNvPr>
+          <p:cNvPicPr>
+            <a:picLocks noChangeAspect="1"/>
+          </p:cNvPicPr>
+          <p:nvPr/>
+        </p:nvPicPr>
+        <p:blipFill>
+          <a:blip r:embed="rId6">
+            <a:extLst>
+              <a:ext uri="{28A0092B-C50C-407E-A947-70E740481C1C}">
+                <a14:useLocalDpi xmlns:a14="http://schemas.microsoft.com/office/drawing/2010/main" val="0"/>
+              </a:ext>
+            </a:extLst>
+          </a:blip>
+          <a:stretch>
+            <a:fillRect/>
+          </a:stretch>
+        </p:blipFill>
+        <p:spPr>
+          <a:xfrm>
+            <a:off x="9618917" y="5095462"/>
+            <a:ext cx="2487740" cy="1801175"/>
+          </a:xfrm>
+          <a:prstGeom prst="rect">
+            <a:avLst/>
+          </a:prstGeom>
+        </p:spPr>
+      </p:pic>
     </p:spTree>
     <p:extLst>
       <p:ext uri="{BB962C8B-B14F-4D97-AF65-F5344CB8AC3E}">
@@ -9424,12 +9424,112 @@
           <a:chExt cx="0" cy="0"/>
         </a:xfrm>
       </p:grpSpPr>
+      <p:sp>
+        <p:nvSpPr>
+          <p:cNvPr id="10" name="TekstSylinder 9">
+            <a:extLst>
+              <a:ext uri="{FF2B5EF4-FFF2-40B4-BE49-F238E27FC236}">
+                <a16:creationId xmlns:a16="http://schemas.microsoft.com/office/drawing/2014/main" id="{1A7DAA38-29E5-ADA5-05BD-B759A504B5C0}"/>
+              </a:ext>
+            </a:extLst>
+          </p:cNvPr>
+          <p:cNvSpPr txBox="1"/>
+          <p:nvPr/>
+        </p:nvSpPr>
+        <p:spPr>
+          <a:xfrm>
+            <a:off x="-2579694" y="3584586"/>
+            <a:ext cx="2097049" cy="1477328"/>
+          </a:xfrm>
+          <a:prstGeom prst="rect">
+            <a:avLst/>
+          </a:prstGeom>
+          <a:noFill/>
+        </p:spPr>
+        <p:txBody>
+          <a:bodyPr wrap="none" rtlCol="0">
+            <a:spAutoFit/>
+          </a:bodyPr>
+          <a:lstStyle/>
+          <a:p>
+            <a:r>
+              <a:rPr lang="nb-NO" sz="7200" dirty="0" err="1">
+                <a:latin typeface="Yu Gothic UI Semibold" panose="020B0700000000000000" pitchFamily="34" charset="-128"/>
+                <a:ea typeface="Yu Gothic UI Semibold" panose="020B0700000000000000" pitchFamily="34" charset="-128"/>
+              </a:rPr>
+              <a:t>D</a:t>
+            </a:r>
+            <a:r>
+              <a:rPr lang="nb-NO" sz="4400" dirty="0" err="1">
+                <a:latin typeface="Yu Gothic UI Semibold" panose="020B0700000000000000" pitchFamily="34" charset="-128"/>
+                <a:ea typeface="Yu Gothic UI Semibold" panose="020B0700000000000000" pitchFamily="34" charset="-128"/>
+              </a:rPr>
+              <a:t>elete</a:t>
+            </a:r>
+            <a:endParaRPr lang="nb-NO" sz="4400" dirty="0">
+              <a:latin typeface="Yu Gothic UI Semibold" panose="020B0700000000000000" pitchFamily="34" charset="-128"/>
+              <a:ea typeface="Yu Gothic UI Semibold" panose="020B0700000000000000" pitchFamily="34" charset="-128"/>
+            </a:endParaRPr>
+          </a:p>
+          <a:p>
+            <a:endParaRPr lang="nb-NO" dirty="0"/>
+          </a:p>
+        </p:txBody>
+      </p:sp>
+      <p:sp>
+        <p:nvSpPr>
+          <p:cNvPr id="2" name="TekstSylinder 1">
+            <a:extLst>
+              <a:ext uri="{FF2B5EF4-FFF2-40B4-BE49-F238E27FC236}">
+                <a16:creationId xmlns:a16="http://schemas.microsoft.com/office/drawing/2014/main" id="{4C90F41D-9157-4146-B4E3-746C0CF71E2F}"/>
+              </a:ext>
+            </a:extLst>
+          </p:cNvPr>
+          <p:cNvSpPr txBox="1"/>
+          <p:nvPr/>
+        </p:nvSpPr>
+        <p:spPr>
+          <a:xfrm>
+            <a:off x="1135057" y="-1445949"/>
+            <a:ext cx="2311851" cy="1477328"/>
+          </a:xfrm>
+          <a:prstGeom prst="rect">
+            <a:avLst/>
+          </a:prstGeom>
+          <a:noFill/>
+        </p:spPr>
+        <p:txBody>
+          <a:bodyPr wrap="square" rtlCol="0">
+            <a:spAutoFit/>
+          </a:bodyPr>
+          <a:lstStyle/>
+          <a:p>
+            <a:r>
+              <a:rPr lang="nb-NO" sz="7200" dirty="0">
+                <a:latin typeface="Yu Gothic UI Semibold" panose="020B0700000000000000" pitchFamily="34" charset="-128"/>
+                <a:ea typeface="Yu Gothic UI Semibold" panose="020B0700000000000000" pitchFamily="34" charset="-128"/>
+              </a:rPr>
+              <a:t>R</a:t>
+            </a:r>
+            <a:r>
+              <a:rPr lang="nb-NO" sz="4400" dirty="0">
+                <a:latin typeface="Yu Gothic UI Semibold" panose="020B0700000000000000" pitchFamily="34" charset="-128"/>
+                <a:ea typeface="Yu Gothic UI Semibold" panose="020B0700000000000000" pitchFamily="34" charset="-128"/>
+              </a:rPr>
+              <a:t>ead</a:t>
+            </a:r>
+          </a:p>
+          <a:p>
+            <a:endParaRPr lang="nb-NO" dirty="0"/>
+          </a:p>
+        </p:txBody>
+      </p:sp>
       <p:pic>
         <p:nvPicPr>
-          <p:cNvPr id="4" name="Bilde 3" descr="Et bilde som inneholder Font, skjermbilde, Grafikk, logo&#10;&#10;Automatisk generert beskrivelse">
-            <a:extLst>
-              <a:ext uri="{FF2B5EF4-FFF2-40B4-BE49-F238E27FC236}">
-                <a16:creationId xmlns:a16="http://schemas.microsoft.com/office/drawing/2014/main" id="{708FCC79-D822-14E4-4633-1A03C5636EBE}"/>
+          <p:cNvPr id="5" name="Bilde 4">
+            <a:extLst>
+              <a:ext uri="{FF2B5EF4-FFF2-40B4-BE49-F238E27FC236}">
+                <a16:creationId xmlns:a16="http://schemas.microsoft.com/office/drawing/2014/main" id="{E1742CDB-AC92-E6F7-9FA8-BB1B8EC98ECC}"/>
               </a:ext>
             </a:extLst>
           </p:cNvPr>
@@ -9439,21 +9539,15 @@
           <p:nvPr/>
         </p:nvPicPr>
         <p:blipFill>
-          <a:blip r:embed="rId2">
-            <a:extLst>
-              <a:ext uri="{28A0092B-C50C-407E-A947-70E740481C1C}">
-                <a14:useLocalDpi xmlns:a14="http://schemas.microsoft.com/office/drawing/2010/main" val="0"/>
-              </a:ext>
-            </a:extLst>
-          </a:blip>
+          <a:blip r:embed="rId2"/>
           <a:stretch>
             <a:fillRect/>
           </a:stretch>
         </p:blipFill>
         <p:spPr>
           <a:xfrm>
-            <a:off x="9696450" y="5233285"/>
-            <a:ext cx="2495550" cy="1991083"/>
+            <a:off x="3166853" y="7635945"/>
+            <a:ext cx="5858294" cy="3561774"/>
           </a:xfrm>
           <a:prstGeom prst="rect">
             <a:avLst/>
@@ -9462,10 +9556,10 @@
       </p:pic>
       <p:sp>
         <p:nvSpPr>
-          <p:cNvPr id="10" name="TekstSylinder 9">
-            <a:extLst>
-              <a:ext uri="{FF2B5EF4-FFF2-40B4-BE49-F238E27FC236}">
-                <a16:creationId xmlns:a16="http://schemas.microsoft.com/office/drawing/2014/main" id="{1A7DAA38-29E5-ADA5-05BD-B759A504B5C0}"/>
+          <p:cNvPr id="3" name="TekstSylinder 2">
+            <a:extLst>
+              <a:ext uri="{FF2B5EF4-FFF2-40B4-BE49-F238E27FC236}">
+                <a16:creationId xmlns:a16="http://schemas.microsoft.com/office/drawing/2014/main" id="{0045C8E8-D241-015D-9A17-0D3D4CAC9BD2}"/>
               </a:ext>
             </a:extLst>
           </p:cNvPr>
@@ -9474,7 +9568,174 @@
         </p:nvSpPr>
         <p:spPr>
           <a:xfrm>
-            <a:off x="-2579694" y="3584586"/>
+            <a:off x="1135056" y="-1477328"/>
+            <a:ext cx="2311851" cy="1477328"/>
+          </a:xfrm>
+          <a:prstGeom prst="rect">
+            <a:avLst/>
+          </a:prstGeom>
+          <a:noFill/>
+        </p:spPr>
+        <p:txBody>
+          <a:bodyPr wrap="none" rtlCol="0">
+            <a:spAutoFit/>
+          </a:bodyPr>
+          <a:lstStyle/>
+          <a:p>
+            <a:r>
+              <a:rPr lang="nb-NO" sz="7200" dirty="0">
+                <a:latin typeface="Yu Gothic UI Semibold" panose="020B0700000000000000" pitchFamily="34" charset="-128"/>
+                <a:ea typeface="Yu Gothic UI Semibold" panose="020B0700000000000000" pitchFamily="34" charset="-128"/>
+              </a:rPr>
+              <a:t>U</a:t>
+            </a:r>
+            <a:r>
+              <a:rPr lang="nb-NO" sz="4400" dirty="0">
+                <a:latin typeface="Yu Gothic UI Semibold" panose="020B0700000000000000" pitchFamily="34" charset="-128"/>
+                <a:ea typeface="Yu Gothic UI Semibold" panose="020B0700000000000000" pitchFamily="34" charset="-128"/>
+              </a:rPr>
+              <a:t>pdate</a:t>
+            </a:r>
+          </a:p>
+          <a:p>
+            <a:endParaRPr lang="nb-NO" dirty="0"/>
+          </a:p>
+        </p:txBody>
+      </p:sp>
+      <p:sp>
+        <p:nvSpPr>
+          <p:cNvPr id="11" name="TekstSylinder 10">
+            <a:extLst>
+              <a:ext uri="{FF2B5EF4-FFF2-40B4-BE49-F238E27FC236}">
+                <a16:creationId xmlns:a16="http://schemas.microsoft.com/office/drawing/2014/main" id="{62FB0E21-6322-9FD7-1CEC-8650BBE298FE}"/>
+              </a:ext>
+            </a:extLst>
+          </p:cNvPr>
+          <p:cNvSpPr txBox="1"/>
+          <p:nvPr/>
+        </p:nvSpPr>
+        <p:spPr>
+          <a:xfrm>
+            <a:off x="-6521621" y="1720840"/>
+            <a:ext cx="6362700" cy="3416320"/>
+          </a:xfrm>
+          <a:prstGeom prst="rect">
+            <a:avLst/>
+          </a:prstGeom>
+          <a:noFill/>
+        </p:spPr>
+        <p:txBody>
+          <a:bodyPr wrap="square" rtlCol="0">
+            <a:spAutoFit/>
+          </a:bodyPr>
+          <a:lstStyle/>
+          <a:p>
+            <a:pPr marL="285750" indent="-285750">
+              <a:buFont typeface="Arial" panose="020B0604020202020204" pitchFamily="34" charset="0"/>
+              <a:buChar char="•"/>
+            </a:pPr>
+            <a:r>
+              <a:rPr lang="nb-NO" sz="2400" dirty="0"/>
+              <a:t>Vi lagrer informasjon og håndterer den etter lovverket gitt av GDPR</a:t>
+            </a:r>
+          </a:p>
+          <a:p>
+            <a:pPr marL="285750" indent="-285750">
+              <a:buFont typeface="Arial" panose="020B0604020202020204" pitchFamily="34" charset="0"/>
+              <a:buChar char="•"/>
+            </a:pPr>
+            <a:endParaRPr lang="nb-NO" sz="2400" dirty="0"/>
+          </a:p>
+          <a:p>
+            <a:pPr marL="285750" indent="-285750">
+              <a:buFont typeface="Arial" panose="020B0604020202020204" pitchFamily="34" charset="0"/>
+              <a:buChar char="•"/>
+            </a:pPr>
+            <a:r>
+              <a:rPr lang="nb-NO" sz="2400" dirty="0"/>
+              <a:t>Brukere av tjenesten godkjenner Terms </a:t>
+            </a:r>
+            <a:r>
+              <a:rPr lang="nb-NO" sz="2400" dirty="0" err="1"/>
+              <a:t>of</a:t>
+            </a:r>
+            <a:r>
+              <a:rPr lang="nb-NO" sz="2400" dirty="0"/>
+              <a:t> Service og velger å delta frivillig</a:t>
+            </a:r>
+          </a:p>
+          <a:p>
+            <a:pPr marL="285750" indent="-285750">
+              <a:buFont typeface="Arial" panose="020B0604020202020204" pitchFamily="34" charset="0"/>
+              <a:buChar char="•"/>
+            </a:pPr>
+            <a:endParaRPr lang="nb-NO" sz="2400" dirty="0"/>
+          </a:p>
+          <a:p>
+            <a:pPr marL="285750" indent="-285750">
+              <a:buFont typeface="Arial" panose="020B0604020202020204" pitchFamily="34" charset="0"/>
+              <a:buChar char="•"/>
+            </a:pPr>
+            <a:r>
+              <a:rPr lang="nb-NO" sz="2400" dirty="0"/>
+              <a:t>Kun nødvendig informasjon lagres og slettes dersom det ikke lenger en noe hensikt å beholde den</a:t>
+            </a:r>
+          </a:p>
+        </p:txBody>
+      </p:sp>
+      <p:sp>
+        <p:nvSpPr>
+          <p:cNvPr id="12" name="TekstSylinder 11">
+            <a:extLst>
+              <a:ext uri="{FF2B5EF4-FFF2-40B4-BE49-F238E27FC236}">
+                <a16:creationId xmlns:a16="http://schemas.microsoft.com/office/drawing/2014/main" id="{38EE360A-D982-6F84-EA22-AB5ECBB4B1F2}"/>
+              </a:ext>
+            </a:extLst>
+          </p:cNvPr>
+          <p:cNvSpPr txBox="1"/>
+          <p:nvPr/>
+        </p:nvSpPr>
+        <p:spPr>
+          <a:xfrm>
+            <a:off x="12493454" y="2684959"/>
+            <a:ext cx="1662635" cy="769441"/>
+          </a:xfrm>
+          <a:prstGeom prst="rect">
+            <a:avLst/>
+          </a:prstGeom>
+          <a:noFill/>
+        </p:spPr>
+        <p:txBody>
+          <a:bodyPr wrap="none" rtlCol="0">
+            <a:spAutoFit/>
+          </a:bodyPr>
+          <a:lstStyle/>
+          <a:p>
+            <a:r>
+              <a:rPr lang="nb-NO" sz="4400" dirty="0">
+                <a:latin typeface="Yu Gothic UI Semibold" panose="020B0700000000000000" pitchFamily="34" charset="-128"/>
+                <a:ea typeface="Yu Gothic UI Semibold" panose="020B0700000000000000" pitchFamily="34" charset="-128"/>
+              </a:rPr>
+              <a:t>GDPR</a:t>
+            </a:r>
+          </a:p>
+        </p:txBody>
+      </p:sp>
+      <p:sp>
+        <p:nvSpPr>
+          <p:cNvPr id="14" name="TekstSylinder 13">
+            <a:extLst>
+              <a:ext uri="{FF2B5EF4-FFF2-40B4-BE49-F238E27FC236}">
+                <a16:creationId xmlns:a16="http://schemas.microsoft.com/office/drawing/2014/main" id="{0885B8CA-E097-5CDD-F8E4-18F853B7CC5E}"/>
+              </a:ext>
+            </a:extLst>
+          </p:cNvPr>
+          <p:cNvSpPr txBox="1"/>
+          <p:nvPr/>
+        </p:nvSpPr>
+        <p:spPr>
+          <a:xfrm>
+            <a:off x="1069804" y="212735"/>
             <a:ext cx="2097049" cy="1477328"/>
           </a:xfrm>
           <a:prstGeom prst="rect">
@@ -9512,60 +9773,12 @@
           </a:p>
         </p:txBody>
       </p:sp>
-      <p:sp>
-        <p:nvSpPr>
-          <p:cNvPr id="2" name="TekstSylinder 1">
-            <a:extLst>
-              <a:ext uri="{FF2B5EF4-FFF2-40B4-BE49-F238E27FC236}">
-                <a16:creationId xmlns:a16="http://schemas.microsoft.com/office/drawing/2014/main" id="{4C90F41D-9157-4146-B4E3-746C0CF71E2F}"/>
-              </a:ext>
-            </a:extLst>
-          </p:cNvPr>
-          <p:cNvSpPr txBox="1"/>
-          <p:nvPr/>
-        </p:nvSpPr>
-        <p:spPr>
-          <a:xfrm>
-            <a:off x="1135057" y="-1445949"/>
-            <a:ext cx="2311851" cy="1477328"/>
-          </a:xfrm>
-          <a:prstGeom prst="rect">
-            <a:avLst/>
-          </a:prstGeom>
-          <a:noFill/>
-        </p:spPr>
-        <p:txBody>
-          <a:bodyPr wrap="square" rtlCol="0">
-            <a:spAutoFit/>
-          </a:bodyPr>
-          <a:lstStyle/>
-          <a:p>
-            <a:r>
-              <a:rPr lang="nb-NO" sz="7200" dirty="0">
-                <a:latin typeface="Yu Gothic UI Semibold" panose="020B0700000000000000" pitchFamily="34" charset="-128"/>
-                <a:ea typeface="Yu Gothic UI Semibold" panose="020B0700000000000000" pitchFamily="34" charset="-128"/>
-              </a:rPr>
-              <a:t>R</a:t>
-            </a:r>
-            <a:r>
-              <a:rPr lang="nb-NO" sz="4400" dirty="0">
-                <a:latin typeface="Yu Gothic UI Semibold" panose="020B0700000000000000" pitchFamily="34" charset="-128"/>
-                <a:ea typeface="Yu Gothic UI Semibold" panose="020B0700000000000000" pitchFamily="34" charset="-128"/>
-              </a:rPr>
-              <a:t>ead</a:t>
-            </a:r>
-          </a:p>
-          <a:p>
-            <a:endParaRPr lang="nb-NO" dirty="0"/>
-          </a:p>
-        </p:txBody>
-      </p:sp>
       <p:pic>
         <p:nvPicPr>
-          <p:cNvPr id="5" name="Bilde 4">
-            <a:extLst>
-              <a:ext uri="{FF2B5EF4-FFF2-40B4-BE49-F238E27FC236}">
-                <a16:creationId xmlns:a16="http://schemas.microsoft.com/office/drawing/2014/main" id="{E1742CDB-AC92-E6F7-9FA8-BB1B8EC98ECC}"/>
+          <p:cNvPr id="6" name="Bilde 5">
+            <a:extLst>
+              <a:ext uri="{FF2B5EF4-FFF2-40B4-BE49-F238E27FC236}">
+                <a16:creationId xmlns:a16="http://schemas.microsoft.com/office/drawing/2014/main" id="{BB756BAA-4AB3-7B30-3208-BB985F099B6B}"/>
               </a:ext>
             </a:extLst>
           </p:cNvPr>
@@ -9582,239 +9795,20 @@
         </p:blipFill>
         <p:spPr>
           <a:xfrm>
-            <a:off x="3166853" y="7635945"/>
-            <a:ext cx="5858294" cy="3561774"/>
+            <a:off x="735668" y="2403744"/>
+            <a:ext cx="5338611" cy="2050511"/>
           </a:xfrm>
           <a:prstGeom prst="rect">
             <a:avLst/>
           </a:prstGeom>
         </p:spPr>
       </p:pic>
-      <p:sp>
-        <p:nvSpPr>
-          <p:cNvPr id="3" name="TekstSylinder 2">
-            <a:extLst>
-              <a:ext uri="{FF2B5EF4-FFF2-40B4-BE49-F238E27FC236}">
-                <a16:creationId xmlns:a16="http://schemas.microsoft.com/office/drawing/2014/main" id="{0045C8E8-D241-015D-9A17-0D3D4CAC9BD2}"/>
-              </a:ext>
-            </a:extLst>
-          </p:cNvPr>
-          <p:cNvSpPr txBox="1"/>
-          <p:nvPr/>
-        </p:nvSpPr>
-        <p:spPr>
-          <a:xfrm>
-            <a:off x="1135056" y="-1477328"/>
-            <a:ext cx="2311851" cy="1477328"/>
-          </a:xfrm>
-          <a:prstGeom prst="rect">
-            <a:avLst/>
-          </a:prstGeom>
-          <a:noFill/>
-        </p:spPr>
-        <p:txBody>
-          <a:bodyPr wrap="none" rtlCol="0">
-            <a:spAutoFit/>
-          </a:bodyPr>
-          <a:lstStyle/>
-          <a:p>
-            <a:r>
-              <a:rPr lang="nb-NO" sz="7200" dirty="0">
-                <a:latin typeface="Yu Gothic UI Semibold" panose="020B0700000000000000" pitchFamily="34" charset="-128"/>
-                <a:ea typeface="Yu Gothic UI Semibold" panose="020B0700000000000000" pitchFamily="34" charset="-128"/>
-              </a:rPr>
-              <a:t>U</a:t>
-            </a:r>
-            <a:r>
-              <a:rPr lang="nb-NO" sz="4400" dirty="0">
-                <a:latin typeface="Yu Gothic UI Semibold" panose="020B0700000000000000" pitchFamily="34" charset="-128"/>
-                <a:ea typeface="Yu Gothic UI Semibold" panose="020B0700000000000000" pitchFamily="34" charset="-128"/>
-              </a:rPr>
-              <a:t>pdate</a:t>
-            </a:r>
-          </a:p>
-          <a:p>
-            <a:endParaRPr lang="nb-NO" dirty="0"/>
-          </a:p>
-        </p:txBody>
-      </p:sp>
-      <p:sp>
-        <p:nvSpPr>
-          <p:cNvPr id="11" name="TekstSylinder 10">
-            <a:extLst>
-              <a:ext uri="{FF2B5EF4-FFF2-40B4-BE49-F238E27FC236}">
-                <a16:creationId xmlns:a16="http://schemas.microsoft.com/office/drawing/2014/main" id="{62FB0E21-6322-9FD7-1CEC-8650BBE298FE}"/>
-              </a:ext>
-            </a:extLst>
-          </p:cNvPr>
-          <p:cNvSpPr txBox="1"/>
-          <p:nvPr/>
-        </p:nvSpPr>
-        <p:spPr>
-          <a:xfrm>
-            <a:off x="-6521621" y="1720840"/>
-            <a:ext cx="6362700" cy="3416320"/>
-          </a:xfrm>
-          <a:prstGeom prst="rect">
-            <a:avLst/>
-          </a:prstGeom>
-          <a:noFill/>
-        </p:spPr>
-        <p:txBody>
-          <a:bodyPr wrap="square" rtlCol="0">
-            <a:spAutoFit/>
-          </a:bodyPr>
-          <a:lstStyle/>
-          <a:p>
-            <a:pPr marL="285750" indent="-285750">
-              <a:buFont typeface="Arial" panose="020B0604020202020204" pitchFamily="34" charset="0"/>
-              <a:buChar char="•"/>
-            </a:pPr>
-            <a:r>
-              <a:rPr lang="nb-NO" sz="2400" dirty="0"/>
-              <a:t>Vi lagrer informasjon og håndterer den etter lovverket gitt av GDPR</a:t>
-            </a:r>
-          </a:p>
-          <a:p>
-            <a:pPr marL="285750" indent="-285750">
-              <a:buFont typeface="Arial" panose="020B0604020202020204" pitchFamily="34" charset="0"/>
-              <a:buChar char="•"/>
-            </a:pPr>
-            <a:endParaRPr lang="nb-NO" sz="2400" dirty="0"/>
-          </a:p>
-          <a:p>
-            <a:pPr marL="285750" indent="-285750">
-              <a:buFont typeface="Arial" panose="020B0604020202020204" pitchFamily="34" charset="0"/>
-              <a:buChar char="•"/>
-            </a:pPr>
-            <a:r>
-              <a:rPr lang="nb-NO" sz="2400" dirty="0"/>
-              <a:t>Brukere av tjenesten godkjenner Terms </a:t>
-            </a:r>
-            <a:r>
-              <a:rPr lang="nb-NO" sz="2400" dirty="0" err="1"/>
-              <a:t>of</a:t>
-            </a:r>
-            <a:r>
-              <a:rPr lang="nb-NO" sz="2400" dirty="0"/>
-              <a:t> Service og velger å delta frivillig</a:t>
-            </a:r>
-          </a:p>
-          <a:p>
-            <a:pPr marL="285750" indent="-285750">
-              <a:buFont typeface="Arial" panose="020B0604020202020204" pitchFamily="34" charset="0"/>
-              <a:buChar char="•"/>
-            </a:pPr>
-            <a:endParaRPr lang="nb-NO" sz="2400" dirty="0"/>
-          </a:p>
-          <a:p>
-            <a:pPr marL="285750" indent="-285750">
-              <a:buFont typeface="Arial" panose="020B0604020202020204" pitchFamily="34" charset="0"/>
-              <a:buChar char="•"/>
-            </a:pPr>
-            <a:r>
-              <a:rPr lang="nb-NO" sz="2400" dirty="0"/>
-              <a:t>Kun nødvendig informasjon lagres og slettes dersom det ikke lenger en noe hensikt å beholde den</a:t>
-            </a:r>
-          </a:p>
-        </p:txBody>
-      </p:sp>
-      <p:sp>
-        <p:nvSpPr>
-          <p:cNvPr id="12" name="TekstSylinder 11">
-            <a:extLst>
-              <a:ext uri="{FF2B5EF4-FFF2-40B4-BE49-F238E27FC236}">
-                <a16:creationId xmlns:a16="http://schemas.microsoft.com/office/drawing/2014/main" id="{38EE360A-D982-6F84-EA22-AB5ECBB4B1F2}"/>
-              </a:ext>
-            </a:extLst>
-          </p:cNvPr>
-          <p:cNvSpPr txBox="1"/>
-          <p:nvPr/>
-        </p:nvSpPr>
-        <p:spPr>
-          <a:xfrm>
-            <a:off x="12493454" y="2684959"/>
-            <a:ext cx="1662635" cy="769441"/>
-          </a:xfrm>
-          <a:prstGeom prst="rect">
-            <a:avLst/>
-          </a:prstGeom>
-          <a:noFill/>
-        </p:spPr>
-        <p:txBody>
-          <a:bodyPr wrap="none" rtlCol="0">
-            <a:spAutoFit/>
-          </a:bodyPr>
-          <a:lstStyle/>
-          <a:p>
-            <a:r>
-              <a:rPr lang="nb-NO" sz="4400" dirty="0">
-                <a:latin typeface="Yu Gothic UI Semibold" panose="020B0700000000000000" pitchFamily="34" charset="-128"/>
-                <a:ea typeface="Yu Gothic UI Semibold" panose="020B0700000000000000" pitchFamily="34" charset="-128"/>
-              </a:rPr>
-              <a:t>GDPR</a:t>
-            </a:r>
-          </a:p>
-        </p:txBody>
-      </p:sp>
-      <p:sp>
-        <p:nvSpPr>
-          <p:cNvPr id="14" name="TekstSylinder 13">
-            <a:extLst>
-              <a:ext uri="{FF2B5EF4-FFF2-40B4-BE49-F238E27FC236}">
-                <a16:creationId xmlns:a16="http://schemas.microsoft.com/office/drawing/2014/main" id="{0885B8CA-E097-5CDD-F8E4-18F853B7CC5E}"/>
-              </a:ext>
-            </a:extLst>
-          </p:cNvPr>
-          <p:cNvSpPr txBox="1"/>
-          <p:nvPr/>
-        </p:nvSpPr>
-        <p:spPr>
-          <a:xfrm>
-            <a:off x="1069804" y="212735"/>
-            <a:ext cx="2097049" cy="1477328"/>
-          </a:xfrm>
-          <a:prstGeom prst="rect">
-            <a:avLst/>
-          </a:prstGeom>
-          <a:noFill/>
-        </p:spPr>
-        <p:txBody>
-          <a:bodyPr wrap="none" rtlCol="0">
-            <a:spAutoFit/>
-          </a:bodyPr>
-          <a:lstStyle/>
-          <a:p>
-            <a:r>
-              <a:rPr lang="nb-NO" sz="7200" dirty="0" err="1">
-                <a:latin typeface="Yu Gothic UI Semibold" panose="020B0700000000000000" pitchFamily="34" charset="-128"/>
-                <a:ea typeface="Yu Gothic UI Semibold" panose="020B0700000000000000" pitchFamily="34" charset="-128"/>
-              </a:rPr>
-              <a:t>D</a:t>
-            </a:r>
-            <a:r>
-              <a:rPr lang="nb-NO" sz="4400" dirty="0" err="1">
-                <a:latin typeface="Yu Gothic UI Semibold" panose="020B0700000000000000" pitchFamily="34" charset="-128"/>
-                <a:ea typeface="Yu Gothic UI Semibold" panose="020B0700000000000000" pitchFamily="34" charset="-128"/>
-              </a:rPr>
-              <a:t>elete</a:t>
-            </a:r>
-            <a:endParaRPr lang="nb-NO" sz="4400" dirty="0">
-              <a:latin typeface="Yu Gothic UI Semibold" panose="020B0700000000000000" pitchFamily="34" charset="-128"/>
-              <a:ea typeface="Yu Gothic UI Semibold" panose="020B0700000000000000" pitchFamily="34" charset="-128"/>
-            </a:endParaRPr>
-          </a:p>
-          <a:p>
-            <a:endParaRPr lang="nb-NO" dirty="0"/>
-          </a:p>
-        </p:txBody>
-      </p:sp>
       <p:pic>
         <p:nvPicPr>
-          <p:cNvPr id="6" name="Bilde 5">
-            <a:extLst>
-              <a:ext uri="{FF2B5EF4-FFF2-40B4-BE49-F238E27FC236}">
-                <a16:creationId xmlns:a16="http://schemas.microsoft.com/office/drawing/2014/main" id="{BB756BAA-4AB3-7B30-3208-BB985F099B6B}"/>
+          <p:cNvPr id="7" name="Bilde 6">
+            <a:extLst>
+              <a:ext uri="{FF2B5EF4-FFF2-40B4-BE49-F238E27FC236}">
+                <a16:creationId xmlns:a16="http://schemas.microsoft.com/office/drawing/2014/main" id="{78AE2C29-E015-8119-875A-552C96E79802}"/>
               </a:ext>
             </a:extLst>
           </p:cNvPr>
@@ -9825,36 +9819,6 @@
         </p:nvPicPr>
         <p:blipFill>
           <a:blip r:embed="rId4"/>
-          <a:stretch>
-            <a:fillRect/>
-          </a:stretch>
-        </p:blipFill>
-        <p:spPr>
-          <a:xfrm>
-            <a:off x="735668" y="2403744"/>
-            <a:ext cx="5338611" cy="2050511"/>
-          </a:xfrm>
-          <a:prstGeom prst="rect">
-            <a:avLst/>
-          </a:prstGeom>
-        </p:spPr>
-      </p:pic>
-      <p:pic>
-        <p:nvPicPr>
-          <p:cNvPr id="7" name="Bilde 6">
-            <a:extLst>
-              <a:ext uri="{FF2B5EF4-FFF2-40B4-BE49-F238E27FC236}">
-                <a16:creationId xmlns:a16="http://schemas.microsoft.com/office/drawing/2014/main" id="{78AE2C29-E015-8119-875A-552C96E79802}"/>
-              </a:ext>
-            </a:extLst>
-          </p:cNvPr>
-          <p:cNvPicPr>
-            <a:picLocks noChangeAspect="1"/>
-          </p:cNvPicPr>
-          <p:nvPr/>
-        </p:nvPicPr>
-        <p:blipFill>
-          <a:blip r:embed="rId5"/>
           <a:stretch>
             <a:fillRect/>
           </a:stretch>
@@ -10069,6 +10033,42 @@
           </a:fontRef>
         </p:style>
       </p:cxnSp>
+      <p:pic>
+        <p:nvPicPr>
+          <p:cNvPr id="16" name="Bilde 15" descr="Et bilde som inneholder Font, Grafikk, skjermbilde, tekst&#10;&#10;Automatisk generert beskrivelse">
+            <a:extLst>
+              <a:ext uri="{FF2B5EF4-FFF2-40B4-BE49-F238E27FC236}">
+                <a16:creationId xmlns:a16="http://schemas.microsoft.com/office/drawing/2014/main" id="{57E64A46-B8CE-48EE-9A2F-7C280B56D35F}"/>
+              </a:ext>
+            </a:extLst>
+          </p:cNvPr>
+          <p:cNvPicPr>
+            <a:picLocks noChangeAspect="1"/>
+          </p:cNvPicPr>
+          <p:nvPr/>
+        </p:nvPicPr>
+        <p:blipFill>
+          <a:blip r:embed="rId5">
+            <a:extLst>
+              <a:ext uri="{28A0092B-C50C-407E-A947-70E740481C1C}">
+                <a14:useLocalDpi xmlns:a14="http://schemas.microsoft.com/office/drawing/2010/main" val="0"/>
+              </a:ext>
+            </a:extLst>
+          </a:blip>
+          <a:stretch>
+            <a:fillRect/>
+          </a:stretch>
+        </p:blipFill>
+        <p:spPr>
+          <a:xfrm>
+            <a:off x="9618917" y="5095462"/>
+            <a:ext cx="2487740" cy="1801175"/>
+          </a:xfrm>
+          <a:prstGeom prst="rect">
+            <a:avLst/>
+          </a:prstGeom>
+        </p:spPr>
+      </p:pic>
     </p:spTree>
     <p:extLst>
       <p:ext uri="{BB962C8B-B14F-4D97-AF65-F5344CB8AC3E}">
@@ -10113,10 +10113,10 @@
       </p:grpSpPr>
       <p:pic>
         <p:nvPicPr>
-          <p:cNvPr id="4" name="Bilde 3" descr="Et bilde som inneholder Font, skjermbilde, Grafikk, logo&#10;&#10;Automatisk generert beskrivelse">
-            <a:extLst>
-              <a:ext uri="{FF2B5EF4-FFF2-40B4-BE49-F238E27FC236}">
-                <a16:creationId xmlns:a16="http://schemas.microsoft.com/office/drawing/2014/main" id="{708FCC79-D822-14E4-4633-1A03C5636EBE}"/>
+          <p:cNvPr id="5" name="Bilde 4">
+            <a:extLst>
+              <a:ext uri="{FF2B5EF4-FFF2-40B4-BE49-F238E27FC236}">
+                <a16:creationId xmlns:a16="http://schemas.microsoft.com/office/drawing/2014/main" id="{E1742CDB-AC92-E6F7-9FA8-BB1B8EC98ECC}"/>
               </a:ext>
             </a:extLst>
           </p:cNvPr>
@@ -10126,33 +10126,229 @@
           <p:nvPr/>
         </p:nvPicPr>
         <p:blipFill>
-          <a:blip r:embed="rId2">
-            <a:extLst>
-              <a:ext uri="{28A0092B-C50C-407E-A947-70E740481C1C}">
-                <a14:useLocalDpi xmlns:a14="http://schemas.microsoft.com/office/drawing/2010/main" val="0"/>
-              </a:ext>
-            </a:extLst>
-          </a:blip>
+          <a:blip r:embed="rId2"/>
           <a:stretch>
             <a:fillRect/>
           </a:stretch>
         </p:blipFill>
         <p:spPr>
           <a:xfrm>
-            <a:off x="9696450" y="5233285"/>
-            <a:ext cx="2495550" cy="1991083"/>
+            <a:off x="3166853" y="7635945"/>
+            <a:ext cx="5858294" cy="3561774"/>
           </a:xfrm>
           <a:prstGeom prst="rect">
             <a:avLst/>
           </a:prstGeom>
         </p:spPr>
       </p:pic>
+      <p:sp>
+        <p:nvSpPr>
+          <p:cNvPr id="8" name="TekstSylinder 7">
+            <a:extLst>
+              <a:ext uri="{FF2B5EF4-FFF2-40B4-BE49-F238E27FC236}">
+                <a16:creationId xmlns:a16="http://schemas.microsoft.com/office/drawing/2014/main" id="{FE77365E-0A23-CBB0-B1A0-80452C3AC1C7}"/>
+              </a:ext>
+            </a:extLst>
+          </p:cNvPr>
+          <p:cNvSpPr txBox="1"/>
+          <p:nvPr/>
+        </p:nvSpPr>
+        <p:spPr>
+          <a:xfrm>
+            <a:off x="1069804" y="-1326028"/>
+            <a:ext cx="2097049" cy="1477328"/>
+          </a:xfrm>
+          <a:prstGeom prst="rect">
+            <a:avLst/>
+          </a:prstGeom>
+          <a:noFill/>
+        </p:spPr>
+        <p:txBody>
+          <a:bodyPr wrap="none" rtlCol="0">
+            <a:spAutoFit/>
+          </a:bodyPr>
+          <a:lstStyle/>
+          <a:p>
+            <a:r>
+              <a:rPr lang="nb-NO" sz="7200" dirty="0" err="1">
+                <a:latin typeface="Yu Gothic UI Semibold" panose="020B0700000000000000" pitchFamily="34" charset="-128"/>
+                <a:ea typeface="Yu Gothic UI Semibold" panose="020B0700000000000000" pitchFamily="34" charset="-128"/>
+              </a:rPr>
+              <a:t>D</a:t>
+            </a:r>
+            <a:r>
+              <a:rPr lang="nb-NO" sz="4400" dirty="0" err="1">
+                <a:latin typeface="Yu Gothic UI Semibold" panose="020B0700000000000000" pitchFamily="34" charset="-128"/>
+                <a:ea typeface="Yu Gothic UI Semibold" panose="020B0700000000000000" pitchFamily="34" charset="-128"/>
+              </a:rPr>
+              <a:t>elete</a:t>
+            </a:r>
+            <a:endParaRPr lang="nb-NO" sz="4400" dirty="0">
+              <a:latin typeface="Yu Gothic UI Semibold" panose="020B0700000000000000" pitchFamily="34" charset="-128"/>
+              <a:ea typeface="Yu Gothic UI Semibold" panose="020B0700000000000000" pitchFamily="34" charset="-128"/>
+            </a:endParaRPr>
+          </a:p>
+          <a:p>
+            <a:endParaRPr lang="nb-NO" dirty="0"/>
+          </a:p>
+        </p:txBody>
+      </p:sp>
+      <p:sp>
+        <p:nvSpPr>
+          <p:cNvPr id="7" name="TekstSylinder 6">
+            <a:extLst>
+              <a:ext uri="{FF2B5EF4-FFF2-40B4-BE49-F238E27FC236}">
+                <a16:creationId xmlns:a16="http://schemas.microsoft.com/office/drawing/2014/main" id="{59E2C451-096F-6B46-BAE5-FF779C8E983F}"/>
+              </a:ext>
+            </a:extLst>
+          </p:cNvPr>
+          <p:cNvSpPr txBox="1"/>
+          <p:nvPr/>
+        </p:nvSpPr>
+        <p:spPr>
+          <a:xfrm>
+            <a:off x="8575504" y="2743200"/>
+            <a:ext cx="1662635" cy="769441"/>
+          </a:xfrm>
+          <a:prstGeom prst="rect">
+            <a:avLst/>
+          </a:prstGeom>
+          <a:noFill/>
+        </p:spPr>
+        <p:txBody>
+          <a:bodyPr wrap="none" rtlCol="0">
+            <a:spAutoFit/>
+          </a:bodyPr>
+          <a:lstStyle/>
+          <a:p>
+            <a:r>
+              <a:rPr lang="nb-NO" sz="4400" dirty="0">
+                <a:latin typeface="Yu Gothic UI Semibold" panose="020B0700000000000000" pitchFamily="34" charset="-128"/>
+                <a:ea typeface="Yu Gothic UI Semibold" panose="020B0700000000000000" pitchFamily="34" charset="-128"/>
+              </a:rPr>
+              <a:t>GDPR</a:t>
+            </a:r>
+          </a:p>
+        </p:txBody>
+      </p:sp>
+      <p:sp>
+        <p:nvSpPr>
+          <p:cNvPr id="9" name="TekstSylinder 8">
+            <a:extLst>
+              <a:ext uri="{FF2B5EF4-FFF2-40B4-BE49-F238E27FC236}">
+                <a16:creationId xmlns:a16="http://schemas.microsoft.com/office/drawing/2014/main" id="{C18EAA59-7692-32AB-3676-166E638AFB70}"/>
+              </a:ext>
+            </a:extLst>
+          </p:cNvPr>
+          <p:cNvSpPr txBox="1"/>
+          <p:nvPr/>
+        </p:nvSpPr>
+        <p:spPr>
+          <a:xfrm>
+            <a:off x="833228" y="636091"/>
+            <a:ext cx="6362700" cy="4524315"/>
+          </a:xfrm>
+          <a:prstGeom prst="rect">
+            <a:avLst/>
+          </a:prstGeom>
+          <a:noFill/>
+        </p:spPr>
+        <p:txBody>
+          <a:bodyPr wrap="square" rtlCol="0">
+            <a:spAutoFit/>
+          </a:bodyPr>
+          <a:lstStyle/>
+          <a:p>
+            <a:pPr marL="285750" indent="-285750">
+              <a:buFont typeface="Arial" panose="020B0604020202020204" pitchFamily="34" charset="0"/>
+              <a:buChar char="•"/>
+            </a:pPr>
+            <a:r>
+              <a:rPr lang="nb-NO" sz="2400" dirty="0"/>
+              <a:t>Vi lagrer informasjon og håndterer den etter lovverket gitt av GDPR</a:t>
+            </a:r>
+          </a:p>
+          <a:p>
+            <a:pPr marL="285750" indent="-285750">
+              <a:buFont typeface="Arial" panose="020B0604020202020204" pitchFamily="34" charset="0"/>
+              <a:buChar char="•"/>
+            </a:pPr>
+            <a:endParaRPr lang="nb-NO" sz="2400" dirty="0"/>
+          </a:p>
+          <a:p>
+            <a:pPr marL="285750" indent="-285750">
+              <a:buFont typeface="Arial" panose="020B0604020202020204" pitchFamily="34" charset="0"/>
+              <a:buChar char="•"/>
+            </a:pPr>
+            <a:r>
+              <a:rPr lang="nb-NO" sz="2400" dirty="0"/>
+              <a:t>Brukere av tjenesten godkjenner </a:t>
+            </a:r>
+          </a:p>
+          <a:p>
+            <a:r>
+              <a:rPr lang="nb-NO" sz="2400" dirty="0"/>
+              <a:t>    Terms </a:t>
+            </a:r>
+            <a:r>
+              <a:rPr lang="nb-NO" sz="2400" dirty="0" err="1"/>
+              <a:t>of</a:t>
+            </a:r>
+            <a:r>
+              <a:rPr lang="nb-NO" sz="2400" dirty="0"/>
+              <a:t> Service og velger å delta frivillig</a:t>
+            </a:r>
+          </a:p>
+          <a:p>
+            <a:pPr marL="285750" indent="-285750">
+              <a:buFont typeface="Arial" panose="020B0604020202020204" pitchFamily="34" charset="0"/>
+              <a:buChar char="•"/>
+            </a:pPr>
+            <a:endParaRPr lang="nb-NO" sz="2400" dirty="0"/>
+          </a:p>
+          <a:p>
+            <a:pPr marL="285750" indent="-285750">
+              <a:buFont typeface="Arial" panose="020B0604020202020204" pitchFamily="34" charset="0"/>
+              <a:buChar char="•"/>
+            </a:pPr>
+            <a:r>
+              <a:rPr lang="nb-NO" sz="2400" dirty="0"/>
+              <a:t>Kun nødvendig informasjon lagres og slettes dersom det ikke lenger en noe hensikt å beholde den</a:t>
+            </a:r>
+          </a:p>
+          <a:p>
+            <a:pPr marL="285750" indent="-285750">
+              <a:buFont typeface="Arial" panose="020B0604020202020204" pitchFamily="34" charset="0"/>
+              <a:buChar char="•"/>
+            </a:pPr>
+            <a:endParaRPr lang="nb-NO" sz="2400" dirty="0"/>
+          </a:p>
+          <a:p>
+            <a:pPr marL="285750" indent="-285750">
+              <a:buFont typeface="Arial" panose="020B0604020202020204" pitchFamily="34" charset="0"/>
+              <a:buChar char="•"/>
+            </a:pPr>
+            <a:r>
+              <a:rPr lang="nb-NO" sz="2400" dirty="0"/>
+              <a:t>Bruker innlogging gjøres trygt ved bruk av </a:t>
+            </a:r>
+            <a:r>
+              <a:rPr lang="nb-NO" sz="2400" dirty="0" err="1"/>
+              <a:t>hashing</a:t>
+            </a:r>
+            <a:r>
+              <a:rPr lang="nb-NO" sz="2400" dirty="0"/>
+              <a:t> og CSRF-tokens</a:t>
+            </a:r>
+          </a:p>
+        </p:txBody>
+      </p:sp>
       <p:pic>
         <p:nvPicPr>
-          <p:cNvPr id="5" name="Bilde 4">
-            <a:extLst>
-              <a:ext uri="{FF2B5EF4-FFF2-40B4-BE49-F238E27FC236}">
-                <a16:creationId xmlns:a16="http://schemas.microsoft.com/office/drawing/2014/main" id="{E1742CDB-AC92-E6F7-9FA8-BB1B8EC98ECC}"/>
+          <p:cNvPr id="2" name="Bilde 1">
+            <a:extLst>
+              <a:ext uri="{FF2B5EF4-FFF2-40B4-BE49-F238E27FC236}">
+                <a16:creationId xmlns:a16="http://schemas.microsoft.com/office/drawing/2014/main" id="{AE1F0002-1BD4-1921-F464-ACC93CC6A74A}"/>
               </a:ext>
             </a:extLst>
           </p:cNvPr>
@@ -10169,222 +10365,20 @@
         </p:blipFill>
         <p:spPr>
           <a:xfrm>
-            <a:off x="3166853" y="7635945"/>
-            <a:ext cx="5858294" cy="3561774"/>
+            <a:off x="662516" y="7233199"/>
+            <a:ext cx="5338611" cy="2050511"/>
           </a:xfrm>
           <a:prstGeom prst="rect">
             <a:avLst/>
           </a:prstGeom>
         </p:spPr>
       </p:pic>
-      <p:sp>
-        <p:nvSpPr>
-          <p:cNvPr id="8" name="TekstSylinder 7">
-            <a:extLst>
-              <a:ext uri="{FF2B5EF4-FFF2-40B4-BE49-F238E27FC236}">
-                <a16:creationId xmlns:a16="http://schemas.microsoft.com/office/drawing/2014/main" id="{FE77365E-0A23-CBB0-B1A0-80452C3AC1C7}"/>
-              </a:ext>
-            </a:extLst>
-          </p:cNvPr>
-          <p:cNvSpPr txBox="1"/>
-          <p:nvPr/>
-        </p:nvSpPr>
-        <p:spPr>
-          <a:xfrm>
-            <a:off x="1069804" y="-1326028"/>
-            <a:ext cx="2097049" cy="1477328"/>
-          </a:xfrm>
-          <a:prstGeom prst="rect">
-            <a:avLst/>
-          </a:prstGeom>
-          <a:noFill/>
-        </p:spPr>
-        <p:txBody>
-          <a:bodyPr wrap="none" rtlCol="0">
-            <a:spAutoFit/>
-          </a:bodyPr>
-          <a:lstStyle/>
-          <a:p>
-            <a:r>
-              <a:rPr lang="nb-NO" sz="7200" dirty="0" err="1">
-                <a:latin typeface="Yu Gothic UI Semibold" panose="020B0700000000000000" pitchFamily="34" charset="-128"/>
-                <a:ea typeface="Yu Gothic UI Semibold" panose="020B0700000000000000" pitchFamily="34" charset="-128"/>
-              </a:rPr>
-              <a:t>D</a:t>
-            </a:r>
-            <a:r>
-              <a:rPr lang="nb-NO" sz="4400" dirty="0" err="1">
-                <a:latin typeface="Yu Gothic UI Semibold" panose="020B0700000000000000" pitchFamily="34" charset="-128"/>
-                <a:ea typeface="Yu Gothic UI Semibold" panose="020B0700000000000000" pitchFamily="34" charset="-128"/>
-              </a:rPr>
-              <a:t>elete</a:t>
-            </a:r>
-            <a:endParaRPr lang="nb-NO" sz="4400" dirty="0">
-              <a:latin typeface="Yu Gothic UI Semibold" panose="020B0700000000000000" pitchFamily="34" charset="-128"/>
-              <a:ea typeface="Yu Gothic UI Semibold" panose="020B0700000000000000" pitchFamily="34" charset="-128"/>
-            </a:endParaRPr>
-          </a:p>
-          <a:p>
-            <a:endParaRPr lang="nb-NO" dirty="0"/>
-          </a:p>
-        </p:txBody>
-      </p:sp>
-      <p:sp>
-        <p:nvSpPr>
-          <p:cNvPr id="7" name="TekstSylinder 6">
-            <a:extLst>
-              <a:ext uri="{FF2B5EF4-FFF2-40B4-BE49-F238E27FC236}">
-                <a16:creationId xmlns:a16="http://schemas.microsoft.com/office/drawing/2014/main" id="{59E2C451-096F-6B46-BAE5-FF779C8E983F}"/>
-              </a:ext>
-            </a:extLst>
-          </p:cNvPr>
-          <p:cNvSpPr txBox="1"/>
-          <p:nvPr/>
-        </p:nvSpPr>
-        <p:spPr>
-          <a:xfrm>
-            <a:off x="8575504" y="2743200"/>
-            <a:ext cx="1662635" cy="769441"/>
-          </a:xfrm>
-          <a:prstGeom prst="rect">
-            <a:avLst/>
-          </a:prstGeom>
-          <a:noFill/>
-        </p:spPr>
-        <p:txBody>
-          <a:bodyPr wrap="none" rtlCol="0">
-            <a:spAutoFit/>
-          </a:bodyPr>
-          <a:lstStyle/>
-          <a:p>
-            <a:r>
-              <a:rPr lang="nb-NO" sz="4400" dirty="0">
-                <a:latin typeface="Yu Gothic UI Semibold" panose="020B0700000000000000" pitchFamily="34" charset="-128"/>
-                <a:ea typeface="Yu Gothic UI Semibold" panose="020B0700000000000000" pitchFamily="34" charset="-128"/>
-              </a:rPr>
-              <a:t>GDPR</a:t>
-            </a:r>
-          </a:p>
-        </p:txBody>
-      </p:sp>
-      <p:sp>
-        <p:nvSpPr>
-          <p:cNvPr id="9" name="TekstSylinder 8">
-            <a:extLst>
-              <a:ext uri="{FF2B5EF4-FFF2-40B4-BE49-F238E27FC236}">
-                <a16:creationId xmlns:a16="http://schemas.microsoft.com/office/drawing/2014/main" id="{C18EAA59-7692-32AB-3676-166E638AFB70}"/>
-              </a:ext>
-            </a:extLst>
-          </p:cNvPr>
-          <p:cNvSpPr txBox="1"/>
-          <p:nvPr/>
-        </p:nvSpPr>
-        <p:spPr>
-          <a:xfrm>
-            <a:off x="833228" y="636091"/>
-            <a:ext cx="6362700" cy="4524315"/>
-          </a:xfrm>
-          <a:prstGeom prst="rect">
-            <a:avLst/>
-          </a:prstGeom>
-          <a:noFill/>
-        </p:spPr>
-        <p:txBody>
-          <a:bodyPr wrap="square" rtlCol="0">
-            <a:spAutoFit/>
-          </a:bodyPr>
-          <a:lstStyle/>
-          <a:p>
-            <a:pPr marL="285750" indent="-285750">
-              <a:buFont typeface="Arial" panose="020B0604020202020204" pitchFamily="34" charset="0"/>
-              <a:buChar char="•"/>
-            </a:pPr>
-            <a:r>
-              <a:rPr lang="nb-NO" sz="2400" dirty="0"/>
-              <a:t>Vi lagrer informasjon og håndterer den etter lovverket gitt av GDPR</a:t>
-            </a:r>
-          </a:p>
-          <a:p>
-            <a:pPr marL="285750" indent="-285750">
-              <a:buFont typeface="Arial" panose="020B0604020202020204" pitchFamily="34" charset="0"/>
-              <a:buChar char="•"/>
-            </a:pPr>
-            <a:endParaRPr lang="nb-NO" sz="2400" dirty="0"/>
-          </a:p>
-          <a:p>
-            <a:pPr marL="285750" indent="-285750">
-              <a:buFont typeface="Arial" panose="020B0604020202020204" pitchFamily="34" charset="0"/>
-              <a:buChar char="•"/>
-            </a:pPr>
-            <a:r>
-              <a:rPr lang="nb-NO" sz="2400" dirty="0"/>
-              <a:t>Brukere av tjenesten godkjenner </a:t>
-            </a:r>
-          </a:p>
-          <a:p>
-            <a:r>
-              <a:rPr lang="nb-NO" sz="2400" dirty="0"/>
-              <a:t>    Terms </a:t>
-            </a:r>
-            <a:r>
-              <a:rPr lang="nb-NO" sz="2400" dirty="0" err="1"/>
-              <a:t>of</a:t>
-            </a:r>
-            <a:r>
-              <a:rPr lang="nb-NO" sz="2400" dirty="0"/>
-              <a:t> Service og velger å delta frivillig</a:t>
-            </a:r>
-          </a:p>
-          <a:p>
-            <a:pPr marL="285750" indent="-285750">
-              <a:buFont typeface="Arial" panose="020B0604020202020204" pitchFamily="34" charset="0"/>
-              <a:buChar char="•"/>
-            </a:pPr>
-            <a:endParaRPr lang="nb-NO" sz="2400" dirty="0"/>
-          </a:p>
-          <a:p>
-            <a:pPr marL="285750" indent="-285750">
-              <a:buFont typeface="Arial" panose="020B0604020202020204" pitchFamily="34" charset="0"/>
-              <a:buChar char="•"/>
-            </a:pPr>
-            <a:r>
-              <a:rPr lang="nb-NO" sz="2400" dirty="0"/>
-              <a:t>Kun nødvendig informasjon lagres og slettes dersom det ikke lenger en noe hensikt å beholde den</a:t>
-            </a:r>
-          </a:p>
-          <a:p>
-            <a:pPr marL="285750" indent="-285750">
-              <a:buFont typeface="Arial" panose="020B0604020202020204" pitchFamily="34" charset="0"/>
-              <a:buChar char="•"/>
-            </a:pPr>
-            <a:endParaRPr lang="nb-NO" sz="2400" dirty="0"/>
-          </a:p>
-          <a:p>
-            <a:pPr marL="285750" indent="-285750">
-              <a:buFont typeface="Arial" panose="020B0604020202020204" pitchFamily="34" charset="0"/>
-              <a:buChar char="•"/>
-            </a:pPr>
-            <a:r>
-              <a:rPr lang="nb-NO" sz="2400" dirty="0"/>
-              <a:t>Bruker innlogging gjøres trygt ved bruk av </a:t>
-            </a:r>
-            <a:r>
-              <a:rPr lang="nb-NO" sz="2400" dirty="0" err="1"/>
-              <a:t>hashing</a:t>
-            </a:r>
-            <a:r>
-              <a:rPr lang="nb-NO" sz="2400" dirty="0"/>
-              <a:t> og CSRF-tokens</a:t>
-            </a:r>
-          </a:p>
-        </p:txBody>
-      </p:sp>
       <p:pic>
         <p:nvPicPr>
-          <p:cNvPr id="2" name="Bilde 1">
-            <a:extLst>
-              <a:ext uri="{FF2B5EF4-FFF2-40B4-BE49-F238E27FC236}">
-                <a16:creationId xmlns:a16="http://schemas.microsoft.com/office/drawing/2014/main" id="{AE1F0002-1BD4-1921-F464-ACC93CC6A74A}"/>
+          <p:cNvPr id="3" name="Bilde 2">
+            <a:extLst>
+              <a:ext uri="{FF2B5EF4-FFF2-40B4-BE49-F238E27FC236}">
+                <a16:creationId xmlns:a16="http://schemas.microsoft.com/office/drawing/2014/main" id="{EDCB2721-F85D-90DF-348A-E6652BAF266C}"/>
               </a:ext>
             </a:extLst>
           </p:cNvPr>
@@ -10395,36 +10389,6 @@
         </p:nvPicPr>
         <p:blipFill>
           <a:blip r:embed="rId4"/>
-          <a:stretch>
-            <a:fillRect/>
-          </a:stretch>
-        </p:blipFill>
-        <p:spPr>
-          <a:xfrm>
-            <a:off x="662516" y="7233199"/>
-            <a:ext cx="5338611" cy="2050511"/>
-          </a:xfrm>
-          <a:prstGeom prst="rect">
-            <a:avLst/>
-          </a:prstGeom>
-        </p:spPr>
-      </p:pic>
-      <p:pic>
-        <p:nvPicPr>
-          <p:cNvPr id="3" name="Bilde 2">
-            <a:extLst>
-              <a:ext uri="{FF2B5EF4-FFF2-40B4-BE49-F238E27FC236}">
-                <a16:creationId xmlns:a16="http://schemas.microsoft.com/office/drawing/2014/main" id="{EDCB2721-F85D-90DF-348A-E6652BAF266C}"/>
-              </a:ext>
-            </a:extLst>
-          </p:cNvPr>
-          <p:cNvPicPr>
-            <a:picLocks noChangeAspect="1"/>
-          </p:cNvPicPr>
-          <p:nvPr/>
-        </p:nvPicPr>
-        <p:blipFill>
-          <a:blip r:embed="rId5"/>
           <a:stretch>
             <a:fillRect/>
           </a:stretch>
@@ -10639,6 +10603,42 @@
           </a:fontRef>
         </p:style>
       </p:cxnSp>
+      <p:pic>
+        <p:nvPicPr>
+          <p:cNvPr id="13" name="Bilde 12" descr="Et bilde som inneholder Font, Grafikk, skjermbilde, tekst&#10;&#10;Automatisk generert beskrivelse">
+            <a:extLst>
+              <a:ext uri="{FF2B5EF4-FFF2-40B4-BE49-F238E27FC236}">
+                <a16:creationId xmlns:a16="http://schemas.microsoft.com/office/drawing/2014/main" id="{FDEA77EF-CA15-3373-5FB4-9D9CDB7C3318}"/>
+              </a:ext>
+            </a:extLst>
+          </p:cNvPr>
+          <p:cNvPicPr>
+            <a:picLocks noChangeAspect="1"/>
+          </p:cNvPicPr>
+          <p:nvPr/>
+        </p:nvPicPr>
+        <p:blipFill>
+          <a:blip r:embed="rId5">
+            <a:extLst>
+              <a:ext uri="{28A0092B-C50C-407E-A947-70E740481C1C}">
+                <a14:useLocalDpi xmlns:a14="http://schemas.microsoft.com/office/drawing/2010/main" val="0"/>
+              </a:ext>
+            </a:extLst>
+          </a:blip>
+          <a:stretch>
+            <a:fillRect/>
+          </a:stretch>
+        </p:blipFill>
+        <p:spPr>
+          <a:xfrm>
+            <a:off x="9618917" y="5095462"/>
+            <a:ext cx="2487740" cy="1801175"/>
+          </a:xfrm>
+          <a:prstGeom prst="rect">
+            <a:avLst/>
+          </a:prstGeom>
+        </p:spPr>
+      </p:pic>
     </p:spTree>
     <p:extLst>
       <p:ext uri="{BB962C8B-B14F-4D97-AF65-F5344CB8AC3E}">

</xml_diff>

<commit_message>
Exit button for edit page
Added exit functionality to edit bedrift page
</commit_message>
<xml_diff>
--- a/Presentasjon.pptx
+++ b/Presentasjon.pptx
@@ -5,7 +5,7 @@
     <p:sldMasterId id="2147483673" r:id="rId1"/>
   </p:sldMasterIdLst>
   <p:notesMasterIdLst>
-    <p:notesMasterId r:id="rId13"/>
+    <p:notesMasterId r:id="rId15"/>
   </p:notesMasterIdLst>
   <p:sldIdLst>
     <p:sldId id="256" r:id="rId2"/>
@@ -18,7 +18,9 @@
     <p:sldId id="262" r:id="rId9"/>
     <p:sldId id="263" r:id="rId10"/>
     <p:sldId id="264" r:id="rId11"/>
-    <p:sldId id="266" r:id="rId12"/>
+    <p:sldId id="267" r:id="rId12"/>
+    <p:sldId id="268" r:id="rId13"/>
+    <p:sldId id="266" r:id="rId14"/>
   </p:sldIdLst>
   <p:sldSz cx="12192000" cy="6858000"/>
   <p:notesSz cx="6858000" cy="9144000"/>
@@ -4875,6 +4877,81 @@
           </a:prstGeom>
         </p:spPr>
       </p:pic>
+      <p:sp>
+        <p:nvSpPr>
+          <p:cNvPr id="4" name="TekstSylinder 3">
+            <a:extLst>
+              <a:ext uri="{FF2B5EF4-FFF2-40B4-BE49-F238E27FC236}">
+                <a16:creationId xmlns:a16="http://schemas.microsoft.com/office/drawing/2014/main" id="{0CF682E9-DC76-828B-F4C7-6AE05C66AD5F}"/>
+              </a:ext>
+            </a:extLst>
+          </p:cNvPr>
+          <p:cNvSpPr txBox="1"/>
+          <p:nvPr/>
+        </p:nvSpPr>
+        <p:spPr>
+          <a:xfrm>
+            <a:off x="3587140" y="-1115402"/>
+            <a:ext cx="5017720" cy="769441"/>
+          </a:xfrm>
+          <a:prstGeom prst="rect">
+            <a:avLst/>
+          </a:prstGeom>
+          <a:noFill/>
+        </p:spPr>
+        <p:txBody>
+          <a:bodyPr wrap="none" rtlCol="0">
+            <a:spAutoFit/>
+          </a:bodyPr>
+          <a:lstStyle/>
+          <a:p>
+            <a:r>
+              <a:rPr lang="nb-NO" sz="4400" dirty="0" err="1">
+                <a:latin typeface="Yu Gothic" panose="020B0400000000000000" pitchFamily="34" charset="-128"/>
+                <a:ea typeface="Yu Gothic" panose="020B0400000000000000" pitchFamily="34" charset="-128"/>
+              </a:rPr>
+              <a:t>Trello</a:t>
+            </a:r>
+            <a:r>
+              <a:rPr lang="nb-NO" sz="4400" dirty="0">
+                <a:latin typeface="Yu Gothic" panose="020B0400000000000000" pitchFamily="34" charset="-128"/>
+                <a:ea typeface="Yu Gothic" panose="020B0400000000000000" pitchFamily="34" charset="-128"/>
+              </a:rPr>
+              <a:t> | To-do liste</a:t>
+            </a:r>
+          </a:p>
+        </p:txBody>
+      </p:sp>
+      <p:pic>
+        <p:nvPicPr>
+          <p:cNvPr id="8" name="Bilde 7">
+            <a:extLst>
+              <a:ext uri="{FF2B5EF4-FFF2-40B4-BE49-F238E27FC236}">
+                <a16:creationId xmlns:a16="http://schemas.microsoft.com/office/drawing/2014/main" id="{937466EE-F873-A2FB-1D49-06081CFB7BAB}"/>
+              </a:ext>
+            </a:extLst>
+          </p:cNvPr>
+          <p:cNvPicPr>
+            <a:picLocks noChangeAspect="1"/>
+          </p:cNvPicPr>
+          <p:nvPr/>
+        </p:nvPicPr>
+        <p:blipFill>
+          <a:blip r:embed="rId4"/>
+          <a:stretch>
+            <a:fillRect/>
+          </a:stretch>
+        </p:blipFill>
+        <p:spPr>
+          <a:xfrm>
+            <a:off x="3329306" y="6966886"/>
+            <a:ext cx="5533388" cy="4899892"/>
+          </a:xfrm>
+          <a:prstGeom prst="rect">
+            <a:avLst/>
+          </a:prstGeom>
+        </p:spPr>
+      </p:pic>
     </p:spTree>
     <p:extLst>
       <p:ext uri="{BB962C8B-B14F-4D97-AF65-F5344CB8AC3E}">
@@ -5130,6 +5207,1398 @@
           <a:chExt cx="0" cy="0"/>
         </a:xfrm>
       </p:grpSpPr>
+      <p:pic>
+        <p:nvPicPr>
+          <p:cNvPr id="5" name="Bilde 4">
+            <a:extLst>
+              <a:ext uri="{FF2B5EF4-FFF2-40B4-BE49-F238E27FC236}">
+                <a16:creationId xmlns:a16="http://schemas.microsoft.com/office/drawing/2014/main" id="{E1742CDB-AC92-E6F7-9FA8-BB1B8EC98ECC}"/>
+              </a:ext>
+            </a:extLst>
+          </p:cNvPr>
+          <p:cNvPicPr>
+            <a:picLocks noChangeAspect="1"/>
+          </p:cNvPicPr>
+          <p:nvPr/>
+        </p:nvPicPr>
+        <p:blipFill>
+          <a:blip r:embed="rId2"/>
+          <a:stretch>
+            <a:fillRect/>
+          </a:stretch>
+        </p:blipFill>
+        <p:spPr>
+          <a:xfrm>
+            <a:off x="3166853" y="7635945"/>
+            <a:ext cx="5858294" cy="3561774"/>
+          </a:xfrm>
+          <a:prstGeom prst="rect">
+            <a:avLst/>
+          </a:prstGeom>
+        </p:spPr>
+      </p:pic>
+      <p:sp>
+        <p:nvSpPr>
+          <p:cNvPr id="7" name="TekstSylinder 6">
+            <a:extLst>
+              <a:ext uri="{FF2B5EF4-FFF2-40B4-BE49-F238E27FC236}">
+                <a16:creationId xmlns:a16="http://schemas.microsoft.com/office/drawing/2014/main" id="{59E2C451-096F-6B46-BAE5-FF779C8E983F}"/>
+              </a:ext>
+            </a:extLst>
+          </p:cNvPr>
+          <p:cNvSpPr txBox="1"/>
+          <p:nvPr/>
+        </p:nvSpPr>
+        <p:spPr>
+          <a:xfrm>
+            <a:off x="13290379" y="2418259"/>
+            <a:ext cx="1662635" cy="769441"/>
+          </a:xfrm>
+          <a:prstGeom prst="rect">
+            <a:avLst/>
+          </a:prstGeom>
+          <a:noFill/>
+        </p:spPr>
+        <p:txBody>
+          <a:bodyPr wrap="none" rtlCol="0">
+            <a:spAutoFit/>
+          </a:bodyPr>
+          <a:lstStyle/>
+          <a:p>
+            <a:r>
+              <a:rPr lang="nb-NO" sz="4400" dirty="0">
+                <a:latin typeface="Yu Gothic UI Semibold" panose="020B0700000000000000" pitchFamily="34" charset="-128"/>
+                <a:ea typeface="Yu Gothic UI Semibold" panose="020B0700000000000000" pitchFamily="34" charset="-128"/>
+              </a:rPr>
+              <a:t>GDPR</a:t>
+            </a:r>
+          </a:p>
+        </p:txBody>
+      </p:sp>
+      <p:sp>
+        <p:nvSpPr>
+          <p:cNvPr id="2" name="TekstSylinder 1">
+            <a:extLst>
+              <a:ext uri="{FF2B5EF4-FFF2-40B4-BE49-F238E27FC236}">
+                <a16:creationId xmlns:a16="http://schemas.microsoft.com/office/drawing/2014/main" id="{9E6866F8-A325-2F0D-6D29-70AB617FE02B}"/>
+              </a:ext>
+            </a:extLst>
+          </p:cNvPr>
+          <p:cNvSpPr txBox="1"/>
+          <p:nvPr/>
+        </p:nvSpPr>
+        <p:spPr>
+          <a:xfrm>
+            <a:off x="-8293553" y="1025528"/>
+            <a:ext cx="8410575" cy="769441"/>
+          </a:xfrm>
+          <a:prstGeom prst="rect">
+            <a:avLst/>
+          </a:prstGeom>
+          <a:noFill/>
+        </p:spPr>
+        <p:txBody>
+          <a:bodyPr wrap="square" rtlCol="0">
+            <a:spAutoFit/>
+          </a:bodyPr>
+          <a:lstStyle/>
+          <a:p>
+            <a:r>
+              <a:rPr lang="nb-NO" sz="4400" dirty="0">
+                <a:latin typeface="Yu Gothic UI Semibold" panose="020B0700000000000000" pitchFamily="34" charset="-128"/>
+                <a:ea typeface="Yu Gothic UI Semibold" panose="020B0700000000000000" pitchFamily="34" charset="-128"/>
+              </a:rPr>
+              <a:t>Utviklerne bak bedriftsportalen</a:t>
+            </a:r>
+          </a:p>
+        </p:txBody>
+      </p:sp>
+      <p:sp>
+        <p:nvSpPr>
+          <p:cNvPr id="6" name="TekstSylinder 5">
+            <a:extLst>
+              <a:ext uri="{FF2B5EF4-FFF2-40B4-BE49-F238E27FC236}">
+                <a16:creationId xmlns:a16="http://schemas.microsoft.com/office/drawing/2014/main" id="{7B3B8AE2-7BFD-AD12-6173-212E642E1454}"/>
+              </a:ext>
+            </a:extLst>
+          </p:cNvPr>
+          <p:cNvSpPr txBox="1"/>
+          <p:nvPr/>
+        </p:nvSpPr>
+        <p:spPr>
+          <a:xfrm>
+            <a:off x="-8293553" y="2176057"/>
+            <a:ext cx="3666388" cy="1631216"/>
+          </a:xfrm>
+          <a:prstGeom prst="rect">
+            <a:avLst/>
+          </a:prstGeom>
+          <a:noFill/>
+        </p:spPr>
+        <p:txBody>
+          <a:bodyPr wrap="none" rtlCol="0">
+            <a:spAutoFit/>
+          </a:bodyPr>
+          <a:lstStyle/>
+          <a:p>
+            <a:pPr marL="342900" indent="-342900">
+              <a:buFont typeface="Arial" panose="020B0604020202020204" pitchFamily="34" charset="0"/>
+              <a:buChar char="•"/>
+            </a:pPr>
+            <a:r>
+              <a:rPr lang="nb-NO" sz="2000" dirty="0">
+                <a:latin typeface="Yu Gothic UI Semibold" panose="020B0700000000000000" pitchFamily="34" charset="-128"/>
+                <a:ea typeface="Yu Gothic UI Semibold" panose="020B0700000000000000" pitchFamily="34" charset="-128"/>
+              </a:rPr>
+              <a:t>Oliver         -Systemutvikler</a:t>
+            </a:r>
+          </a:p>
+          <a:p>
+            <a:pPr marL="342900" indent="-342900">
+              <a:buFont typeface="Arial" panose="020B0604020202020204" pitchFamily="34" charset="0"/>
+              <a:buChar char="•"/>
+            </a:pPr>
+            <a:endParaRPr lang="nb-NO" sz="2000" dirty="0">
+              <a:latin typeface="Yu Gothic UI Semibold" panose="020B0700000000000000" pitchFamily="34" charset="-128"/>
+              <a:ea typeface="Yu Gothic UI Semibold" panose="020B0700000000000000" pitchFamily="34" charset="-128"/>
+            </a:endParaRPr>
+          </a:p>
+          <a:p>
+            <a:pPr marL="342900" indent="-342900">
+              <a:buFont typeface="Arial" panose="020B0604020202020204" pitchFamily="34" charset="0"/>
+              <a:buChar char="•"/>
+            </a:pPr>
+            <a:r>
+              <a:rPr lang="nb-NO" sz="2000" dirty="0">
+                <a:latin typeface="Yu Gothic UI Semibold" panose="020B0700000000000000" pitchFamily="34" charset="-128"/>
+                <a:ea typeface="Yu Gothic UI Semibold" panose="020B0700000000000000" pitchFamily="34" charset="-128"/>
+              </a:rPr>
+              <a:t>Ariel           -Lead-designer</a:t>
+            </a:r>
+          </a:p>
+          <a:p>
+            <a:pPr marL="342900" indent="-342900">
+              <a:buFont typeface="Arial" panose="020B0604020202020204" pitchFamily="34" charset="0"/>
+              <a:buChar char="•"/>
+            </a:pPr>
+            <a:endParaRPr lang="nb-NO" sz="2000" dirty="0">
+              <a:latin typeface="Yu Gothic UI Semibold" panose="020B0700000000000000" pitchFamily="34" charset="-128"/>
+              <a:ea typeface="Yu Gothic UI Semibold" panose="020B0700000000000000" pitchFamily="34" charset="-128"/>
+            </a:endParaRPr>
+          </a:p>
+          <a:p>
+            <a:pPr marL="342900" indent="-342900">
+              <a:buFont typeface="Arial" panose="020B0604020202020204" pitchFamily="34" charset="0"/>
+              <a:buChar char="•"/>
+            </a:pPr>
+            <a:r>
+              <a:rPr lang="nb-NO" sz="2000" dirty="0">
+                <a:latin typeface="Yu Gothic UI Semibold" panose="020B0700000000000000" pitchFamily="34" charset="-128"/>
+                <a:ea typeface="Yu Gothic UI Semibold" panose="020B0700000000000000" pitchFamily="34" charset="-128"/>
+              </a:rPr>
+              <a:t>Jonas         -Arkitekt</a:t>
+            </a:r>
+          </a:p>
+        </p:txBody>
+      </p:sp>
+      <p:sp>
+        <p:nvSpPr>
+          <p:cNvPr id="10" name="TekstSylinder 9">
+            <a:extLst>
+              <a:ext uri="{FF2B5EF4-FFF2-40B4-BE49-F238E27FC236}">
+                <a16:creationId xmlns:a16="http://schemas.microsoft.com/office/drawing/2014/main" id="{3181FEAA-EB4F-6003-8EAE-3E96750F9348}"/>
+              </a:ext>
+            </a:extLst>
+          </p:cNvPr>
+          <p:cNvSpPr txBox="1"/>
+          <p:nvPr/>
+        </p:nvSpPr>
+        <p:spPr>
+          <a:xfrm>
+            <a:off x="2125201" y="-1598335"/>
+            <a:ext cx="7941598" cy="1446550"/>
+          </a:xfrm>
+          <a:prstGeom prst="rect">
+            <a:avLst/>
+          </a:prstGeom>
+          <a:noFill/>
+        </p:spPr>
+        <p:txBody>
+          <a:bodyPr wrap="none" rtlCol="0">
+            <a:spAutoFit/>
+          </a:bodyPr>
+          <a:lstStyle/>
+          <a:p>
+            <a:r>
+              <a:rPr lang="nb-NO" sz="8800" dirty="0">
+                <a:latin typeface="Yu Gothic UI Semibold" panose="020B0700000000000000" pitchFamily="34" charset="-128"/>
+                <a:ea typeface="Yu Gothic UI Semibold" panose="020B0700000000000000" pitchFamily="34" charset="-128"/>
+              </a:rPr>
+              <a:t>Demonstrasjon</a:t>
+            </a:r>
+          </a:p>
+        </p:txBody>
+      </p:sp>
+      <p:pic>
+        <p:nvPicPr>
+          <p:cNvPr id="3" name="Bilde 2" descr="Et bilde som inneholder Font, Grafikk, skjermbilde, tekst&#10;&#10;Automatisk generert beskrivelse">
+            <a:extLst>
+              <a:ext uri="{FF2B5EF4-FFF2-40B4-BE49-F238E27FC236}">
+                <a16:creationId xmlns:a16="http://schemas.microsoft.com/office/drawing/2014/main" id="{68BFA0C6-7773-2DCC-BFD7-0693CBC56FE5}"/>
+              </a:ext>
+            </a:extLst>
+          </p:cNvPr>
+          <p:cNvPicPr>
+            <a:picLocks noChangeAspect="1"/>
+          </p:cNvPicPr>
+          <p:nvPr/>
+        </p:nvPicPr>
+        <p:blipFill>
+          <a:blip r:embed="rId3">
+            <a:extLst>
+              <a:ext uri="{28A0092B-C50C-407E-A947-70E740481C1C}">
+                <a14:useLocalDpi xmlns:a14="http://schemas.microsoft.com/office/drawing/2010/main" val="0"/>
+              </a:ext>
+            </a:extLst>
+          </a:blip>
+          <a:stretch>
+            <a:fillRect/>
+          </a:stretch>
+        </p:blipFill>
+        <p:spPr>
+          <a:xfrm>
+            <a:off x="9618917" y="5095462"/>
+            <a:ext cx="2487740" cy="1801175"/>
+          </a:xfrm>
+          <a:prstGeom prst="rect">
+            <a:avLst/>
+          </a:prstGeom>
+        </p:spPr>
+      </p:pic>
+      <p:pic>
+        <p:nvPicPr>
+          <p:cNvPr id="8" name="Bilde 7">
+            <a:extLst>
+              <a:ext uri="{FF2B5EF4-FFF2-40B4-BE49-F238E27FC236}">
+                <a16:creationId xmlns:a16="http://schemas.microsoft.com/office/drawing/2014/main" id="{D85FFD66-8C9B-D1F1-D166-B9ADB190FC7C}"/>
+              </a:ext>
+            </a:extLst>
+          </p:cNvPr>
+          <p:cNvPicPr>
+            <a:picLocks noChangeAspect="1"/>
+          </p:cNvPicPr>
+          <p:nvPr/>
+        </p:nvPicPr>
+        <p:blipFill>
+          <a:blip r:embed="rId4"/>
+          <a:stretch>
+            <a:fillRect/>
+          </a:stretch>
+        </p:blipFill>
+        <p:spPr>
+          <a:xfrm>
+            <a:off x="3329306" y="1357327"/>
+            <a:ext cx="5533388" cy="4899892"/>
+          </a:xfrm>
+          <a:prstGeom prst="rect">
+            <a:avLst/>
+          </a:prstGeom>
+        </p:spPr>
+      </p:pic>
+      <p:sp>
+        <p:nvSpPr>
+          <p:cNvPr id="9" name="TekstSylinder 8">
+            <a:extLst>
+              <a:ext uri="{FF2B5EF4-FFF2-40B4-BE49-F238E27FC236}">
+                <a16:creationId xmlns:a16="http://schemas.microsoft.com/office/drawing/2014/main" id="{E0DD3DEA-0A79-DCE2-F6B5-5B4E0C35610B}"/>
+              </a:ext>
+            </a:extLst>
+          </p:cNvPr>
+          <p:cNvSpPr txBox="1"/>
+          <p:nvPr/>
+        </p:nvSpPr>
+        <p:spPr>
+          <a:xfrm>
+            <a:off x="3587140" y="457500"/>
+            <a:ext cx="5017720" cy="769441"/>
+          </a:xfrm>
+          <a:prstGeom prst="rect">
+            <a:avLst/>
+          </a:prstGeom>
+          <a:noFill/>
+        </p:spPr>
+        <p:txBody>
+          <a:bodyPr wrap="none" rtlCol="0">
+            <a:spAutoFit/>
+          </a:bodyPr>
+          <a:lstStyle/>
+          <a:p>
+            <a:r>
+              <a:rPr lang="nb-NO" sz="4400" dirty="0" err="1">
+                <a:latin typeface="Yu Gothic" panose="020B0400000000000000" pitchFamily="34" charset="-128"/>
+                <a:ea typeface="Yu Gothic" panose="020B0400000000000000" pitchFamily="34" charset="-128"/>
+              </a:rPr>
+              <a:t>Trello</a:t>
+            </a:r>
+            <a:r>
+              <a:rPr lang="nb-NO" sz="4400" dirty="0">
+                <a:latin typeface="Yu Gothic" panose="020B0400000000000000" pitchFamily="34" charset="-128"/>
+                <a:ea typeface="Yu Gothic" panose="020B0400000000000000" pitchFamily="34" charset="-128"/>
+              </a:rPr>
+              <a:t> | To-do liste</a:t>
+            </a:r>
+          </a:p>
+        </p:txBody>
+      </p:sp>
+      <p:pic>
+        <p:nvPicPr>
+          <p:cNvPr id="11" name="Bilde 10">
+            <a:extLst>
+              <a:ext uri="{FF2B5EF4-FFF2-40B4-BE49-F238E27FC236}">
+                <a16:creationId xmlns:a16="http://schemas.microsoft.com/office/drawing/2014/main" id="{74D3E15A-4D3E-7862-3F03-04A0DB7D6FA4}"/>
+              </a:ext>
+            </a:extLst>
+          </p:cNvPr>
+          <p:cNvPicPr>
+            <a:picLocks noChangeAspect="1"/>
+          </p:cNvPicPr>
+          <p:nvPr/>
+        </p:nvPicPr>
+        <p:blipFill>
+          <a:blip r:embed="rId5"/>
+          <a:stretch>
+            <a:fillRect/>
+          </a:stretch>
+        </p:blipFill>
+        <p:spPr>
+          <a:xfrm>
+            <a:off x="1058293" y="-5281051"/>
+            <a:ext cx="6187471" cy="5129266"/>
+          </a:xfrm>
+          <a:prstGeom prst="rect">
+            <a:avLst/>
+          </a:prstGeom>
+        </p:spPr>
+      </p:pic>
+      <p:sp>
+        <p:nvSpPr>
+          <p:cNvPr id="12" name="TekstSylinder 11">
+            <a:extLst>
+              <a:ext uri="{FF2B5EF4-FFF2-40B4-BE49-F238E27FC236}">
+                <a16:creationId xmlns:a16="http://schemas.microsoft.com/office/drawing/2014/main" id="{18E2AE90-E8EE-087A-6F99-84E0E0C73409}"/>
+              </a:ext>
+            </a:extLst>
+          </p:cNvPr>
+          <p:cNvSpPr txBox="1"/>
+          <p:nvPr/>
+        </p:nvSpPr>
+        <p:spPr>
+          <a:xfrm>
+            <a:off x="7040870" y="-816638"/>
+            <a:ext cx="4940776" cy="584775"/>
+          </a:xfrm>
+          <a:prstGeom prst="rect">
+            <a:avLst/>
+          </a:prstGeom>
+          <a:noFill/>
+        </p:spPr>
+        <p:txBody>
+          <a:bodyPr wrap="none" rtlCol="0">
+            <a:spAutoFit/>
+          </a:bodyPr>
+          <a:lstStyle/>
+          <a:p>
+            <a:r>
+              <a:rPr lang="nb-NO" sz="3200" dirty="0">
+                <a:latin typeface="Yu Gothic" panose="020B0400000000000000" pitchFamily="34" charset="-128"/>
+                <a:ea typeface="Yu Gothic" panose="020B0400000000000000" pitchFamily="34" charset="-128"/>
+              </a:rPr>
+              <a:t>Github - Versjonskontroll</a:t>
+            </a:r>
+          </a:p>
+        </p:txBody>
+      </p:sp>
+      <p:pic>
+        <p:nvPicPr>
+          <p:cNvPr id="13" name="Bilde 12">
+            <a:extLst>
+              <a:ext uri="{FF2B5EF4-FFF2-40B4-BE49-F238E27FC236}">
+                <a16:creationId xmlns:a16="http://schemas.microsoft.com/office/drawing/2014/main" id="{B7658916-E1EB-5853-2D4F-774A76EED228}"/>
+              </a:ext>
+            </a:extLst>
+          </p:cNvPr>
+          <p:cNvPicPr>
+            <a:picLocks noChangeAspect="1"/>
+          </p:cNvPicPr>
+          <p:nvPr/>
+        </p:nvPicPr>
+        <p:blipFill>
+          <a:blip r:embed="rId6"/>
+          <a:stretch>
+            <a:fillRect/>
+          </a:stretch>
+        </p:blipFill>
+        <p:spPr>
+          <a:xfrm>
+            <a:off x="993293" y="-6859519"/>
+            <a:ext cx="6252471" cy="1577502"/>
+          </a:xfrm>
+          <a:prstGeom prst="rect">
+            <a:avLst/>
+          </a:prstGeom>
+        </p:spPr>
+      </p:pic>
+    </p:spTree>
+    <p:extLst>
+      <p:ext uri="{BB962C8B-B14F-4D97-AF65-F5344CB8AC3E}">
+        <p14:creationId xmlns:p14="http://schemas.microsoft.com/office/powerpoint/2010/main" val="1465059324"/>
+      </p:ext>
+    </p:extLst>
+  </p:cSld>
+  <p:clrMapOvr>
+    <a:masterClrMapping/>
+  </p:clrMapOvr>
+  <mc:AlternateContent xmlns:mc="http://schemas.openxmlformats.org/markup-compatibility/2006" xmlns:p159="http://schemas.microsoft.com/office/powerpoint/2015/09/main">
+    <mc:Choice Requires="p159">
+      <p:transition xmlns:p14="http://schemas.microsoft.com/office/powerpoint/2010/main" spd="slow" p14:dur="2000">
+        <p159:morph option="byObject"/>
+      </p:transition>
+    </mc:Choice>
+    <mc:Fallback xmlns="">
+      <p:transition spd="slow">
+        <p:fade/>
+      </p:transition>
+    </mc:Fallback>
+  </mc:AlternateContent>
+  <p:timing>
+    <p:tnLst>
+      <p:par>
+        <p:cTn id="1" dur="indefinite" restart="never" nodeType="tmRoot">
+          <p:childTnLst>
+            <p:seq concurrent="1" nextAc="seek">
+              <p:cTn id="2" dur="indefinite" nodeType="mainSeq">
+                <p:childTnLst>
+                  <p:par>
+                    <p:cTn id="3" fill="hold">
+                      <p:stCondLst>
+                        <p:cond delay="indefinite"/>
+                      </p:stCondLst>
+                      <p:childTnLst>
+                        <p:par>
+                          <p:cTn id="4" fill="hold">
+                            <p:stCondLst>
+                              <p:cond delay="0"/>
+                            </p:stCondLst>
+                            <p:childTnLst>
+                              <p:par>
+                                <p:cTn id="5" presetID="10" presetClass="entr" presetSubtype="0" fill="hold" nodeType="clickEffect">
+                                  <p:stCondLst>
+                                    <p:cond delay="0"/>
+                                  </p:stCondLst>
+                                  <p:childTnLst>
+                                    <p:set>
+                                      <p:cBhvr>
+                                        <p:cTn id="6" dur="1" fill="hold">
+                                          <p:stCondLst>
+                                            <p:cond delay="0"/>
+                                          </p:stCondLst>
+                                        </p:cTn>
+                                        <p:tgtEl>
+                                          <p:spTgt spid="6">
+                                            <p:txEl>
+                                              <p:pRg st="0" end="0"/>
+                                            </p:txEl>
+                                          </p:spTgt>
+                                        </p:tgtEl>
+                                        <p:attrNameLst>
+                                          <p:attrName>style.visibility</p:attrName>
+                                        </p:attrNameLst>
+                                      </p:cBhvr>
+                                      <p:to>
+                                        <p:strVal val="visible"/>
+                                      </p:to>
+                                    </p:set>
+                                    <p:animEffect transition="in" filter="fade">
+                                      <p:cBhvr>
+                                        <p:cTn id="7" dur="500"/>
+                                        <p:tgtEl>
+                                          <p:spTgt spid="6">
+                                            <p:txEl>
+                                              <p:pRg st="0" end="0"/>
+                                            </p:txEl>
+                                          </p:spTgt>
+                                        </p:tgtEl>
+                                      </p:cBhvr>
+                                    </p:animEffect>
+                                  </p:childTnLst>
+                                </p:cTn>
+                              </p:par>
+                            </p:childTnLst>
+                          </p:cTn>
+                        </p:par>
+                      </p:childTnLst>
+                    </p:cTn>
+                  </p:par>
+                  <p:par>
+                    <p:cTn id="8" fill="hold">
+                      <p:stCondLst>
+                        <p:cond delay="indefinite"/>
+                      </p:stCondLst>
+                      <p:childTnLst>
+                        <p:par>
+                          <p:cTn id="9" fill="hold">
+                            <p:stCondLst>
+                              <p:cond delay="0"/>
+                            </p:stCondLst>
+                            <p:childTnLst>
+                              <p:par>
+                                <p:cTn id="10" presetID="10" presetClass="entr" presetSubtype="0" fill="hold" nodeType="clickEffect">
+                                  <p:stCondLst>
+                                    <p:cond delay="0"/>
+                                  </p:stCondLst>
+                                  <p:childTnLst>
+                                    <p:set>
+                                      <p:cBhvr>
+                                        <p:cTn id="11" dur="1" fill="hold">
+                                          <p:stCondLst>
+                                            <p:cond delay="0"/>
+                                          </p:stCondLst>
+                                        </p:cTn>
+                                        <p:tgtEl>
+                                          <p:spTgt spid="6">
+                                            <p:txEl>
+                                              <p:pRg st="2" end="2"/>
+                                            </p:txEl>
+                                          </p:spTgt>
+                                        </p:tgtEl>
+                                        <p:attrNameLst>
+                                          <p:attrName>style.visibility</p:attrName>
+                                        </p:attrNameLst>
+                                      </p:cBhvr>
+                                      <p:to>
+                                        <p:strVal val="visible"/>
+                                      </p:to>
+                                    </p:set>
+                                    <p:animEffect transition="in" filter="fade">
+                                      <p:cBhvr>
+                                        <p:cTn id="12" dur="500"/>
+                                        <p:tgtEl>
+                                          <p:spTgt spid="6">
+                                            <p:txEl>
+                                              <p:pRg st="2" end="2"/>
+                                            </p:txEl>
+                                          </p:spTgt>
+                                        </p:tgtEl>
+                                      </p:cBhvr>
+                                    </p:animEffect>
+                                  </p:childTnLst>
+                                </p:cTn>
+                              </p:par>
+                            </p:childTnLst>
+                          </p:cTn>
+                        </p:par>
+                      </p:childTnLst>
+                    </p:cTn>
+                  </p:par>
+                  <p:par>
+                    <p:cTn id="13" fill="hold">
+                      <p:stCondLst>
+                        <p:cond delay="indefinite"/>
+                      </p:stCondLst>
+                      <p:childTnLst>
+                        <p:par>
+                          <p:cTn id="14" fill="hold">
+                            <p:stCondLst>
+                              <p:cond delay="0"/>
+                            </p:stCondLst>
+                            <p:childTnLst>
+                              <p:par>
+                                <p:cTn id="15" presetID="10" presetClass="entr" presetSubtype="0" fill="hold" nodeType="clickEffect">
+                                  <p:stCondLst>
+                                    <p:cond delay="0"/>
+                                  </p:stCondLst>
+                                  <p:childTnLst>
+                                    <p:set>
+                                      <p:cBhvr>
+                                        <p:cTn id="16" dur="1" fill="hold">
+                                          <p:stCondLst>
+                                            <p:cond delay="0"/>
+                                          </p:stCondLst>
+                                        </p:cTn>
+                                        <p:tgtEl>
+                                          <p:spTgt spid="6">
+                                            <p:txEl>
+                                              <p:pRg st="4" end="4"/>
+                                            </p:txEl>
+                                          </p:spTgt>
+                                        </p:tgtEl>
+                                        <p:attrNameLst>
+                                          <p:attrName>style.visibility</p:attrName>
+                                        </p:attrNameLst>
+                                      </p:cBhvr>
+                                      <p:to>
+                                        <p:strVal val="visible"/>
+                                      </p:to>
+                                    </p:set>
+                                    <p:animEffect transition="in" filter="fade">
+                                      <p:cBhvr>
+                                        <p:cTn id="17" dur="500"/>
+                                        <p:tgtEl>
+                                          <p:spTgt spid="6">
+                                            <p:txEl>
+                                              <p:pRg st="4" end="4"/>
+                                            </p:txEl>
+                                          </p:spTgt>
+                                        </p:tgtEl>
+                                      </p:cBhvr>
+                                    </p:animEffect>
+                                  </p:childTnLst>
+                                </p:cTn>
+                              </p:par>
+                            </p:childTnLst>
+                          </p:cTn>
+                        </p:par>
+                      </p:childTnLst>
+                    </p:cTn>
+                  </p:par>
+                </p:childTnLst>
+              </p:cTn>
+              <p:prevCondLst>
+                <p:cond evt="onPrev" delay="0">
+                  <p:tgtEl>
+                    <p:sldTgt/>
+                  </p:tgtEl>
+                </p:cond>
+              </p:prevCondLst>
+              <p:nextCondLst>
+                <p:cond evt="onNext" delay="0">
+                  <p:tgtEl>
+                    <p:sldTgt/>
+                  </p:tgtEl>
+                </p:cond>
+              </p:nextCondLst>
+            </p:seq>
+          </p:childTnLst>
+        </p:cTn>
+      </p:par>
+    </p:tnLst>
+  </p:timing>
+</p:sld>
+</file>
+
+<file path=ppt/slides/slide12.xml><?xml version="1.0" encoding="utf-8"?>
+<p:sld xmlns:a="http://schemas.openxmlformats.org/drawingml/2006/main" xmlns:r="http://schemas.openxmlformats.org/officeDocument/2006/relationships" xmlns:p="http://schemas.openxmlformats.org/presentationml/2006/main">
+  <p:cSld>
+    <p:spTree>
+      <p:nvGrpSpPr>
+        <p:cNvPr id="1" name=""/>
+        <p:cNvGrpSpPr/>
+        <p:nvPr/>
+      </p:nvGrpSpPr>
+      <p:grpSpPr>
+        <a:xfrm>
+          <a:off x="0" y="0"/>
+          <a:ext cx="0" cy="0"/>
+          <a:chOff x="0" y="0"/>
+          <a:chExt cx="0" cy="0"/>
+        </a:xfrm>
+      </p:grpSpPr>
+      <p:pic>
+        <p:nvPicPr>
+          <p:cNvPr id="5" name="Bilde 4">
+            <a:extLst>
+              <a:ext uri="{FF2B5EF4-FFF2-40B4-BE49-F238E27FC236}">
+                <a16:creationId xmlns:a16="http://schemas.microsoft.com/office/drawing/2014/main" id="{E1742CDB-AC92-E6F7-9FA8-BB1B8EC98ECC}"/>
+              </a:ext>
+            </a:extLst>
+          </p:cNvPr>
+          <p:cNvPicPr>
+            <a:picLocks noChangeAspect="1"/>
+          </p:cNvPicPr>
+          <p:nvPr/>
+        </p:nvPicPr>
+        <p:blipFill>
+          <a:blip r:embed="rId2"/>
+          <a:stretch>
+            <a:fillRect/>
+          </a:stretch>
+        </p:blipFill>
+        <p:spPr>
+          <a:xfrm>
+            <a:off x="3166853" y="7635945"/>
+            <a:ext cx="5858294" cy="3561774"/>
+          </a:xfrm>
+          <a:prstGeom prst="rect">
+            <a:avLst/>
+          </a:prstGeom>
+        </p:spPr>
+      </p:pic>
+      <p:sp>
+        <p:nvSpPr>
+          <p:cNvPr id="7" name="TekstSylinder 6">
+            <a:extLst>
+              <a:ext uri="{FF2B5EF4-FFF2-40B4-BE49-F238E27FC236}">
+                <a16:creationId xmlns:a16="http://schemas.microsoft.com/office/drawing/2014/main" id="{59E2C451-096F-6B46-BAE5-FF779C8E983F}"/>
+              </a:ext>
+            </a:extLst>
+          </p:cNvPr>
+          <p:cNvSpPr txBox="1"/>
+          <p:nvPr/>
+        </p:nvSpPr>
+        <p:spPr>
+          <a:xfrm>
+            <a:off x="13290379" y="2418259"/>
+            <a:ext cx="1662635" cy="769441"/>
+          </a:xfrm>
+          <a:prstGeom prst="rect">
+            <a:avLst/>
+          </a:prstGeom>
+          <a:noFill/>
+        </p:spPr>
+        <p:txBody>
+          <a:bodyPr wrap="none" rtlCol="0">
+            <a:spAutoFit/>
+          </a:bodyPr>
+          <a:lstStyle/>
+          <a:p>
+            <a:r>
+              <a:rPr lang="nb-NO" sz="4400" dirty="0">
+                <a:latin typeface="Yu Gothic UI Semibold" panose="020B0700000000000000" pitchFamily="34" charset="-128"/>
+                <a:ea typeface="Yu Gothic UI Semibold" panose="020B0700000000000000" pitchFamily="34" charset="-128"/>
+              </a:rPr>
+              <a:t>GDPR</a:t>
+            </a:r>
+          </a:p>
+        </p:txBody>
+      </p:sp>
+      <p:sp>
+        <p:nvSpPr>
+          <p:cNvPr id="2" name="TekstSylinder 1">
+            <a:extLst>
+              <a:ext uri="{FF2B5EF4-FFF2-40B4-BE49-F238E27FC236}">
+                <a16:creationId xmlns:a16="http://schemas.microsoft.com/office/drawing/2014/main" id="{9E6866F8-A325-2F0D-6D29-70AB617FE02B}"/>
+              </a:ext>
+            </a:extLst>
+          </p:cNvPr>
+          <p:cNvSpPr txBox="1"/>
+          <p:nvPr/>
+        </p:nvSpPr>
+        <p:spPr>
+          <a:xfrm>
+            <a:off x="-8293553" y="1025528"/>
+            <a:ext cx="8410575" cy="769441"/>
+          </a:xfrm>
+          <a:prstGeom prst="rect">
+            <a:avLst/>
+          </a:prstGeom>
+          <a:noFill/>
+        </p:spPr>
+        <p:txBody>
+          <a:bodyPr wrap="square" rtlCol="0">
+            <a:spAutoFit/>
+          </a:bodyPr>
+          <a:lstStyle/>
+          <a:p>
+            <a:r>
+              <a:rPr lang="nb-NO" sz="4400" dirty="0">
+                <a:latin typeface="Yu Gothic UI Semibold" panose="020B0700000000000000" pitchFamily="34" charset="-128"/>
+                <a:ea typeface="Yu Gothic UI Semibold" panose="020B0700000000000000" pitchFamily="34" charset="-128"/>
+              </a:rPr>
+              <a:t>Utviklerne bak bedriftsportalen</a:t>
+            </a:r>
+          </a:p>
+        </p:txBody>
+      </p:sp>
+      <p:sp>
+        <p:nvSpPr>
+          <p:cNvPr id="6" name="TekstSylinder 5">
+            <a:extLst>
+              <a:ext uri="{FF2B5EF4-FFF2-40B4-BE49-F238E27FC236}">
+                <a16:creationId xmlns:a16="http://schemas.microsoft.com/office/drawing/2014/main" id="{7B3B8AE2-7BFD-AD12-6173-212E642E1454}"/>
+              </a:ext>
+            </a:extLst>
+          </p:cNvPr>
+          <p:cNvSpPr txBox="1"/>
+          <p:nvPr/>
+        </p:nvSpPr>
+        <p:spPr>
+          <a:xfrm>
+            <a:off x="-8293553" y="2176057"/>
+            <a:ext cx="3666388" cy="1631216"/>
+          </a:xfrm>
+          <a:prstGeom prst="rect">
+            <a:avLst/>
+          </a:prstGeom>
+          <a:noFill/>
+        </p:spPr>
+        <p:txBody>
+          <a:bodyPr wrap="none" rtlCol="0">
+            <a:spAutoFit/>
+          </a:bodyPr>
+          <a:lstStyle/>
+          <a:p>
+            <a:pPr marL="342900" indent="-342900">
+              <a:buFont typeface="Arial" panose="020B0604020202020204" pitchFamily="34" charset="0"/>
+              <a:buChar char="•"/>
+            </a:pPr>
+            <a:r>
+              <a:rPr lang="nb-NO" sz="2000" dirty="0">
+                <a:latin typeface="Yu Gothic UI Semibold" panose="020B0700000000000000" pitchFamily="34" charset="-128"/>
+                <a:ea typeface="Yu Gothic UI Semibold" panose="020B0700000000000000" pitchFamily="34" charset="-128"/>
+              </a:rPr>
+              <a:t>Oliver         -Systemutvikler</a:t>
+            </a:r>
+          </a:p>
+          <a:p>
+            <a:pPr marL="342900" indent="-342900">
+              <a:buFont typeface="Arial" panose="020B0604020202020204" pitchFamily="34" charset="0"/>
+              <a:buChar char="•"/>
+            </a:pPr>
+            <a:endParaRPr lang="nb-NO" sz="2000" dirty="0">
+              <a:latin typeface="Yu Gothic UI Semibold" panose="020B0700000000000000" pitchFamily="34" charset="-128"/>
+              <a:ea typeface="Yu Gothic UI Semibold" panose="020B0700000000000000" pitchFamily="34" charset="-128"/>
+            </a:endParaRPr>
+          </a:p>
+          <a:p>
+            <a:pPr marL="342900" indent="-342900">
+              <a:buFont typeface="Arial" panose="020B0604020202020204" pitchFamily="34" charset="0"/>
+              <a:buChar char="•"/>
+            </a:pPr>
+            <a:r>
+              <a:rPr lang="nb-NO" sz="2000" dirty="0">
+                <a:latin typeface="Yu Gothic UI Semibold" panose="020B0700000000000000" pitchFamily="34" charset="-128"/>
+                <a:ea typeface="Yu Gothic UI Semibold" panose="020B0700000000000000" pitchFamily="34" charset="-128"/>
+              </a:rPr>
+              <a:t>Ariel           -Lead-designer</a:t>
+            </a:r>
+          </a:p>
+          <a:p>
+            <a:pPr marL="342900" indent="-342900">
+              <a:buFont typeface="Arial" panose="020B0604020202020204" pitchFamily="34" charset="0"/>
+              <a:buChar char="•"/>
+            </a:pPr>
+            <a:endParaRPr lang="nb-NO" sz="2000" dirty="0">
+              <a:latin typeface="Yu Gothic UI Semibold" panose="020B0700000000000000" pitchFamily="34" charset="-128"/>
+              <a:ea typeface="Yu Gothic UI Semibold" panose="020B0700000000000000" pitchFamily="34" charset="-128"/>
+            </a:endParaRPr>
+          </a:p>
+          <a:p>
+            <a:pPr marL="342900" indent="-342900">
+              <a:buFont typeface="Arial" panose="020B0604020202020204" pitchFamily="34" charset="0"/>
+              <a:buChar char="•"/>
+            </a:pPr>
+            <a:r>
+              <a:rPr lang="nb-NO" sz="2000" dirty="0">
+                <a:latin typeface="Yu Gothic UI Semibold" panose="020B0700000000000000" pitchFamily="34" charset="-128"/>
+                <a:ea typeface="Yu Gothic UI Semibold" panose="020B0700000000000000" pitchFamily="34" charset="-128"/>
+              </a:rPr>
+              <a:t>Jonas         -Arkitekt</a:t>
+            </a:r>
+          </a:p>
+        </p:txBody>
+      </p:sp>
+      <p:sp>
+        <p:nvSpPr>
+          <p:cNvPr id="10" name="TekstSylinder 9">
+            <a:extLst>
+              <a:ext uri="{FF2B5EF4-FFF2-40B4-BE49-F238E27FC236}">
+                <a16:creationId xmlns:a16="http://schemas.microsoft.com/office/drawing/2014/main" id="{3181FEAA-EB4F-6003-8EAE-3E96750F9348}"/>
+              </a:ext>
+            </a:extLst>
+          </p:cNvPr>
+          <p:cNvSpPr txBox="1"/>
+          <p:nvPr/>
+        </p:nvSpPr>
+        <p:spPr>
+          <a:xfrm>
+            <a:off x="2125201" y="-1598335"/>
+            <a:ext cx="7941598" cy="1446550"/>
+          </a:xfrm>
+          <a:prstGeom prst="rect">
+            <a:avLst/>
+          </a:prstGeom>
+          <a:noFill/>
+        </p:spPr>
+        <p:txBody>
+          <a:bodyPr wrap="none" rtlCol="0">
+            <a:spAutoFit/>
+          </a:bodyPr>
+          <a:lstStyle/>
+          <a:p>
+            <a:r>
+              <a:rPr lang="nb-NO" sz="8800" dirty="0">
+                <a:latin typeface="Yu Gothic UI Semibold" panose="020B0700000000000000" pitchFamily="34" charset="-128"/>
+                <a:ea typeface="Yu Gothic UI Semibold" panose="020B0700000000000000" pitchFamily="34" charset="-128"/>
+              </a:rPr>
+              <a:t>Demonstrasjon</a:t>
+            </a:r>
+          </a:p>
+        </p:txBody>
+      </p:sp>
+      <p:pic>
+        <p:nvPicPr>
+          <p:cNvPr id="3" name="Bilde 2" descr="Et bilde som inneholder Font, Grafikk, skjermbilde, tekst&#10;&#10;Automatisk generert beskrivelse">
+            <a:extLst>
+              <a:ext uri="{FF2B5EF4-FFF2-40B4-BE49-F238E27FC236}">
+                <a16:creationId xmlns:a16="http://schemas.microsoft.com/office/drawing/2014/main" id="{68BFA0C6-7773-2DCC-BFD7-0693CBC56FE5}"/>
+              </a:ext>
+            </a:extLst>
+          </p:cNvPr>
+          <p:cNvPicPr>
+            <a:picLocks noChangeAspect="1"/>
+          </p:cNvPicPr>
+          <p:nvPr/>
+        </p:nvPicPr>
+        <p:blipFill>
+          <a:blip r:embed="rId3">
+            <a:extLst>
+              <a:ext uri="{28A0092B-C50C-407E-A947-70E740481C1C}">
+                <a14:useLocalDpi xmlns:a14="http://schemas.microsoft.com/office/drawing/2010/main" val="0"/>
+              </a:ext>
+            </a:extLst>
+          </a:blip>
+          <a:stretch>
+            <a:fillRect/>
+          </a:stretch>
+        </p:blipFill>
+        <p:spPr>
+          <a:xfrm>
+            <a:off x="9618917" y="5095462"/>
+            <a:ext cx="2487740" cy="1801175"/>
+          </a:xfrm>
+          <a:prstGeom prst="rect">
+            <a:avLst/>
+          </a:prstGeom>
+        </p:spPr>
+      </p:pic>
+      <p:pic>
+        <p:nvPicPr>
+          <p:cNvPr id="8" name="Bilde 7">
+            <a:extLst>
+              <a:ext uri="{FF2B5EF4-FFF2-40B4-BE49-F238E27FC236}">
+                <a16:creationId xmlns:a16="http://schemas.microsoft.com/office/drawing/2014/main" id="{D85FFD66-8C9B-D1F1-D166-B9ADB190FC7C}"/>
+              </a:ext>
+            </a:extLst>
+          </p:cNvPr>
+          <p:cNvPicPr>
+            <a:picLocks noChangeAspect="1"/>
+          </p:cNvPicPr>
+          <p:nvPr/>
+        </p:nvPicPr>
+        <p:blipFill>
+          <a:blip r:embed="rId4"/>
+          <a:stretch>
+            <a:fillRect/>
+          </a:stretch>
+        </p:blipFill>
+        <p:spPr>
+          <a:xfrm>
+            <a:off x="-5890894" y="1308400"/>
+            <a:ext cx="5533388" cy="4899892"/>
+          </a:xfrm>
+          <a:prstGeom prst="rect">
+            <a:avLst/>
+          </a:prstGeom>
+        </p:spPr>
+      </p:pic>
+      <p:sp>
+        <p:nvSpPr>
+          <p:cNvPr id="9" name="TekstSylinder 8">
+            <a:extLst>
+              <a:ext uri="{FF2B5EF4-FFF2-40B4-BE49-F238E27FC236}">
+                <a16:creationId xmlns:a16="http://schemas.microsoft.com/office/drawing/2014/main" id="{E0DD3DEA-0A79-DCE2-F6B5-5B4E0C35610B}"/>
+              </a:ext>
+            </a:extLst>
+          </p:cNvPr>
+          <p:cNvSpPr txBox="1"/>
+          <p:nvPr/>
+        </p:nvSpPr>
+        <p:spPr>
+          <a:xfrm>
+            <a:off x="-5633060" y="397523"/>
+            <a:ext cx="5017720" cy="769441"/>
+          </a:xfrm>
+          <a:prstGeom prst="rect">
+            <a:avLst/>
+          </a:prstGeom>
+          <a:noFill/>
+        </p:spPr>
+        <p:txBody>
+          <a:bodyPr wrap="none" rtlCol="0">
+            <a:spAutoFit/>
+          </a:bodyPr>
+          <a:lstStyle/>
+          <a:p>
+            <a:r>
+              <a:rPr lang="nb-NO" sz="4400" dirty="0" err="1">
+                <a:latin typeface="Yu Gothic" panose="020B0400000000000000" pitchFamily="34" charset="-128"/>
+                <a:ea typeface="Yu Gothic" panose="020B0400000000000000" pitchFamily="34" charset="-128"/>
+              </a:rPr>
+              <a:t>Trello</a:t>
+            </a:r>
+            <a:r>
+              <a:rPr lang="nb-NO" sz="4400" dirty="0">
+                <a:latin typeface="Yu Gothic" panose="020B0400000000000000" pitchFamily="34" charset="-128"/>
+                <a:ea typeface="Yu Gothic" panose="020B0400000000000000" pitchFamily="34" charset="-128"/>
+              </a:rPr>
+              <a:t> | To-do liste</a:t>
+            </a:r>
+          </a:p>
+        </p:txBody>
+      </p:sp>
+      <p:pic>
+        <p:nvPicPr>
+          <p:cNvPr id="11" name="Bilde 10">
+            <a:extLst>
+              <a:ext uri="{FF2B5EF4-FFF2-40B4-BE49-F238E27FC236}">
+                <a16:creationId xmlns:a16="http://schemas.microsoft.com/office/drawing/2014/main" id="{C59ADBAD-6EB4-5F13-D3AE-F201E082E4CB}"/>
+              </a:ext>
+            </a:extLst>
+          </p:cNvPr>
+          <p:cNvPicPr>
+            <a:picLocks noChangeAspect="1"/>
+          </p:cNvPicPr>
+          <p:nvPr/>
+        </p:nvPicPr>
+        <p:blipFill>
+          <a:blip r:embed="rId5"/>
+          <a:stretch>
+            <a:fillRect/>
+          </a:stretch>
+        </p:blipFill>
+        <p:spPr>
+          <a:xfrm>
+            <a:off x="1082670" y="1794969"/>
+            <a:ext cx="5858294" cy="4856386"/>
+          </a:xfrm>
+          <a:prstGeom prst="rect">
+            <a:avLst/>
+          </a:prstGeom>
+        </p:spPr>
+      </p:pic>
+      <p:pic>
+        <p:nvPicPr>
+          <p:cNvPr id="13" name="Bilde 12">
+            <a:extLst>
+              <a:ext uri="{FF2B5EF4-FFF2-40B4-BE49-F238E27FC236}">
+                <a16:creationId xmlns:a16="http://schemas.microsoft.com/office/drawing/2014/main" id="{F8B62767-B8C0-36ED-7FD7-606A93EAC23B}"/>
+              </a:ext>
+            </a:extLst>
+          </p:cNvPr>
+          <p:cNvPicPr>
+            <a:picLocks noChangeAspect="1"/>
+          </p:cNvPicPr>
+          <p:nvPr/>
+        </p:nvPicPr>
+        <p:blipFill>
+          <a:blip r:embed="rId6"/>
+          <a:stretch>
+            <a:fillRect/>
+          </a:stretch>
+        </p:blipFill>
+        <p:spPr>
+          <a:xfrm>
+            <a:off x="1082670" y="316918"/>
+            <a:ext cx="5858294" cy="1478051"/>
+          </a:xfrm>
+          <a:prstGeom prst="rect">
+            <a:avLst/>
+          </a:prstGeom>
+        </p:spPr>
+      </p:pic>
+      <p:sp>
+        <p:nvSpPr>
+          <p:cNvPr id="14" name="TekstSylinder 13">
+            <a:extLst>
+              <a:ext uri="{FF2B5EF4-FFF2-40B4-BE49-F238E27FC236}">
+                <a16:creationId xmlns:a16="http://schemas.microsoft.com/office/drawing/2014/main" id="{74E2CAF3-14CC-A118-77CB-AEB9DE52AD07}"/>
+              </a:ext>
+            </a:extLst>
+          </p:cNvPr>
+          <p:cNvSpPr txBox="1"/>
+          <p:nvPr/>
+        </p:nvSpPr>
+        <p:spPr>
+          <a:xfrm>
+            <a:off x="7053570" y="582189"/>
+            <a:ext cx="4940776" cy="584775"/>
+          </a:xfrm>
+          <a:prstGeom prst="rect">
+            <a:avLst/>
+          </a:prstGeom>
+          <a:noFill/>
+        </p:spPr>
+        <p:txBody>
+          <a:bodyPr wrap="none" rtlCol="0">
+            <a:spAutoFit/>
+          </a:bodyPr>
+          <a:lstStyle/>
+          <a:p>
+            <a:r>
+              <a:rPr lang="nb-NO" sz="3200" dirty="0">
+                <a:latin typeface="Yu Gothic" panose="020B0400000000000000" pitchFamily="34" charset="-128"/>
+                <a:ea typeface="Yu Gothic" panose="020B0400000000000000" pitchFamily="34" charset="-128"/>
+              </a:rPr>
+              <a:t>Github - Versjonskontroll</a:t>
+            </a:r>
+          </a:p>
+        </p:txBody>
+      </p:sp>
+    </p:spTree>
+    <p:extLst>
+      <p:ext uri="{BB962C8B-B14F-4D97-AF65-F5344CB8AC3E}">
+        <p14:creationId xmlns:p14="http://schemas.microsoft.com/office/powerpoint/2010/main" val="2603642969"/>
+      </p:ext>
+    </p:extLst>
+  </p:cSld>
+  <p:clrMapOvr>
+    <a:masterClrMapping/>
+  </p:clrMapOvr>
+  <mc:AlternateContent xmlns:mc="http://schemas.openxmlformats.org/markup-compatibility/2006" xmlns:p159="http://schemas.microsoft.com/office/powerpoint/2015/09/main">
+    <mc:Choice Requires="p159">
+      <p:transition xmlns:p14="http://schemas.microsoft.com/office/powerpoint/2010/main" spd="slow" p14:dur="2000">
+        <p159:morph option="byObject"/>
+      </p:transition>
+    </mc:Choice>
+    <mc:Fallback xmlns="">
+      <p:transition spd="slow">
+        <p:fade/>
+      </p:transition>
+    </mc:Fallback>
+  </mc:AlternateContent>
+  <p:timing>
+    <p:tnLst>
+      <p:par>
+        <p:cTn id="1" dur="indefinite" restart="never" nodeType="tmRoot">
+          <p:childTnLst>
+            <p:seq concurrent="1" nextAc="seek">
+              <p:cTn id="2" dur="indefinite" nodeType="mainSeq">
+                <p:childTnLst>
+                  <p:par>
+                    <p:cTn id="3" fill="hold">
+                      <p:stCondLst>
+                        <p:cond delay="indefinite"/>
+                      </p:stCondLst>
+                      <p:childTnLst>
+                        <p:par>
+                          <p:cTn id="4" fill="hold">
+                            <p:stCondLst>
+                              <p:cond delay="0"/>
+                            </p:stCondLst>
+                            <p:childTnLst>
+                              <p:par>
+                                <p:cTn id="5" presetID="10" presetClass="entr" presetSubtype="0" fill="hold" nodeType="clickEffect">
+                                  <p:stCondLst>
+                                    <p:cond delay="0"/>
+                                  </p:stCondLst>
+                                  <p:childTnLst>
+                                    <p:set>
+                                      <p:cBhvr>
+                                        <p:cTn id="6" dur="1" fill="hold">
+                                          <p:stCondLst>
+                                            <p:cond delay="0"/>
+                                          </p:stCondLst>
+                                        </p:cTn>
+                                        <p:tgtEl>
+                                          <p:spTgt spid="6">
+                                            <p:txEl>
+                                              <p:pRg st="0" end="0"/>
+                                            </p:txEl>
+                                          </p:spTgt>
+                                        </p:tgtEl>
+                                        <p:attrNameLst>
+                                          <p:attrName>style.visibility</p:attrName>
+                                        </p:attrNameLst>
+                                      </p:cBhvr>
+                                      <p:to>
+                                        <p:strVal val="visible"/>
+                                      </p:to>
+                                    </p:set>
+                                    <p:animEffect transition="in" filter="fade">
+                                      <p:cBhvr>
+                                        <p:cTn id="7" dur="500"/>
+                                        <p:tgtEl>
+                                          <p:spTgt spid="6">
+                                            <p:txEl>
+                                              <p:pRg st="0" end="0"/>
+                                            </p:txEl>
+                                          </p:spTgt>
+                                        </p:tgtEl>
+                                      </p:cBhvr>
+                                    </p:animEffect>
+                                  </p:childTnLst>
+                                </p:cTn>
+                              </p:par>
+                            </p:childTnLst>
+                          </p:cTn>
+                        </p:par>
+                      </p:childTnLst>
+                    </p:cTn>
+                  </p:par>
+                  <p:par>
+                    <p:cTn id="8" fill="hold">
+                      <p:stCondLst>
+                        <p:cond delay="indefinite"/>
+                      </p:stCondLst>
+                      <p:childTnLst>
+                        <p:par>
+                          <p:cTn id="9" fill="hold">
+                            <p:stCondLst>
+                              <p:cond delay="0"/>
+                            </p:stCondLst>
+                            <p:childTnLst>
+                              <p:par>
+                                <p:cTn id="10" presetID="10" presetClass="entr" presetSubtype="0" fill="hold" nodeType="clickEffect">
+                                  <p:stCondLst>
+                                    <p:cond delay="0"/>
+                                  </p:stCondLst>
+                                  <p:childTnLst>
+                                    <p:set>
+                                      <p:cBhvr>
+                                        <p:cTn id="11" dur="1" fill="hold">
+                                          <p:stCondLst>
+                                            <p:cond delay="0"/>
+                                          </p:stCondLst>
+                                        </p:cTn>
+                                        <p:tgtEl>
+                                          <p:spTgt spid="6">
+                                            <p:txEl>
+                                              <p:pRg st="2" end="2"/>
+                                            </p:txEl>
+                                          </p:spTgt>
+                                        </p:tgtEl>
+                                        <p:attrNameLst>
+                                          <p:attrName>style.visibility</p:attrName>
+                                        </p:attrNameLst>
+                                      </p:cBhvr>
+                                      <p:to>
+                                        <p:strVal val="visible"/>
+                                      </p:to>
+                                    </p:set>
+                                    <p:animEffect transition="in" filter="fade">
+                                      <p:cBhvr>
+                                        <p:cTn id="12" dur="500"/>
+                                        <p:tgtEl>
+                                          <p:spTgt spid="6">
+                                            <p:txEl>
+                                              <p:pRg st="2" end="2"/>
+                                            </p:txEl>
+                                          </p:spTgt>
+                                        </p:tgtEl>
+                                      </p:cBhvr>
+                                    </p:animEffect>
+                                  </p:childTnLst>
+                                </p:cTn>
+                              </p:par>
+                            </p:childTnLst>
+                          </p:cTn>
+                        </p:par>
+                      </p:childTnLst>
+                    </p:cTn>
+                  </p:par>
+                  <p:par>
+                    <p:cTn id="13" fill="hold">
+                      <p:stCondLst>
+                        <p:cond delay="indefinite"/>
+                      </p:stCondLst>
+                      <p:childTnLst>
+                        <p:par>
+                          <p:cTn id="14" fill="hold">
+                            <p:stCondLst>
+                              <p:cond delay="0"/>
+                            </p:stCondLst>
+                            <p:childTnLst>
+                              <p:par>
+                                <p:cTn id="15" presetID="10" presetClass="entr" presetSubtype="0" fill="hold" nodeType="clickEffect">
+                                  <p:stCondLst>
+                                    <p:cond delay="0"/>
+                                  </p:stCondLst>
+                                  <p:childTnLst>
+                                    <p:set>
+                                      <p:cBhvr>
+                                        <p:cTn id="16" dur="1" fill="hold">
+                                          <p:stCondLst>
+                                            <p:cond delay="0"/>
+                                          </p:stCondLst>
+                                        </p:cTn>
+                                        <p:tgtEl>
+                                          <p:spTgt spid="6">
+                                            <p:txEl>
+                                              <p:pRg st="4" end="4"/>
+                                            </p:txEl>
+                                          </p:spTgt>
+                                        </p:tgtEl>
+                                        <p:attrNameLst>
+                                          <p:attrName>style.visibility</p:attrName>
+                                        </p:attrNameLst>
+                                      </p:cBhvr>
+                                      <p:to>
+                                        <p:strVal val="visible"/>
+                                      </p:to>
+                                    </p:set>
+                                    <p:animEffect transition="in" filter="fade">
+                                      <p:cBhvr>
+                                        <p:cTn id="17" dur="500"/>
+                                        <p:tgtEl>
+                                          <p:spTgt spid="6">
+                                            <p:txEl>
+                                              <p:pRg st="4" end="4"/>
+                                            </p:txEl>
+                                          </p:spTgt>
+                                        </p:tgtEl>
+                                      </p:cBhvr>
+                                    </p:animEffect>
+                                  </p:childTnLst>
+                                </p:cTn>
+                              </p:par>
+                            </p:childTnLst>
+                          </p:cTn>
+                        </p:par>
+                      </p:childTnLst>
+                    </p:cTn>
+                  </p:par>
+                </p:childTnLst>
+              </p:cTn>
+              <p:prevCondLst>
+                <p:cond evt="onPrev" delay="0">
+                  <p:tgtEl>
+                    <p:sldTgt/>
+                  </p:tgtEl>
+                </p:cond>
+              </p:prevCondLst>
+              <p:nextCondLst>
+                <p:cond evt="onNext" delay="0">
+                  <p:tgtEl>
+                    <p:sldTgt/>
+                  </p:tgtEl>
+                </p:cond>
+              </p:nextCondLst>
+            </p:seq>
+          </p:childTnLst>
+        </p:cTn>
+      </p:par>
+    </p:tnLst>
+  </p:timing>
+</p:sld>
+</file>
+
+<file path=ppt/slides/slide13.xml><?xml version="1.0" encoding="utf-8"?>
+<p:sld xmlns:a="http://schemas.openxmlformats.org/drawingml/2006/main" xmlns:r="http://schemas.openxmlformats.org/officeDocument/2006/relationships" xmlns:p="http://schemas.openxmlformats.org/presentationml/2006/main">
+  <p:cSld>
+    <p:spTree>
+      <p:nvGrpSpPr>
+        <p:cNvPr id="1" name=""/>
+        <p:cNvGrpSpPr/>
+        <p:nvPr/>
+      </p:nvGrpSpPr>
+      <p:grpSpPr>
+        <a:xfrm>
+          <a:off x="0" y="0"/>
+          <a:ext cx="0" cy="0"/>
+          <a:chOff x="0" y="0"/>
+          <a:chExt cx="0" cy="0"/>
+        </a:xfrm>
+      </p:grpSpPr>
       <p:sp>
         <p:nvSpPr>
           <p:cNvPr id="2" name="TekstSylinder 1">
@@ -5654,8 +7123,8 @@
         </p:nvSpPr>
         <p:spPr>
           <a:xfrm>
-            <a:off x="1123196" y="1885180"/>
-            <a:ext cx="4795004" cy="2862322"/>
+            <a:off x="1114721" y="1556500"/>
+            <a:ext cx="4795004" cy="3477875"/>
           </a:xfrm>
           <a:prstGeom prst="rect">
             <a:avLst/>
@@ -5747,6 +7216,36 @@
                 <a:ea typeface="Yu Gothic UI Semibold" panose="020B0700000000000000" pitchFamily="34" charset="-128"/>
               </a:rPr>
               <a:t>Utviklerne bak Bedriftsportalen</a:t>
+            </a:r>
+          </a:p>
+          <a:p>
+            <a:pPr marL="285750" indent="-285750">
+              <a:buFont typeface="Arial" panose="020B0604020202020204" pitchFamily="34" charset="0"/>
+              <a:buChar char="•"/>
+            </a:pPr>
+            <a:endParaRPr lang="nb-NO" sz="2000" dirty="0">
+              <a:latin typeface="Yu Gothic UI Semibold" panose="020B0700000000000000" pitchFamily="34" charset="-128"/>
+              <a:ea typeface="Yu Gothic UI Semibold" panose="020B0700000000000000" pitchFamily="34" charset="-128"/>
+            </a:endParaRPr>
+          </a:p>
+          <a:p>
+            <a:pPr marL="285750" indent="-285750">
+              <a:buFont typeface="Arial" panose="020B0604020202020204" pitchFamily="34" charset="0"/>
+              <a:buChar char="•"/>
+            </a:pPr>
+            <a:r>
+              <a:rPr lang="nb-NO" sz="2000" dirty="0" err="1">
+                <a:latin typeface="Yu Gothic UI Semibold" panose="020B0700000000000000" pitchFamily="34" charset="-128"/>
+                <a:ea typeface="Yu Gothic UI Semibold" panose="020B0700000000000000" pitchFamily="34" charset="-128"/>
+              </a:rPr>
+              <a:t>Trello</a:t>
+            </a:r>
+            <a:r>
+              <a:rPr lang="nb-NO" sz="2000" dirty="0">
+                <a:latin typeface="Yu Gothic UI Semibold" panose="020B0700000000000000" pitchFamily="34" charset="-128"/>
+                <a:ea typeface="Yu Gothic UI Semibold" panose="020B0700000000000000" pitchFamily="34" charset="-128"/>
+              </a:rPr>
+              <a:t> og Github</a:t>
             </a:r>
           </a:p>
           <a:p>
@@ -6209,6 +7708,67 @@
                                           </p:stCondLst>
                                         </p:cTn>
                                         <p:tgtEl>
+                                          <p:spTgt spid="7">
+                                            <p:txEl>
+                                              <p:pRg st="10" end="10"/>
+                                            </p:txEl>
+                                          </p:spTgt>
+                                        </p:tgtEl>
+                                        <p:attrNameLst>
+                                          <p:attrName>style.visibility</p:attrName>
+                                        </p:attrNameLst>
+                                      </p:cBhvr>
+                                      <p:to>
+                                        <p:strVal val="visible"/>
+                                      </p:to>
+                                    </p:set>
+                                    <p:animEffect transition="in" filter="fade">
+                                      <p:cBhvr>
+                                        <p:cTn id="32" dur="500"/>
+                                        <p:tgtEl>
+                                          <p:spTgt spid="7">
+                                            <p:txEl>
+                                              <p:pRg st="10" end="10"/>
+                                            </p:txEl>
+                                          </p:spTgt>
+                                        </p:tgtEl>
+                                      </p:cBhvr>
+                                    </p:animEffect>
+                                  </p:childTnLst>
+                                </p:cTn>
+                              </p:par>
+                            </p:childTnLst>
+                          </p:cTn>
+                        </p:par>
+                      </p:childTnLst>
+                    </p:cTn>
+                  </p:par>
+                  <p:par>
+                    <p:cTn id="33" fill="hold">
+                      <p:stCondLst>
+                        <p:cond delay="indefinite"/>
+                      </p:stCondLst>
+                      <p:childTnLst>
+                        <p:par>
+                          <p:cTn id="34" fill="hold">
+                            <p:stCondLst>
+                              <p:cond delay="0"/>
+                            </p:stCondLst>
+                            <p:childTnLst>
+                              <p:par>
+                                <p:cTn id="35" presetID="10" presetClass="entr" presetSubtype="0" fill="hold" nodeType="clickEffect">
+                                  <p:stCondLst>
+                                    <p:cond delay="0"/>
+                                  </p:stCondLst>
+                                  <p:childTnLst>
+                                    <p:set>
+                                      <p:cBhvr>
+                                        <p:cTn id="36" dur="1" fill="hold">
+                                          <p:stCondLst>
+                                            <p:cond delay="0"/>
+                                          </p:stCondLst>
+                                        </p:cTn>
+                                        <p:tgtEl>
                                           <p:spTgt spid="9">
                                             <p:txEl>
                                               <p:pRg st="0" end="0"/>
@@ -6225,7 +7785,7 @@
                                     </p:set>
                                     <p:animEffect transition="in" filter="fade">
                                       <p:cBhvr>
-                                        <p:cTn id="32" dur="500"/>
+                                        <p:cTn id="37" dur="500"/>
                                         <p:tgtEl>
                                           <p:spTgt spid="9">
                                             <p:txEl>
@@ -10264,7 +11824,10 @@
               <a:buChar char="•"/>
             </a:pPr>
             <a:r>
-              <a:rPr lang="nb-NO" sz="2400" dirty="0"/>
+              <a:rPr lang="nb-NO" sz="2400" dirty="0">
+                <a:latin typeface="Yu Gothic" panose="020B0400000000000000" pitchFamily="34" charset="-128"/>
+                <a:ea typeface="Yu Gothic" panose="020B0400000000000000" pitchFamily="34" charset="-128"/>
+              </a:rPr>
               <a:t>Vi lagrer informasjon og håndterer den etter lovverket gitt av GDPR</a:t>
             </a:r>
           </a:p>
@@ -10273,7 +11836,10 @@
               <a:buFont typeface="Arial" panose="020B0604020202020204" pitchFamily="34" charset="0"/>
               <a:buChar char="•"/>
             </a:pPr>
-            <a:endParaRPr lang="nb-NO" sz="2400" dirty="0"/>
+            <a:endParaRPr lang="nb-NO" sz="2400" dirty="0">
+              <a:latin typeface="Yu Gothic" panose="020B0400000000000000" pitchFamily="34" charset="-128"/>
+              <a:ea typeface="Yu Gothic" panose="020B0400000000000000" pitchFamily="34" charset="-128"/>
+            </a:endParaRPr>
           </a:p>
           <a:p>
             <a:pPr marL="285750" indent="-285750">
@@ -10281,21 +11847,33 @@
               <a:buChar char="•"/>
             </a:pPr>
             <a:r>
-              <a:rPr lang="nb-NO" sz="2400" dirty="0"/>
+              <a:rPr lang="nb-NO" sz="2400" dirty="0">
+                <a:latin typeface="Yu Gothic" panose="020B0400000000000000" pitchFamily="34" charset="-128"/>
+                <a:ea typeface="Yu Gothic" panose="020B0400000000000000" pitchFamily="34" charset="-128"/>
+              </a:rPr>
               <a:t>Brukere av tjenesten godkjenner </a:t>
             </a:r>
           </a:p>
           <a:p>
             <a:r>
-              <a:rPr lang="nb-NO" sz="2400" dirty="0"/>
+              <a:rPr lang="nb-NO" sz="2400" dirty="0">
+                <a:latin typeface="Yu Gothic" panose="020B0400000000000000" pitchFamily="34" charset="-128"/>
+                <a:ea typeface="Yu Gothic" panose="020B0400000000000000" pitchFamily="34" charset="-128"/>
+              </a:rPr>
               <a:t>    Terms </a:t>
             </a:r>
             <a:r>
-              <a:rPr lang="nb-NO" sz="2400" dirty="0" err="1"/>
+              <a:rPr lang="nb-NO" sz="2400" dirty="0" err="1">
+                <a:latin typeface="Yu Gothic" panose="020B0400000000000000" pitchFamily="34" charset="-128"/>
+                <a:ea typeface="Yu Gothic" panose="020B0400000000000000" pitchFamily="34" charset="-128"/>
+              </a:rPr>
               <a:t>of</a:t>
             </a:r>
             <a:r>
-              <a:rPr lang="nb-NO" sz="2400" dirty="0"/>
+              <a:rPr lang="nb-NO" sz="2400" dirty="0">
+                <a:latin typeface="Yu Gothic" panose="020B0400000000000000" pitchFamily="34" charset="-128"/>
+                <a:ea typeface="Yu Gothic" panose="020B0400000000000000" pitchFamily="34" charset="-128"/>
+              </a:rPr>
               <a:t> Service og velger å delta frivillig</a:t>
             </a:r>
           </a:p>
@@ -10304,7 +11882,10 @@
               <a:buFont typeface="Arial" panose="020B0604020202020204" pitchFamily="34" charset="0"/>
               <a:buChar char="•"/>
             </a:pPr>
-            <a:endParaRPr lang="nb-NO" sz="2400" dirty="0"/>
+            <a:endParaRPr lang="nb-NO" sz="2400" dirty="0">
+              <a:latin typeface="Yu Gothic" panose="020B0400000000000000" pitchFamily="34" charset="-128"/>
+              <a:ea typeface="Yu Gothic" panose="020B0400000000000000" pitchFamily="34" charset="-128"/>
+            </a:endParaRPr>
           </a:p>
           <a:p>
             <a:pPr marL="285750" indent="-285750">
@@ -10312,7 +11893,10 @@
               <a:buChar char="•"/>
             </a:pPr>
             <a:r>
-              <a:rPr lang="nb-NO" sz="2400" dirty="0"/>
+              <a:rPr lang="nb-NO" sz="2400" dirty="0">
+                <a:latin typeface="Yu Gothic" panose="020B0400000000000000" pitchFamily="34" charset="-128"/>
+                <a:ea typeface="Yu Gothic" panose="020B0400000000000000" pitchFamily="34" charset="-128"/>
+              </a:rPr>
               <a:t>Kun nødvendig informasjon lagres og slettes dersom det ikke lenger en noe hensikt å beholde den</a:t>
             </a:r>
           </a:p>
@@ -10321,7 +11905,10 @@
               <a:buFont typeface="Arial" panose="020B0604020202020204" pitchFamily="34" charset="0"/>
               <a:buChar char="•"/>
             </a:pPr>
-            <a:endParaRPr lang="nb-NO" sz="2400" dirty="0"/>
+            <a:endParaRPr lang="nb-NO" sz="2400" dirty="0">
+              <a:latin typeface="Yu Gothic" panose="020B0400000000000000" pitchFamily="34" charset="-128"/>
+              <a:ea typeface="Yu Gothic" panose="020B0400000000000000" pitchFamily="34" charset="-128"/>
+            </a:endParaRPr>
           </a:p>
           <a:p>
             <a:pPr marL="285750" indent="-285750">
@@ -10329,15 +11916,24 @@
               <a:buChar char="•"/>
             </a:pPr>
             <a:r>
-              <a:rPr lang="nb-NO" sz="2400" dirty="0"/>
+              <a:rPr lang="nb-NO" sz="2400" dirty="0">
+                <a:latin typeface="Yu Gothic" panose="020B0400000000000000" pitchFamily="34" charset="-128"/>
+                <a:ea typeface="Yu Gothic" panose="020B0400000000000000" pitchFamily="34" charset="-128"/>
+              </a:rPr>
               <a:t>Bruker innlogging gjøres trygt ved bruk av </a:t>
             </a:r>
             <a:r>
-              <a:rPr lang="nb-NO" sz="2400" dirty="0" err="1"/>
+              <a:rPr lang="nb-NO" sz="2400" dirty="0" err="1">
+                <a:latin typeface="Yu Gothic" panose="020B0400000000000000" pitchFamily="34" charset="-128"/>
+                <a:ea typeface="Yu Gothic" panose="020B0400000000000000" pitchFamily="34" charset="-128"/>
+              </a:rPr>
               <a:t>hashing</a:t>
             </a:r>
             <a:r>
-              <a:rPr lang="nb-NO" sz="2400" dirty="0"/>
+              <a:rPr lang="nb-NO" sz="2400" dirty="0">
+                <a:latin typeface="Yu Gothic" panose="020B0400000000000000" pitchFamily="34" charset="-128"/>
+                <a:ea typeface="Yu Gothic" panose="020B0400000000000000" pitchFamily="34" charset="-128"/>
+              </a:rPr>
               <a:t> og CSRF-tokens</a:t>
             </a:r>
           </a:p>

</xml_diff>